<commit_message>
Complete "Add number to Excel"
</commit_message>
<xml_diff>
--- a/Excel动手实验室.pptx
+++ b/Excel动手实验室.pptx
@@ -9,6 +9,8 @@
     <p:sldId id="257" r:id="rId3"/>
     <p:sldId id="258" r:id="rId4"/>
     <p:sldId id="259" r:id="rId5"/>
+    <p:sldId id="260" r:id="rId6"/>
+    <p:sldId id="261" r:id="rId7"/>
   </p:sldIdLst>
   <p:sldSz cx="12192000" cy="6858000"/>
   <p:notesSz cx="6858000" cy="9144000"/>
@@ -6086,15 +6088,23 @@
             </a:r>
             <a:r>
               <a:rPr lang="zh-CN" altLang="en-US" dirty="0" smtClean="0"/>
-              <a:t>字求和 </a:t>
-            </a:r>
-            <a:r>
-              <a:rPr lang="en-US" altLang="zh-CN" dirty="0" smtClean="0"/>
-              <a:t>&amp; </a:t>
+              <a:t>字求</a:t>
             </a:r>
             <a:r>
               <a:rPr lang="zh-CN" altLang="en-US" dirty="0" smtClean="0"/>
-              <a:t>基本数学运算</a:t>
+              <a:t>和</a:t>
+            </a:r>
+            <a:endParaRPr lang="en-US" altLang="zh-CN" dirty="0" smtClean="0"/>
+          </a:p>
+          <a:p>
+            <a:pPr lvl="1"/>
+            <a:r>
+              <a:rPr lang="zh-CN" altLang="en-US" dirty="0" smtClean="0"/>
+              <a:t>基</a:t>
+            </a:r>
+            <a:r>
+              <a:rPr lang="zh-CN" altLang="en-US" dirty="0" smtClean="0"/>
+              <a:t>本数学运算</a:t>
             </a:r>
             <a:endParaRPr lang="en-US" altLang="zh-CN" dirty="0" smtClean="0"/>
           </a:p>
@@ -6498,6 +6508,240 @@
       </p:transition>
     </mc:Fallback>
   </mc:AlternateContent>
+</p:sld>
+</file>
+
+<file path=ppt/slides/slide5.xml><?xml version="1.0" encoding="utf-8"?>
+<p:sld xmlns:a="http://schemas.openxmlformats.org/drawingml/2006/main" xmlns:r="http://schemas.openxmlformats.org/officeDocument/2006/relationships" xmlns:p="http://schemas.openxmlformats.org/presentationml/2006/main">
+  <p:cSld>
+    <p:spTree>
+      <p:nvGrpSpPr>
+        <p:cNvPr id="1" name=""/>
+        <p:cNvGrpSpPr/>
+        <p:nvPr/>
+      </p:nvGrpSpPr>
+      <p:grpSpPr>
+        <a:xfrm>
+          <a:off x="0" y="0"/>
+          <a:ext cx="0" cy="0"/>
+          <a:chOff x="0" y="0"/>
+          <a:chExt cx="0" cy="0"/>
+        </a:xfrm>
+      </p:grpSpPr>
+      <p:sp>
+        <p:nvSpPr>
+          <p:cNvPr id="2" name="Title 1"/>
+          <p:cNvSpPr>
+            <a:spLocks noGrp="1"/>
+          </p:cNvSpPr>
+          <p:nvPr>
+            <p:ph type="title"/>
+          </p:nvPr>
+        </p:nvSpPr>
+        <p:spPr/>
+        <p:txBody>
+          <a:bodyPr/>
+          <a:lstStyle/>
+          <a:p>
+            <a:r>
+              <a:rPr lang="en-US" altLang="zh-CN" dirty="0"/>
+              <a:t>Excel</a:t>
+            </a:r>
+            <a:r>
+              <a:rPr lang="zh-CN" altLang="en-US" dirty="0"/>
+              <a:t>动手实验</a:t>
+            </a:r>
+            <a:r>
+              <a:rPr lang="zh-CN" altLang="en-US" dirty="0" smtClean="0"/>
+              <a:t>室 </a:t>
+            </a:r>
+            <a:r>
+              <a:rPr lang="en-US" altLang="zh-CN" dirty="0" smtClean="0"/>
+              <a:t>- </a:t>
+            </a:r>
+            <a:r>
+              <a:rPr lang="zh-CN" altLang="en-US" dirty="0" smtClean="0"/>
+              <a:t>对数字求和</a:t>
+            </a:r>
+            <a:endParaRPr lang="zh-CN" altLang="en-US" dirty="0"/>
+          </a:p>
+        </p:txBody>
+      </p:sp>
+      <p:sp>
+        <p:nvSpPr>
+          <p:cNvPr id="3" name="Content Placeholder 2"/>
+          <p:cNvSpPr>
+            <a:spLocks noGrp="1"/>
+          </p:cNvSpPr>
+          <p:nvPr>
+            <p:ph idx="1"/>
+          </p:nvPr>
+        </p:nvSpPr>
+        <p:spPr/>
+        <p:txBody>
+          <a:bodyPr/>
+          <a:lstStyle/>
+          <a:p>
+            <a:r>
+              <a:rPr lang="zh-CN" altLang="en-US" dirty="0" smtClean="0"/>
+              <a:t>公式</a:t>
+            </a:r>
+            <a:endParaRPr lang="en-US" altLang="zh-CN" dirty="0" smtClean="0"/>
+          </a:p>
+          <a:p>
+            <a:r>
+              <a:rPr lang="zh-CN" altLang="en-US" dirty="0" smtClean="0"/>
+              <a:t>自动求和按钮</a:t>
+            </a:r>
+            <a:endParaRPr lang="en-US" altLang="zh-CN" dirty="0" smtClean="0"/>
+          </a:p>
+          <a:p>
+            <a:r>
+              <a:rPr lang="zh-CN" altLang="en-US" dirty="0" smtClean="0"/>
+              <a:t>函数</a:t>
+            </a:r>
+            <a:endParaRPr lang="en-US" altLang="zh-CN" dirty="0" smtClean="0"/>
+          </a:p>
+          <a:p>
+            <a:pPr lvl="1"/>
+            <a:r>
+              <a:rPr lang="en-US" altLang="zh-CN" dirty="0" smtClean="0"/>
+              <a:t>SUM</a:t>
+            </a:r>
+          </a:p>
+          <a:p>
+            <a:pPr lvl="1"/>
+            <a:r>
+              <a:rPr lang="en-US" altLang="zh-CN" dirty="0" smtClean="0"/>
+              <a:t>SUMIF</a:t>
+            </a:r>
+          </a:p>
+          <a:p>
+            <a:pPr lvl="1"/>
+            <a:endParaRPr lang="en-US" altLang="zh-CN" dirty="0"/>
+          </a:p>
+          <a:p>
+            <a:endParaRPr lang="en-US" altLang="zh-CN" dirty="0" smtClean="0"/>
+          </a:p>
+          <a:p>
+            <a:endParaRPr lang="en-US" altLang="zh-CN" dirty="0"/>
+          </a:p>
+          <a:p>
+            <a:pPr marL="0" indent="0">
+              <a:buNone/>
+            </a:pPr>
+            <a:r>
+              <a:rPr lang="zh-CN" altLang="en-US" dirty="0" smtClean="0"/>
+              <a:t>从材料中，打开：</a:t>
+            </a:r>
+            <a:r>
+              <a:rPr lang="zh-CN" altLang="en-US" u="sng" dirty="0" smtClean="0"/>
+              <a:t>对数字求和</a:t>
+            </a:r>
+            <a:r>
+              <a:rPr lang="en-US" altLang="zh-CN" u="sng" dirty="0" smtClean="0"/>
+              <a:t>.</a:t>
+            </a:r>
+            <a:r>
+              <a:rPr lang="en-US" altLang="zh-CN" u="sng" dirty="0" err="1" smtClean="0"/>
+              <a:t>xlsx</a:t>
+            </a:r>
+            <a:endParaRPr lang="en-US" altLang="zh-CN" u="sng" dirty="0" smtClean="0"/>
+          </a:p>
+        </p:txBody>
+      </p:sp>
+    </p:spTree>
+    <p:extLst>
+      <p:ext uri="{BB962C8B-B14F-4D97-AF65-F5344CB8AC3E}">
+        <p14:creationId xmlns:p14="http://schemas.microsoft.com/office/powerpoint/2010/main" val="1256903372"/>
+      </p:ext>
+    </p:extLst>
+  </p:cSld>
+  <p:clrMapOvr>
+    <a:masterClrMapping/>
+  </p:clrMapOvr>
+  <p:timing>
+    <p:tnLst>
+      <p:par>
+        <p:cTn id="1" dur="indefinite" restart="never" nodeType="tmRoot"/>
+      </p:par>
+    </p:tnLst>
+  </p:timing>
+</p:sld>
+</file>
+
+<file path=ppt/slides/slide6.xml><?xml version="1.0" encoding="utf-8"?>
+<p:sld xmlns:a="http://schemas.openxmlformats.org/drawingml/2006/main" xmlns:r="http://schemas.openxmlformats.org/officeDocument/2006/relationships" xmlns:p="http://schemas.openxmlformats.org/presentationml/2006/main">
+  <p:cSld>
+    <p:spTree>
+      <p:nvGrpSpPr>
+        <p:cNvPr id="1" name=""/>
+        <p:cNvGrpSpPr/>
+        <p:nvPr/>
+      </p:nvGrpSpPr>
+      <p:grpSpPr>
+        <a:xfrm>
+          <a:off x="0" y="0"/>
+          <a:ext cx="0" cy="0"/>
+          <a:chOff x="0" y="0"/>
+          <a:chExt cx="0" cy="0"/>
+        </a:xfrm>
+      </p:grpSpPr>
+      <p:sp>
+        <p:nvSpPr>
+          <p:cNvPr id="2" name="Title 1"/>
+          <p:cNvSpPr>
+            <a:spLocks noGrp="1"/>
+          </p:cNvSpPr>
+          <p:nvPr>
+            <p:ph type="title"/>
+          </p:nvPr>
+        </p:nvSpPr>
+        <p:spPr/>
+        <p:txBody>
+          <a:bodyPr/>
+          <a:lstStyle/>
+          <a:p>
+            <a:endParaRPr lang="zh-CN" altLang="en-US"/>
+          </a:p>
+        </p:txBody>
+      </p:sp>
+      <p:sp>
+        <p:nvSpPr>
+          <p:cNvPr id="3" name="Content Placeholder 2"/>
+          <p:cNvSpPr>
+            <a:spLocks noGrp="1"/>
+          </p:cNvSpPr>
+          <p:nvPr>
+            <p:ph idx="1"/>
+          </p:nvPr>
+        </p:nvSpPr>
+        <p:spPr/>
+        <p:txBody>
+          <a:bodyPr/>
+          <a:lstStyle/>
+          <a:p>
+            <a:endParaRPr lang="zh-CN" altLang="en-US"/>
+          </a:p>
+        </p:txBody>
+      </p:sp>
+    </p:spTree>
+    <p:extLst>
+      <p:ext uri="{BB962C8B-B14F-4D97-AF65-F5344CB8AC3E}">
+        <p14:creationId xmlns:p14="http://schemas.microsoft.com/office/powerpoint/2010/main" val="4033530928"/>
+      </p:ext>
+    </p:extLst>
+  </p:cSld>
+  <p:clrMapOvr>
+    <a:masterClrMapping/>
+  </p:clrMapOvr>
+  <p:timing>
+    <p:tnLst>
+      <p:par>
+        <p:cTn id="1" dur="indefinite" restart="never" nodeType="tmRoot"/>
+      </p:par>
+    </p:tnLst>
+  </p:timing>
 </p:sld>
 </file>
 

</xml_diff>

<commit_message>
Complete slide "Basic Math"
</commit_message>
<xml_diff>
--- a/Excel动手实验室.pptx
+++ b/Excel动手实验室.pptx
@@ -4,6 +4,9 @@
   <p:sldMasterIdLst>
     <p:sldMasterId id="2147483648" r:id="rId1"/>
   </p:sldMasterIdLst>
+  <p:notesMasterIdLst>
+    <p:notesMasterId r:id="rId8"/>
+  </p:notesMasterIdLst>
   <p:sldIdLst>
     <p:sldId id="256" r:id="rId2"/>
     <p:sldId id="257" r:id="rId3"/>
@@ -115,6 +118,540 @@
     </p:ext>
   </p:extLst>
 </p:presentation>
+</file>
+
+<file path=ppt/notesMasters/notesMaster1.xml><?xml version="1.0" encoding="utf-8"?>
+<p:notesMaster xmlns:a="http://schemas.openxmlformats.org/drawingml/2006/main" xmlns:r="http://schemas.openxmlformats.org/officeDocument/2006/relationships" xmlns:p="http://schemas.openxmlformats.org/presentationml/2006/main">
+  <p:cSld>
+    <p:bg>
+      <p:bgRef idx="1001">
+        <a:schemeClr val="bg1"/>
+      </p:bgRef>
+    </p:bg>
+    <p:spTree>
+      <p:nvGrpSpPr>
+        <p:cNvPr id="1" name=""/>
+        <p:cNvGrpSpPr/>
+        <p:nvPr/>
+      </p:nvGrpSpPr>
+      <p:grpSpPr>
+        <a:xfrm>
+          <a:off x="0" y="0"/>
+          <a:ext cx="0" cy="0"/>
+          <a:chOff x="0" y="0"/>
+          <a:chExt cx="0" cy="0"/>
+        </a:xfrm>
+      </p:grpSpPr>
+      <p:sp>
+        <p:nvSpPr>
+          <p:cNvPr id="2" name="Header Placeholder 1"/>
+          <p:cNvSpPr>
+            <a:spLocks noGrp="1"/>
+          </p:cNvSpPr>
+          <p:nvPr>
+            <p:ph type="hdr" sz="quarter"/>
+          </p:nvPr>
+        </p:nvSpPr>
+        <p:spPr>
+          <a:xfrm>
+            <a:off x="0" y="0"/>
+            <a:ext cx="2971800" cy="458788"/>
+          </a:xfrm>
+          <a:prstGeom prst="rect">
+            <a:avLst/>
+          </a:prstGeom>
+        </p:spPr>
+        <p:txBody>
+          <a:bodyPr vert="horz" lIns="91440" tIns="45720" rIns="91440" bIns="45720" rtlCol="0"/>
+          <a:lstStyle>
+            <a:lvl1pPr algn="l">
+              <a:defRPr sz="1200"/>
+            </a:lvl1pPr>
+          </a:lstStyle>
+          <a:p>
+            <a:endParaRPr lang="zh-CN" altLang="en-US"/>
+          </a:p>
+        </p:txBody>
+      </p:sp>
+      <p:sp>
+        <p:nvSpPr>
+          <p:cNvPr id="3" name="Date Placeholder 2"/>
+          <p:cNvSpPr>
+            <a:spLocks noGrp="1"/>
+          </p:cNvSpPr>
+          <p:nvPr>
+            <p:ph type="dt" idx="1"/>
+          </p:nvPr>
+        </p:nvSpPr>
+        <p:spPr>
+          <a:xfrm>
+            <a:off x="3884613" y="0"/>
+            <a:ext cx="2971800" cy="458788"/>
+          </a:xfrm>
+          <a:prstGeom prst="rect">
+            <a:avLst/>
+          </a:prstGeom>
+        </p:spPr>
+        <p:txBody>
+          <a:bodyPr vert="horz" lIns="91440" tIns="45720" rIns="91440" bIns="45720" rtlCol="0"/>
+          <a:lstStyle>
+            <a:lvl1pPr algn="r">
+              <a:defRPr sz="1200"/>
+            </a:lvl1pPr>
+          </a:lstStyle>
+          <a:p>
+            <a:fld id="{1BA39FD8-4789-4E5D-8B57-25E95F0DBEC2}" type="datetimeFigureOut">
+              <a:rPr lang="zh-CN" altLang="en-US" smtClean="0"/>
+              <a:t>2015/5/16</a:t>
+            </a:fld>
+            <a:endParaRPr lang="zh-CN" altLang="en-US"/>
+          </a:p>
+        </p:txBody>
+      </p:sp>
+      <p:sp>
+        <p:nvSpPr>
+          <p:cNvPr id="4" name="Slide Image Placeholder 3"/>
+          <p:cNvSpPr>
+            <a:spLocks noGrp="1" noRot="1" noChangeAspect="1"/>
+          </p:cNvSpPr>
+          <p:nvPr>
+            <p:ph type="sldImg" idx="2"/>
+          </p:nvPr>
+        </p:nvSpPr>
+        <p:spPr>
+          <a:xfrm>
+            <a:off x="685800" y="1143000"/>
+            <a:ext cx="5486400" cy="3086100"/>
+          </a:xfrm>
+          <a:prstGeom prst="rect">
+            <a:avLst/>
+          </a:prstGeom>
+          <a:noFill/>
+          <a:ln w="12700">
+            <a:solidFill>
+              <a:prstClr val="black"/>
+            </a:solidFill>
+          </a:ln>
+        </p:spPr>
+        <p:txBody>
+          <a:bodyPr vert="horz" lIns="91440" tIns="45720" rIns="91440" bIns="45720" rtlCol="0" anchor="ctr"/>
+          <a:lstStyle/>
+          <a:p>
+            <a:endParaRPr lang="zh-CN" altLang="en-US"/>
+          </a:p>
+        </p:txBody>
+      </p:sp>
+      <p:sp>
+        <p:nvSpPr>
+          <p:cNvPr id="5" name="Notes Placeholder 4"/>
+          <p:cNvSpPr>
+            <a:spLocks noGrp="1"/>
+          </p:cNvSpPr>
+          <p:nvPr>
+            <p:ph type="body" sz="quarter" idx="3"/>
+          </p:nvPr>
+        </p:nvSpPr>
+        <p:spPr>
+          <a:xfrm>
+            <a:off x="685800" y="4400550"/>
+            <a:ext cx="5486400" cy="3600450"/>
+          </a:xfrm>
+          <a:prstGeom prst="rect">
+            <a:avLst/>
+          </a:prstGeom>
+        </p:spPr>
+        <p:txBody>
+          <a:bodyPr vert="horz" lIns="91440" tIns="45720" rIns="91440" bIns="45720" rtlCol="0"/>
+          <a:lstStyle/>
+          <a:p>
+            <a:pPr lvl="0"/>
+            <a:r>
+              <a:rPr lang="en-US" altLang="zh-CN" smtClean="0"/>
+              <a:t>Click to edit Master text styles</a:t>
+            </a:r>
+          </a:p>
+          <a:p>
+            <a:pPr lvl="1"/>
+            <a:r>
+              <a:rPr lang="en-US" altLang="zh-CN" smtClean="0"/>
+              <a:t>Second level</a:t>
+            </a:r>
+          </a:p>
+          <a:p>
+            <a:pPr lvl="2"/>
+            <a:r>
+              <a:rPr lang="en-US" altLang="zh-CN" smtClean="0"/>
+              <a:t>Third level</a:t>
+            </a:r>
+          </a:p>
+          <a:p>
+            <a:pPr lvl="3"/>
+            <a:r>
+              <a:rPr lang="en-US" altLang="zh-CN" smtClean="0"/>
+              <a:t>Fourth level</a:t>
+            </a:r>
+          </a:p>
+          <a:p>
+            <a:pPr lvl="4"/>
+            <a:r>
+              <a:rPr lang="en-US" altLang="zh-CN" smtClean="0"/>
+              <a:t>Fifth level</a:t>
+            </a:r>
+            <a:endParaRPr lang="zh-CN" altLang="en-US"/>
+          </a:p>
+        </p:txBody>
+      </p:sp>
+      <p:sp>
+        <p:nvSpPr>
+          <p:cNvPr id="6" name="Footer Placeholder 5"/>
+          <p:cNvSpPr>
+            <a:spLocks noGrp="1"/>
+          </p:cNvSpPr>
+          <p:nvPr>
+            <p:ph type="ftr" sz="quarter" idx="4"/>
+          </p:nvPr>
+        </p:nvSpPr>
+        <p:spPr>
+          <a:xfrm>
+            <a:off x="0" y="8685213"/>
+            <a:ext cx="2971800" cy="458787"/>
+          </a:xfrm>
+          <a:prstGeom prst="rect">
+            <a:avLst/>
+          </a:prstGeom>
+        </p:spPr>
+        <p:txBody>
+          <a:bodyPr vert="horz" lIns="91440" tIns="45720" rIns="91440" bIns="45720" rtlCol="0" anchor="b"/>
+          <a:lstStyle>
+            <a:lvl1pPr algn="l">
+              <a:defRPr sz="1200"/>
+            </a:lvl1pPr>
+          </a:lstStyle>
+          <a:p>
+            <a:endParaRPr lang="zh-CN" altLang="en-US"/>
+          </a:p>
+        </p:txBody>
+      </p:sp>
+      <p:sp>
+        <p:nvSpPr>
+          <p:cNvPr id="7" name="Slide Number Placeholder 6"/>
+          <p:cNvSpPr>
+            <a:spLocks noGrp="1"/>
+          </p:cNvSpPr>
+          <p:nvPr>
+            <p:ph type="sldNum" sz="quarter" idx="5"/>
+          </p:nvPr>
+        </p:nvSpPr>
+        <p:spPr>
+          <a:xfrm>
+            <a:off x="3884613" y="8685213"/>
+            <a:ext cx="2971800" cy="458787"/>
+          </a:xfrm>
+          <a:prstGeom prst="rect">
+            <a:avLst/>
+          </a:prstGeom>
+        </p:spPr>
+        <p:txBody>
+          <a:bodyPr vert="horz" lIns="91440" tIns="45720" rIns="91440" bIns="45720" rtlCol="0" anchor="b"/>
+          <a:lstStyle>
+            <a:lvl1pPr algn="r">
+              <a:defRPr sz="1200"/>
+            </a:lvl1pPr>
+          </a:lstStyle>
+          <a:p>
+            <a:fld id="{287A8CE8-17C0-4AF5-9FA8-F8884093900A}" type="slidenum">
+              <a:rPr lang="zh-CN" altLang="en-US" smtClean="0"/>
+              <a:t>‹#›</a:t>
+            </a:fld>
+            <a:endParaRPr lang="zh-CN" altLang="en-US"/>
+          </a:p>
+        </p:txBody>
+      </p:sp>
+    </p:spTree>
+    <p:extLst>
+      <p:ext uri="{BB962C8B-B14F-4D97-AF65-F5344CB8AC3E}">
+        <p14:creationId xmlns:p14="http://schemas.microsoft.com/office/powerpoint/2010/main" val="3703821617"/>
+      </p:ext>
+    </p:extLst>
+  </p:cSld>
+  <p:clrMap bg1="lt1" tx1="dk1" bg2="lt2" tx2="dk2" accent1="accent1" accent2="accent2" accent3="accent3" accent4="accent4" accent5="accent5" accent6="accent6" hlink="hlink" folHlink="folHlink"/>
+  <p:notesStyle>
+    <a:lvl1pPr marL="0" algn="l" defTabSz="914400" rtl="0" eaLnBrk="1" latinLnBrk="0" hangingPunct="1">
+      <a:defRPr sz="1200" kern="1200">
+        <a:solidFill>
+          <a:schemeClr val="tx1"/>
+        </a:solidFill>
+        <a:latin typeface="+mn-lt"/>
+        <a:ea typeface="+mn-ea"/>
+        <a:cs typeface="+mn-cs"/>
+      </a:defRPr>
+    </a:lvl1pPr>
+    <a:lvl2pPr marL="457200" algn="l" defTabSz="914400" rtl="0" eaLnBrk="1" latinLnBrk="0" hangingPunct="1">
+      <a:defRPr sz="1200" kern="1200">
+        <a:solidFill>
+          <a:schemeClr val="tx1"/>
+        </a:solidFill>
+        <a:latin typeface="+mn-lt"/>
+        <a:ea typeface="+mn-ea"/>
+        <a:cs typeface="+mn-cs"/>
+      </a:defRPr>
+    </a:lvl2pPr>
+    <a:lvl3pPr marL="914400" algn="l" defTabSz="914400" rtl="0" eaLnBrk="1" latinLnBrk="0" hangingPunct="1">
+      <a:defRPr sz="1200" kern="1200">
+        <a:solidFill>
+          <a:schemeClr val="tx1"/>
+        </a:solidFill>
+        <a:latin typeface="+mn-lt"/>
+        <a:ea typeface="+mn-ea"/>
+        <a:cs typeface="+mn-cs"/>
+      </a:defRPr>
+    </a:lvl3pPr>
+    <a:lvl4pPr marL="1371600" algn="l" defTabSz="914400" rtl="0" eaLnBrk="1" latinLnBrk="0" hangingPunct="1">
+      <a:defRPr sz="1200" kern="1200">
+        <a:solidFill>
+          <a:schemeClr val="tx1"/>
+        </a:solidFill>
+        <a:latin typeface="+mn-lt"/>
+        <a:ea typeface="+mn-ea"/>
+        <a:cs typeface="+mn-cs"/>
+      </a:defRPr>
+    </a:lvl4pPr>
+    <a:lvl5pPr marL="1828800" algn="l" defTabSz="914400" rtl="0" eaLnBrk="1" latinLnBrk="0" hangingPunct="1">
+      <a:defRPr sz="1200" kern="1200">
+        <a:solidFill>
+          <a:schemeClr val="tx1"/>
+        </a:solidFill>
+        <a:latin typeface="+mn-lt"/>
+        <a:ea typeface="+mn-ea"/>
+        <a:cs typeface="+mn-cs"/>
+      </a:defRPr>
+    </a:lvl5pPr>
+    <a:lvl6pPr marL="2286000" algn="l" defTabSz="914400" rtl="0" eaLnBrk="1" latinLnBrk="0" hangingPunct="1">
+      <a:defRPr sz="1200" kern="1200">
+        <a:solidFill>
+          <a:schemeClr val="tx1"/>
+        </a:solidFill>
+        <a:latin typeface="+mn-lt"/>
+        <a:ea typeface="+mn-ea"/>
+        <a:cs typeface="+mn-cs"/>
+      </a:defRPr>
+    </a:lvl6pPr>
+    <a:lvl7pPr marL="2743200" algn="l" defTabSz="914400" rtl="0" eaLnBrk="1" latinLnBrk="0" hangingPunct="1">
+      <a:defRPr sz="1200" kern="1200">
+        <a:solidFill>
+          <a:schemeClr val="tx1"/>
+        </a:solidFill>
+        <a:latin typeface="+mn-lt"/>
+        <a:ea typeface="+mn-ea"/>
+        <a:cs typeface="+mn-cs"/>
+      </a:defRPr>
+    </a:lvl7pPr>
+    <a:lvl8pPr marL="3200400" algn="l" defTabSz="914400" rtl="0" eaLnBrk="1" latinLnBrk="0" hangingPunct="1">
+      <a:defRPr sz="1200" kern="1200">
+        <a:solidFill>
+          <a:schemeClr val="tx1"/>
+        </a:solidFill>
+        <a:latin typeface="+mn-lt"/>
+        <a:ea typeface="+mn-ea"/>
+        <a:cs typeface="+mn-cs"/>
+      </a:defRPr>
+    </a:lvl8pPr>
+    <a:lvl9pPr marL="3657600" algn="l" defTabSz="914400" rtl="0" eaLnBrk="1" latinLnBrk="0" hangingPunct="1">
+      <a:defRPr sz="1200" kern="1200">
+        <a:solidFill>
+          <a:schemeClr val="tx1"/>
+        </a:solidFill>
+        <a:latin typeface="+mn-lt"/>
+        <a:ea typeface="+mn-ea"/>
+        <a:cs typeface="+mn-cs"/>
+      </a:defRPr>
+    </a:lvl9pPr>
+  </p:notesStyle>
+</p:notesMaster>
+</file>
+
+<file path=ppt/notesSlides/notesSlide1.xml><?xml version="1.0" encoding="utf-8"?>
+<p:notes xmlns:a="http://schemas.openxmlformats.org/drawingml/2006/main" xmlns:r="http://schemas.openxmlformats.org/officeDocument/2006/relationships" xmlns:p="http://schemas.openxmlformats.org/presentationml/2006/main">
+  <p:cSld>
+    <p:spTree>
+      <p:nvGrpSpPr>
+        <p:cNvPr id="1" name=""/>
+        <p:cNvGrpSpPr/>
+        <p:nvPr/>
+      </p:nvGrpSpPr>
+      <p:grpSpPr>
+        <a:xfrm>
+          <a:off x="0" y="0"/>
+          <a:ext cx="0" cy="0"/>
+          <a:chOff x="0" y="0"/>
+          <a:chExt cx="0" cy="0"/>
+        </a:xfrm>
+      </p:grpSpPr>
+      <p:sp>
+        <p:nvSpPr>
+          <p:cNvPr id="2" name="Slide Image Placeholder 1"/>
+          <p:cNvSpPr>
+            <a:spLocks noGrp="1" noRot="1" noChangeAspect="1"/>
+          </p:cNvSpPr>
+          <p:nvPr>
+            <p:ph type="sldImg"/>
+          </p:nvPr>
+        </p:nvSpPr>
+        <p:spPr/>
+      </p:sp>
+      <p:sp>
+        <p:nvSpPr>
+          <p:cNvPr id="3" name="Notes Placeholder 2"/>
+          <p:cNvSpPr>
+            <a:spLocks noGrp="1"/>
+          </p:cNvSpPr>
+          <p:nvPr>
+            <p:ph type="body" idx="1"/>
+          </p:nvPr>
+        </p:nvSpPr>
+        <p:spPr/>
+        <p:txBody>
+          <a:bodyPr/>
+          <a:lstStyle/>
+          <a:p>
+            <a:r>
+              <a:rPr lang="en-US" altLang="zh-CN" dirty="0" smtClean="0"/>
+              <a:t>ALT+=</a:t>
+            </a:r>
+            <a:r>
+              <a:rPr lang="zh-CN" altLang="en-US" dirty="0" smtClean="0"/>
+              <a:t>，行求和，列求和，表格求和，求平均，复制单元格</a:t>
+            </a:r>
+            <a:endParaRPr lang="zh-CN" altLang="en-US" dirty="0"/>
+          </a:p>
+        </p:txBody>
+      </p:sp>
+      <p:sp>
+        <p:nvSpPr>
+          <p:cNvPr id="4" name="Slide Number Placeholder 3"/>
+          <p:cNvSpPr>
+            <a:spLocks noGrp="1"/>
+          </p:cNvSpPr>
+          <p:nvPr>
+            <p:ph type="sldNum" sz="quarter" idx="10"/>
+          </p:nvPr>
+        </p:nvSpPr>
+        <p:spPr/>
+        <p:txBody>
+          <a:bodyPr/>
+          <a:lstStyle/>
+          <a:p>
+            <a:fld id="{287A8CE8-17C0-4AF5-9FA8-F8884093900A}" type="slidenum">
+              <a:rPr lang="zh-CN" altLang="en-US" smtClean="0"/>
+              <a:t>5</a:t>
+            </a:fld>
+            <a:endParaRPr lang="zh-CN" altLang="en-US"/>
+          </a:p>
+        </p:txBody>
+      </p:sp>
+    </p:spTree>
+    <p:extLst>
+      <p:ext uri="{BB962C8B-B14F-4D97-AF65-F5344CB8AC3E}">
+        <p14:creationId xmlns:p14="http://schemas.microsoft.com/office/powerpoint/2010/main" val="1404971742"/>
+      </p:ext>
+    </p:extLst>
+  </p:cSld>
+  <p:clrMapOvr>
+    <a:masterClrMapping/>
+  </p:clrMapOvr>
+</p:notes>
+</file>
+
+<file path=ppt/notesSlides/notesSlide2.xml><?xml version="1.0" encoding="utf-8"?>
+<p:notes xmlns:a="http://schemas.openxmlformats.org/drawingml/2006/main" xmlns:r="http://schemas.openxmlformats.org/officeDocument/2006/relationships" xmlns:p="http://schemas.openxmlformats.org/presentationml/2006/main">
+  <p:cSld>
+    <p:spTree>
+      <p:nvGrpSpPr>
+        <p:cNvPr id="1" name=""/>
+        <p:cNvGrpSpPr/>
+        <p:nvPr/>
+      </p:nvGrpSpPr>
+      <p:grpSpPr>
+        <a:xfrm>
+          <a:off x="0" y="0"/>
+          <a:ext cx="0" cy="0"/>
+          <a:chOff x="0" y="0"/>
+          <a:chExt cx="0" cy="0"/>
+        </a:xfrm>
+      </p:grpSpPr>
+      <p:sp>
+        <p:nvSpPr>
+          <p:cNvPr id="2" name="Slide Image Placeholder 1"/>
+          <p:cNvSpPr>
+            <a:spLocks noGrp="1" noRot="1" noChangeAspect="1"/>
+          </p:cNvSpPr>
+          <p:nvPr>
+            <p:ph type="sldImg"/>
+          </p:nvPr>
+        </p:nvSpPr>
+        <p:spPr/>
+      </p:sp>
+      <p:sp>
+        <p:nvSpPr>
+          <p:cNvPr id="3" name="Notes Placeholder 2"/>
+          <p:cNvSpPr>
+            <a:spLocks noGrp="1"/>
+          </p:cNvSpPr>
+          <p:nvPr>
+            <p:ph type="body" idx="1"/>
+          </p:nvPr>
+        </p:nvSpPr>
+        <p:spPr/>
+        <p:txBody>
+          <a:bodyPr/>
+          <a:lstStyle/>
+          <a:p>
+            <a:r>
+              <a:rPr lang="en-US" altLang="zh-CN" dirty="0" smtClean="0"/>
+              <a:t>F4</a:t>
+            </a:r>
+            <a:r>
+              <a:rPr lang="zh-CN" altLang="en-US" dirty="0" smtClean="0"/>
+              <a:t>，绝对单元格引用</a:t>
+            </a:r>
+            <a:endParaRPr lang="zh-CN" altLang="en-US" dirty="0"/>
+          </a:p>
+        </p:txBody>
+      </p:sp>
+      <p:sp>
+        <p:nvSpPr>
+          <p:cNvPr id="4" name="Slide Number Placeholder 3"/>
+          <p:cNvSpPr>
+            <a:spLocks noGrp="1"/>
+          </p:cNvSpPr>
+          <p:nvPr>
+            <p:ph type="sldNum" sz="quarter" idx="10"/>
+          </p:nvPr>
+        </p:nvSpPr>
+        <p:spPr/>
+        <p:txBody>
+          <a:bodyPr/>
+          <a:lstStyle/>
+          <a:p>
+            <a:fld id="{287A8CE8-17C0-4AF5-9FA8-F8884093900A}" type="slidenum">
+              <a:rPr lang="zh-CN" altLang="en-US" smtClean="0"/>
+              <a:t>6</a:t>
+            </a:fld>
+            <a:endParaRPr lang="zh-CN" altLang="en-US"/>
+          </a:p>
+        </p:txBody>
+      </p:sp>
+    </p:spTree>
+    <p:extLst>
+      <p:ext uri="{BB962C8B-B14F-4D97-AF65-F5344CB8AC3E}">
+        <p14:creationId xmlns:p14="http://schemas.microsoft.com/office/powerpoint/2010/main" val="1598881060"/>
+      </p:ext>
+    </p:extLst>
+  </p:cSld>
+  <p:clrMapOvr>
+    <a:masterClrMapping/>
+  </p:clrMapOvr>
+</p:notes>
 </file>
 
 <file path=ppt/slideLayouts/slideLayout1.xml><?xml version="1.0" encoding="utf-8"?>
@@ -5971,9 +6508,10 @@
           <a:lstStyle/>
           <a:p>
             <a:r>
-              <a:rPr lang="zh-CN" altLang="en-US" dirty="0"/>
-              <a:t>肖鉴明</a:t>
-            </a:r>
+              <a:rPr lang="zh-CN" altLang="en-US" dirty="0" smtClean="0"/>
+              <a:t>从入门到精通</a:t>
+            </a:r>
+            <a:endParaRPr lang="zh-CN" altLang="en-US" dirty="0"/>
           </a:p>
         </p:txBody>
       </p:sp>
@@ -5987,13 +6525,13 @@
   <p:clrMapOvr>
     <a:masterClrMapping/>
   </p:clrMapOvr>
-  <mc:AlternateContent xmlns:mc="http://schemas.openxmlformats.org/markup-compatibility/2006">
-    <mc:Choice xmlns:p14="http://schemas.microsoft.com/office/powerpoint/2010/main" Requires="p14">
+  <mc:AlternateContent xmlns:mc="http://schemas.openxmlformats.org/markup-compatibility/2006" xmlns:p14="http://schemas.microsoft.com/office/powerpoint/2010/main">
+    <mc:Choice Requires="p14">
       <p:transition spd="med" p14:dur="700">
         <p:fade/>
       </p:transition>
     </mc:Choice>
-    <mc:Fallback>
+    <mc:Fallback xmlns="">
       <p:transition spd="med">
         <p:fade/>
       </p:transition>
@@ -6088,23 +6626,15 @@
             </a:r>
             <a:r>
               <a:rPr lang="zh-CN" altLang="en-US" dirty="0" smtClean="0"/>
-              <a:t>字求</a:t>
-            </a:r>
+              <a:t>字求和</a:t>
+            </a:r>
+            <a:endParaRPr lang="en-US" altLang="zh-CN" dirty="0" smtClean="0"/>
+          </a:p>
+          <a:p>
+            <a:pPr lvl="1"/>
             <a:r>
               <a:rPr lang="zh-CN" altLang="en-US" dirty="0" smtClean="0"/>
-              <a:t>和</a:t>
-            </a:r>
-            <a:endParaRPr lang="en-US" altLang="zh-CN" dirty="0" smtClean="0"/>
-          </a:p>
-          <a:p>
-            <a:pPr lvl="1"/>
-            <a:r>
-              <a:rPr lang="zh-CN" altLang="en-US" dirty="0" smtClean="0"/>
-              <a:t>基</a:t>
-            </a:r>
-            <a:r>
-              <a:rPr lang="zh-CN" altLang="en-US" dirty="0" smtClean="0"/>
-              <a:t>本数学运算</a:t>
+              <a:t>基本数学运算</a:t>
             </a:r>
             <a:endParaRPr lang="en-US" altLang="zh-CN" dirty="0" smtClean="0"/>
           </a:p>
@@ -6156,13 +6686,13 @@
   <p:clrMapOvr>
     <a:masterClrMapping/>
   </p:clrMapOvr>
-  <mc:AlternateContent xmlns:mc="http://schemas.openxmlformats.org/markup-compatibility/2006">
-    <mc:Choice xmlns:p14="http://schemas.microsoft.com/office/powerpoint/2010/main" Requires="p14">
+  <mc:AlternateContent xmlns:mc="http://schemas.openxmlformats.org/markup-compatibility/2006" xmlns:p14="http://schemas.microsoft.com/office/powerpoint/2010/main">
+    <mc:Choice Requires="p14">
       <p:transition spd="med" p14:dur="700">
         <p:fade/>
       </p:transition>
     </mc:Choice>
-    <mc:Fallback>
+    <mc:Fallback xmlns="">
       <p:transition spd="med">
         <p:fade/>
       </p:transition>
@@ -6309,18 +6839,25 @@
   <p:clrMapOvr>
     <a:masterClrMapping/>
   </p:clrMapOvr>
-  <mc:AlternateContent xmlns:mc="http://schemas.openxmlformats.org/markup-compatibility/2006">
-    <mc:Choice xmlns:p14="http://schemas.microsoft.com/office/powerpoint/2010/main" Requires="p14">
+  <mc:AlternateContent xmlns:mc="http://schemas.openxmlformats.org/markup-compatibility/2006" xmlns:p14="http://schemas.microsoft.com/office/powerpoint/2010/main">
+    <mc:Choice Requires="p14">
       <p:transition spd="med" p14:dur="700">
         <p:fade/>
       </p:transition>
     </mc:Choice>
-    <mc:Fallback>
+    <mc:Fallback xmlns="">
       <p:transition spd="med">
         <p:fade/>
       </p:transition>
     </mc:Fallback>
   </mc:AlternateContent>
+  <p:timing>
+    <p:tnLst>
+      <p:par>
+        <p:cTn id="1" dur="indefinite" restart="never" nodeType="tmRoot"/>
+      </p:par>
+    </p:tnLst>
+  </p:timing>
 </p:sld>
 </file>
 
@@ -6496,18 +7033,25 @@
   <p:clrMapOvr>
     <a:masterClrMapping/>
   </p:clrMapOvr>
-  <mc:AlternateContent xmlns:mc="http://schemas.openxmlformats.org/markup-compatibility/2006">
-    <mc:Choice xmlns:p14="http://schemas.microsoft.com/office/powerpoint/2010/main" Requires="p14">
+  <mc:AlternateContent xmlns:mc="http://schemas.openxmlformats.org/markup-compatibility/2006" xmlns:p14="http://schemas.microsoft.com/office/powerpoint/2010/main">
+    <mc:Choice Requires="p14">
       <p:transition spd="med" p14:dur="700">
         <p:fade/>
       </p:transition>
     </mc:Choice>
-    <mc:Fallback>
+    <mc:Fallback xmlns="">
       <p:transition spd="med">
         <p:fade/>
       </p:transition>
     </mc:Fallback>
   </mc:AlternateContent>
+  <p:timing>
+    <p:tnLst>
+      <p:par>
+        <p:cTn id="1" dur="indefinite" restart="never" nodeType="tmRoot"/>
+      </p:par>
+    </p:tnLst>
+  </p:timing>
 </p:sld>
 </file>
 
@@ -6591,7 +7135,11 @@
           <a:p>
             <a:r>
               <a:rPr lang="zh-CN" altLang="en-US" dirty="0" smtClean="0"/>
-              <a:t>自动求和按钮</a:t>
+              <a:t>自动求和按</a:t>
+            </a:r>
+            <a:r>
+              <a:rPr lang="zh-CN" altLang="en-US" dirty="0" smtClean="0"/>
+              <a:t>钮</a:t>
             </a:r>
             <a:endParaRPr lang="en-US" altLang="zh-CN" dirty="0" smtClean="0"/>
           </a:p>
@@ -6702,7 +7250,23 @@
           <a:bodyPr/>
           <a:lstStyle/>
           <a:p>
-            <a:endParaRPr lang="zh-CN" altLang="en-US"/>
+            <a:r>
+              <a:rPr lang="en-US" altLang="zh-CN" dirty="0"/>
+              <a:t>Excel</a:t>
+            </a:r>
+            <a:r>
+              <a:rPr lang="zh-CN" altLang="en-US" dirty="0"/>
+              <a:t>动手实验室 </a:t>
+            </a:r>
+            <a:r>
+              <a:rPr lang="en-US" altLang="zh-CN" dirty="0" smtClean="0"/>
+              <a:t>– </a:t>
+            </a:r>
+            <a:r>
+              <a:rPr lang="zh-CN" altLang="en-US" dirty="0" smtClean="0"/>
+              <a:t>基本数学运算</a:t>
+            </a:r>
+            <a:endParaRPr lang="zh-CN" altLang="en-US" dirty="0"/>
           </a:p>
         </p:txBody>
       </p:sp>
@@ -6721,7 +7285,126 @@
           <a:bodyPr/>
           <a:lstStyle/>
           <a:p>
-            <a:endParaRPr lang="zh-CN" altLang="en-US"/>
+            <a:r>
+              <a:rPr lang="zh-CN" altLang="en-US" dirty="0" smtClean="0"/>
+              <a:t>基本数学运算</a:t>
+            </a:r>
+            <a:endParaRPr lang="en-US" altLang="zh-CN" dirty="0" smtClean="0"/>
+          </a:p>
+          <a:p>
+            <a:pPr lvl="1"/>
+            <a:r>
+              <a:rPr lang="en-US" altLang="zh-CN" dirty="0" smtClean="0"/>
+              <a:t>+</a:t>
+            </a:r>
+            <a:r>
+              <a:rPr lang="zh-CN" altLang="en-US" dirty="0" smtClean="0"/>
+              <a:t>，</a:t>
+            </a:r>
+            <a:r>
+              <a:rPr lang="en-US" altLang="zh-CN" dirty="0" smtClean="0"/>
+              <a:t>-</a:t>
+            </a:r>
+            <a:r>
+              <a:rPr lang="zh-CN" altLang="en-US" dirty="0" smtClean="0"/>
+              <a:t>，</a:t>
+            </a:r>
+            <a:r>
+              <a:rPr lang="en-US" altLang="zh-CN" dirty="0" smtClean="0"/>
+              <a:t>*</a:t>
+            </a:r>
+            <a:r>
+              <a:rPr lang="zh-CN" altLang="en-US" dirty="0" smtClean="0"/>
+              <a:t>，</a:t>
+            </a:r>
+            <a:r>
+              <a:rPr lang="en-US" altLang="zh-CN" dirty="0" smtClean="0"/>
+              <a:t>/</a:t>
+            </a:r>
+          </a:p>
+          <a:p>
+            <a:r>
+              <a:rPr lang="zh-CN" altLang="en-US" dirty="0"/>
+              <a:t>运</a:t>
+            </a:r>
+            <a:r>
+              <a:rPr lang="zh-CN" altLang="en-US" dirty="0" smtClean="0"/>
+              <a:t>算函数</a:t>
+            </a:r>
+            <a:endParaRPr lang="en-US" altLang="zh-CN" dirty="0" smtClean="0"/>
+          </a:p>
+          <a:p>
+            <a:pPr lvl="1"/>
+            <a:r>
+              <a:rPr lang="en-US" altLang="zh-CN" dirty="0" smtClean="0"/>
+              <a:t>SUM</a:t>
+            </a:r>
+            <a:r>
+              <a:rPr lang="zh-CN" altLang="en-US" dirty="0" smtClean="0"/>
+              <a:t>，</a:t>
+            </a:r>
+            <a:r>
+              <a:rPr lang="en-US" altLang="zh-CN" dirty="0" smtClean="0"/>
+              <a:t>PRODUCT</a:t>
+            </a:r>
+            <a:endParaRPr lang="en-US" altLang="zh-CN" dirty="0" smtClean="0"/>
+          </a:p>
+          <a:p>
+            <a:r>
+              <a:rPr lang="zh-CN" altLang="en-US" dirty="0"/>
+              <a:t>运算</a:t>
+            </a:r>
+            <a:r>
+              <a:rPr lang="zh-CN" altLang="en-US" dirty="0" smtClean="0"/>
+              <a:t>符顺</a:t>
+            </a:r>
+            <a:r>
+              <a:rPr lang="zh-CN" altLang="en-US" dirty="0" smtClean="0"/>
+              <a:t>序</a:t>
+            </a:r>
+            <a:endParaRPr lang="en-US" altLang="zh-CN" dirty="0" smtClean="0"/>
+          </a:p>
+          <a:p>
+            <a:pPr lvl="1"/>
+            <a:r>
+              <a:rPr lang="zh-CN" altLang="en-US" dirty="0" smtClean="0"/>
+              <a:t>括号</a:t>
+            </a:r>
+            <a:r>
+              <a:rPr lang="zh-CN" altLang="en-US" dirty="0" smtClean="0"/>
+              <a:t>，</a:t>
+            </a:r>
+            <a:r>
+              <a:rPr lang="zh-CN" altLang="en-US" dirty="0"/>
+              <a:t>指</a:t>
+            </a:r>
+            <a:r>
+              <a:rPr lang="zh-CN" altLang="en-US" dirty="0" smtClean="0"/>
+              <a:t>数，</a:t>
+            </a:r>
+            <a:r>
+              <a:rPr lang="zh-CN" altLang="en-US" dirty="0"/>
+              <a:t>乘</a:t>
+            </a:r>
+            <a:r>
+              <a:rPr lang="zh-CN" altLang="en-US" dirty="0" smtClean="0"/>
+              <a:t>除，加减，从左往右</a:t>
+            </a:r>
+            <a:endParaRPr lang="en-US" altLang="zh-CN" dirty="0"/>
+          </a:p>
+          <a:p>
+            <a:r>
+              <a:rPr lang="zh-CN" altLang="en-US" dirty="0"/>
+              <a:t>组合</a:t>
+            </a:r>
+            <a:r>
+              <a:rPr lang="zh-CN" altLang="en-US" dirty="0" smtClean="0"/>
+              <a:t>公式</a:t>
+            </a:r>
+            <a:endParaRPr lang="en-US" altLang="zh-CN" dirty="0" smtClean="0"/>
+          </a:p>
+          <a:p>
+            <a:endParaRPr lang="en-US" altLang="zh-CN" dirty="0"/>
           </a:p>
         </p:txBody>
       </p:sp>
@@ -7008,4 +7691,265 @@
     </a:ext>
   </a:extLst>
 </a:theme>
+</file>
+
+<file path=ppt/theme/theme2.xml><?xml version="1.0" encoding="utf-8"?>
+<a:theme xmlns:a="http://schemas.openxmlformats.org/drawingml/2006/main" name="Office Theme">
+  <a:themeElements>
+    <a:clrScheme name="Office">
+      <a:dk1>
+        <a:sysClr val="windowText" lastClr="000000"/>
+      </a:dk1>
+      <a:lt1>
+        <a:sysClr val="window" lastClr="FFFFFF"/>
+      </a:lt1>
+      <a:dk2>
+        <a:srgbClr val="44546A"/>
+      </a:dk2>
+      <a:lt2>
+        <a:srgbClr val="E7E6E6"/>
+      </a:lt2>
+      <a:accent1>
+        <a:srgbClr val="5B9BD5"/>
+      </a:accent1>
+      <a:accent2>
+        <a:srgbClr val="ED7D31"/>
+      </a:accent2>
+      <a:accent3>
+        <a:srgbClr val="A5A5A5"/>
+      </a:accent3>
+      <a:accent4>
+        <a:srgbClr val="FFC000"/>
+      </a:accent4>
+      <a:accent5>
+        <a:srgbClr val="4472C4"/>
+      </a:accent5>
+      <a:accent6>
+        <a:srgbClr val="70AD47"/>
+      </a:accent6>
+      <a:hlink>
+        <a:srgbClr val="0563C1"/>
+      </a:hlink>
+      <a:folHlink>
+        <a:srgbClr val="954F72"/>
+      </a:folHlink>
+    </a:clrScheme>
+    <a:fontScheme name="Office">
+      <a:majorFont>
+        <a:latin typeface="Calibri Light" panose="020F0302020204030204"/>
+        <a:ea typeface=""/>
+        <a:cs typeface=""/>
+        <a:font script="Jpan" typeface="ＭＳ Ｐゴシック"/>
+        <a:font script="Hang" typeface="맑은 고딕"/>
+        <a:font script="Hans" typeface="宋体"/>
+        <a:font script="Hant" typeface="新細明體"/>
+        <a:font script="Arab" typeface="Times New Roman"/>
+        <a:font script="Hebr" typeface="Times New Roman"/>
+        <a:font script="Thai" typeface="Angsana New"/>
+        <a:font script="Ethi" typeface="Nyala"/>
+        <a:font script="Beng" typeface="Vrinda"/>
+        <a:font script="Gujr" typeface="Shruti"/>
+        <a:font script="Khmr" typeface="MoolBoran"/>
+        <a:font script="Knda" typeface="Tunga"/>
+        <a:font script="Guru" typeface="Raavi"/>
+        <a:font script="Cans" typeface="Euphemia"/>
+        <a:font script="Cher" typeface="Plantagenet Cherokee"/>
+        <a:font script="Yiii" typeface="Microsoft Yi Baiti"/>
+        <a:font script="Tibt" typeface="Microsoft Himalaya"/>
+        <a:font script="Thaa" typeface="MV Boli"/>
+        <a:font script="Deva" typeface="Mangal"/>
+        <a:font script="Telu" typeface="Gautami"/>
+        <a:font script="Taml" typeface="Latha"/>
+        <a:font script="Syrc" typeface="Estrangelo Edessa"/>
+        <a:font script="Orya" typeface="Kalinga"/>
+        <a:font script="Mlym" typeface="Kartika"/>
+        <a:font script="Laoo" typeface="DokChampa"/>
+        <a:font script="Sinh" typeface="Iskoola Pota"/>
+        <a:font script="Mong" typeface="Mongolian Baiti"/>
+        <a:font script="Viet" typeface="Times New Roman"/>
+        <a:font script="Uigh" typeface="Microsoft Uighur"/>
+        <a:font script="Geor" typeface="Sylfaen"/>
+      </a:majorFont>
+      <a:minorFont>
+        <a:latin typeface="Calibri" panose="020F0502020204030204"/>
+        <a:ea typeface=""/>
+        <a:cs typeface=""/>
+        <a:font script="Jpan" typeface="ＭＳ Ｐゴシック"/>
+        <a:font script="Hang" typeface="맑은 고딕"/>
+        <a:font script="Hans" typeface="宋体"/>
+        <a:font script="Hant" typeface="新細明體"/>
+        <a:font script="Arab" typeface="Arial"/>
+        <a:font script="Hebr" typeface="Arial"/>
+        <a:font script="Thai" typeface="Cordia New"/>
+        <a:font script="Ethi" typeface="Nyala"/>
+        <a:font script="Beng" typeface="Vrinda"/>
+        <a:font script="Gujr" typeface="Shruti"/>
+        <a:font script="Khmr" typeface="DaunPenh"/>
+        <a:font script="Knda" typeface="Tunga"/>
+        <a:font script="Guru" typeface="Raavi"/>
+        <a:font script="Cans" typeface="Euphemia"/>
+        <a:font script="Cher" typeface="Plantagenet Cherokee"/>
+        <a:font script="Yiii" typeface="Microsoft Yi Baiti"/>
+        <a:font script="Tibt" typeface="Microsoft Himalaya"/>
+        <a:font script="Thaa" typeface="MV Boli"/>
+        <a:font script="Deva" typeface="Mangal"/>
+        <a:font script="Telu" typeface="Gautami"/>
+        <a:font script="Taml" typeface="Latha"/>
+        <a:font script="Syrc" typeface="Estrangelo Edessa"/>
+        <a:font script="Orya" typeface="Kalinga"/>
+        <a:font script="Mlym" typeface="Kartika"/>
+        <a:font script="Laoo" typeface="DokChampa"/>
+        <a:font script="Sinh" typeface="Iskoola Pota"/>
+        <a:font script="Mong" typeface="Mongolian Baiti"/>
+        <a:font script="Viet" typeface="Arial"/>
+        <a:font script="Uigh" typeface="Microsoft Uighur"/>
+        <a:font script="Geor" typeface="Sylfaen"/>
+      </a:minorFont>
+    </a:fontScheme>
+    <a:fmtScheme name="Office">
+      <a:fillStyleLst>
+        <a:solidFill>
+          <a:schemeClr val="phClr"/>
+        </a:solidFill>
+        <a:gradFill rotWithShape="1">
+          <a:gsLst>
+            <a:gs pos="0">
+              <a:schemeClr val="phClr">
+                <a:lumMod val="110000"/>
+                <a:satMod val="105000"/>
+                <a:tint val="67000"/>
+              </a:schemeClr>
+            </a:gs>
+            <a:gs pos="50000">
+              <a:schemeClr val="phClr">
+                <a:lumMod val="105000"/>
+                <a:satMod val="103000"/>
+                <a:tint val="73000"/>
+              </a:schemeClr>
+            </a:gs>
+            <a:gs pos="100000">
+              <a:schemeClr val="phClr">
+                <a:lumMod val="105000"/>
+                <a:satMod val="109000"/>
+                <a:tint val="81000"/>
+              </a:schemeClr>
+            </a:gs>
+          </a:gsLst>
+          <a:lin ang="5400000" scaled="0"/>
+        </a:gradFill>
+        <a:gradFill rotWithShape="1">
+          <a:gsLst>
+            <a:gs pos="0">
+              <a:schemeClr val="phClr">
+                <a:satMod val="103000"/>
+                <a:lumMod val="102000"/>
+                <a:tint val="94000"/>
+              </a:schemeClr>
+            </a:gs>
+            <a:gs pos="50000">
+              <a:schemeClr val="phClr">
+                <a:satMod val="110000"/>
+                <a:lumMod val="100000"/>
+                <a:shade val="100000"/>
+              </a:schemeClr>
+            </a:gs>
+            <a:gs pos="100000">
+              <a:schemeClr val="phClr">
+                <a:lumMod val="99000"/>
+                <a:satMod val="120000"/>
+                <a:shade val="78000"/>
+              </a:schemeClr>
+            </a:gs>
+          </a:gsLst>
+          <a:lin ang="5400000" scaled="0"/>
+        </a:gradFill>
+      </a:fillStyleLst>
+      <a:lnStyleLst>
+        <a:ln w="6350" cap="flat" cmpd="sng" algn="ctr">
+          <a:solidFill>
+            <a:schemeClr val="phClr"/>
+          </a:solidFill>
+          <a:prstDash val="solid"/>
+          <a:miter lim="800000"/>
+        </a:ln>
+        <a:ln w="12700" cap="flat" cmpd="sng" algn="ctr">
+          <a:solidFill>
+            <a:schemeClr val="phClr"/>
+          </a:solidFill>
+          <a:prstDash val="solid"/>
+          <a:miter lim="800000"/>
+        </a:ln>
+        <a:ln w="19050" cap="flat" cmpd="sng" algn="ctr">
+          <a:solidFill>
+            <a:schemeClr val="phClr"/>
+          </a:solidFill>
+          <a:prstDash val="solid"/>
+          <a:miter lim="800000"/>
+        </a:ln>
+      </a:lnStyleLst>
+      <a:effectStyleLst>
+        <a:effectStyle>
+          <a:effectLst/>
+        </a:effectStyle>
+        <a:effectStyle>
+          <a:effectLst/>
+        </a:effectStyle>
+        <a:effectStyle>
+          <a:effectLst>
+            <a:outerShdw blurRad="57150" dist="19050" dir="5400000" algn="ctr" rotWithShape="0">
+              <a:srgbClr val="000000">
+                <a:alpha val="63000"/>
+              </a:srgbClr>
+            </a:outerShdw>
+          </a:effectLst>
+        </a:effectStyle>
+      </a:effectStyleLst>
+      <a:bgFillStyleLst>
+        <a:solidFill>
+          <a:schemeClr val="phClr"/>
+        </a:solidFill>
+        <a:solidFill>
+          <a:schemeClr val="phClr">
+            <a:tint val="95000"/>
+            <a:satMod val="170000"/>
+          </a:schemeClr>
+        </a:solidFill>
+        <a:gradFill rotWithShape="1">
+          <a:gsLst>
+            <a:gs pos="0">
+              <a:schemeClr val="phClr">
+                <a:tint val="93000"/>
+                <a:satMod val="150000"/>
+                <a:shade val="98000"/>
+                <a:lumMod val="102000"/>
+              </a:schemeClr>
+            </a:gs>
+            <a:gs pos="50000">
+              <a:schemeClr val="phClr">
+                <a:tint val="98000"/>
+                <a:satMod val="130000"/>
+                <a:shade val="90000"/>
+                <a:lumMod val="103000"/>
+              </a:schemeClr>
+            </a:gs>
+            <a:gs pos="100000">
+              <a:schemeClr val="phClr">
+                <a:shade val="63000"/>
+                <a:satMod val="120000"/>
+              </a:schemeClr>
+            </a:gs>
+          </a:gsLst>
+          <a:lin ang="5400000" scaled="0"/>
+        </a:gradFill>
+      </a:bgFillStyleLst>
+    </a:fmtScheme>
+  </a:themeElements>
+  <a:objectDefaults/>
+  <a:extraClrSchemeLst/>
+  <a:extLst>
+    <a:ext uri="{05A4C25C-085E-4340-85A3-A5531E510DB2}">
+      <thm15:themeFamily xmlns:thm15="http://schemas.microsoft.com/office/thememl/2012/main" name="Office Theme" id="{62F939B6-93AF-4DB8-9C6B-D6C7DFDC589F}" vid="{4A3C46E8-61CC-4603-A589-7422A47A8E4A}"/>
+    </a:ext>
+  </a:extLst>
+</a:theme>
 </file>
</xml_diff>

<commit_message>
Complete chapter "Create a Chart"
</commit_message>
<xml_diff>
--- a/Excel动手实验室.pptx
+++ b/Excel动手实验室.pptx
@@ -5,7 +5,7 @@
     <p:sldMasterId id="2147483648" r:id="rId1"/>
   </p:sldMasterIdLst>
   <p:notesMasterIdLst>
-    <p:notesMasterId r:id="rId8"/>
+    <p:notesMasterId r:id="rId9"/>
   </p:notesMasterIdLst>
   <p:sldIdLst>
     <p:sldId id="256" r:id="rId2"/>
@@ -14,6 +14,7 @@
     <p:sldId id="259" r:id="rId5"/>
     <p:sldId id="260" r:id="rId6"/>
     <p:sldId id="261" r:id="rId7"/>
+    <p:sldId id="262" r:id="rId8"/>
   </p:sldIdLst>
   <p:sldSz cx="12192000" cy="6858000"/>
   <p:notesSz cx="6858000" cy="9144000"/>
@@ -645,6 +646,94 @@
     <p:extLst>
       <p:ext uri="{BB962C8B-B14F-4D97-AF65-F5344CB8AC3E}">
         <p14:creationId xmlns:p14="http://schemas.microsoft.com/office/powerpoint/2010/main" val="1598881060"/>
+      </p:ext>
+    </p:extLst>
+  </p:cSld>
+  <p:clrMapOvr>
+    <a:masterClrMapping/>
+  </p:clrMapOvr>
+</p:notes>
+</file>
+
+<file path=ppt/notesSlides/notesSlide3.xml><?xml version="1.0" encoding="utf-8"?>
+<p:notes xmlns:a="http://schemas.openxmlformats.org/drawingml/2006/main" xmlns:r="http://schemas.openxmlformats.org/officeDocument/2006/relationships" xmlns:p="http://schemas.openxmlformats.org/presentationml/2006/main">
+  <p:cSld>
+    <p:spTree>
+      <p:nvGrpSpPr>
+        <p:cNvPr id="1" name=""/>
+        <p:cNvGrpSpPr/>
+        <p:nvPr/>
+      </p:nvGrpSpPr>
+      <p:grpSpPr>
+        <a:xfrm>
+          <a:off x="0" y="0"/>
+          <a:ext cx="0" cy="0"/>
+          <a:chOff x="0" y="0"/>
+          <a:chExt cx="0" cy="0"/>
+        </a:xfrm>
+      </p:grpSpPr>
+      <p:sp>
+        <p:nvSpPr>
+          <p:cNvPr id="2" name="Slide Image Placeholder 1"/>
+          <p:cNvSpPr>
+            <a:spLocks noGrp="1" noRot="1" noChangeAspect="1"/>
+          </p:cNvSpPr>
+          <p:nvPr>
+            <p:ph type="sldImg"/>
+          </p:nvPr>
+        </p:nvSpPr>
+        <p:spPr/>
+      </p:sp>
+      <p:sp>
+        <p:nvSpPr>
+          <p:cNvPr id="3" name="Notes Placeholder 2"/>
+          <p:cNvSpPr>
+            <a:spLocks noGrp="1"/>
+          </p:cNvSpPr>
+          <p:nvPr>
+            <p:ph type="body" idx="1"/>
+          </p:nvPr>
+        </p:nvSpPr>
+        <p:spPr/>
+        <p:txBody>
+          <a:bodyPr/>
+          <a:lstStyle/>
+          <a:p>
+            <a:r>
+              <a:rPr lang="zh-CN" altLang="en-US" dirty="0" smtClean="0"/>
+              <a:t>快速分析</a:t>
+            </a:r>
+            <a:endParaRPr lang="zh-CN" altLang="en-US" dirty="0"/>
+          </a:p>
+        </p:txBody>
+      </p:sp>
+      <p:sp>
+        <p:nvSpPr>
+          <p:cNvPr id="4" name="Slide Number Placeholder 3"/>
+          <p:cNvSpPr>
+            <a:spLocks noGrp="1"/>
+          </p:cNvSpPr>
+          <p:nvPr>
+            <p:ph type="sldNum" sz="quarter" idx="10"/>
+          </p:nvPr>
+        </p:nvSpPr>
+        <p:spPr/>
+        <p:txBody>
+          <a:bodyPr/>
+          <a:lstStyle/>
+          <a:p>
+            <a:fld id="{287A8CE8-17C0-4AF5-9FA8-F8884093900A}" type="slidenum">
+              <a:rPr lang="zh-CN" altLang="en-US" smtClean="0"/>
+              <a:t>7</a:t>
+            </a:fld>
+            <a:endParaRPr lang="zh-CN" altLang="en-US"/>
+          </a:p>
+        </p:txBody>
+      </p:sp>
+    </p:spTree>
+    <p:extLst>
+      <p:ext uri="{BB962C8B-B14F-4D97-AF65-F5344CB8AC3E}">
+        <p14:creationId xmlns:p14="http://schemas.microsoft.com/office/powerpoint/2010/main" val="2314056287"/>
       </p:ext>
     </p:extLst>
   </p:cSld>
@@ -7135,11 +7224,7 @@
           <a:p>
             <a:r>
               <a:rPr lang="zh-CN" altLang="en-US" dirty="0" smtClean="0"/>
-              <a:t>自动求和按</a:t>
-            </a:r>
-            <a:r>
-              <a:rPr lang="zh-CN" altLang="en-US" dirty="0" smtClean="0"/>
-              <a:t>钮</a:t>
+              <a:t>自动求和按钮</a:t>
             </a:r>
             <a:endParaRPr lang="en-US" altLang="zh-CN" dirty="0" smtClean="0"/>
           </a:p>
@@ -7347,7 +7432,6 @@
               <a:rPr lang="en-US" altLang="zh-CN" dirty="0" smtClean="0"/>
               <a:t>PRODUCT</a:t>
             </a:r>
-            <a:endParaRPr lang="en-US" altLang="zh-CN" dirty="0" smtClean="0"/>
           </a:p>
           <a:p>
             <a:r>
@@ -7356,23 +7440,15 @@
             </a:r>
             <a:r>
               <a:rPr lang="zh-CN" altLang="en-US" dirty="0" smtClean="0"/>
-              <a:t>符顺</a:t>
-            </a:r>
+              <a:t>符顺序</a:t>
+            </a:r>
+            <a:endParaRPr lang="en-US" altLang="zh-CN" dirty="0" smtClean="0"/>
+          </a:p>
+          <a:p>
+            <a:pPr lvl="1"/>
             <a:r>
               <a:rPr lang="zh-CN" altLang="en-US" dirty="0" smtClean="0"/>
-              <a:t>序</a:t>
-            </a:r>
-            <a:endParaRPr lang="en-US" altLang="zh-CN" dirty="0" smtClean="0"/>
-          </a:p>
-          <a:p>
-            <a:pPr lvl="1"/>
-            <a:r>
-              <a:rPr lang="zh-CN" altLang="en-US" dirty="0" smtClean="0"/>
-              <a:t>括号</a:t>
-            </a:r>
-            <a:r>
-              <a:rPr lang="zh-CN" altLang="en-US" dirty="0" smtClean="0"/>
-              <a:t>，</a:t>
+              <a:t>括号，</a:t>
             </a:r>
             <a:r>
               <a:rPr lang="zh-CN" altLang="en-US" dirty="0"/>
@@ -7425,6 +7501,133 @@
       </p:par>
     </p:tnLst>
   </p:timing>
+</p:sld>
+</file>
+
+<file path=ppt/slides/slide7.xml><?xml version="1.0" encoding="utf-8"?>
+<p:sld xmlns:a="http://schemas.openxmlformats.org/drawingml/2006/main" xmlns:r="http://schemas.openxmlformats.org/officeDocument/2006/relationships" xmlns:p="http://schemas.openxmlformats.org/presentationml/2006/main">
+  <p:cSld>
+    <p:spTree>
+      <p:nvGrpSpPr>
+        <p:cNvPr id="1" name=""/>
+        <p:cNvGrpSpPr/>
+        <p:nvPr/>
+      </p:nvGrpSpPr>
+      <p:grpSpPr>
+        <a:xfrm>
+          <a:off x="0" y="0"/>
+          <a:ext cx="0" cy="0"/>
+          <a:chOff x="0" y="0"/>
+          <a:chExt cx="0" cy="0"/>
+        </a:xfrm>
+      </p:grpSpPr>
+      <p:sp>
+        <p:nvSpPr>
+          <p:cNvPr id="2" name="Title 1"/>
+          <p:cNvSpPr>
+            <a:spLocks noGrp="1"/>
+          </p:cNvSpPr>
+          <p:nvPr>
+            <p:ph type="title"/>
+          </p:nvPr>
+        </p:nvSpPr>
+        <p:spPr/>
+        <p:txBody>
+          <a:bodyPr/>
+          <a:lstStyle/>
+          <a:p>
+            <a:r>
+              <a:rPr lang="en-US" altLang="zh-CN" dirty="0" smtClean="0"/>
+              <a:t>Excel</a:t>
+            </a:r>
+            <a:r>
+              <a:rPr lang="zh-CN" altLang="en-US" dirty="0" smtClean="0"/>
+              <a:t>动手实验室 </a:t>
+            </a:r>
+            <a:r>
+              <a:rPr lang="en-US" altLang="zh-CN" dirty="0" smtClean="0"/>
+              <a:t>– </a:t>
+            </a:r>
+            <a:r>
+              <a:rPr lang="zh-CN" altLang="en-US" dirty="0" smtClean="0"/>
+              <a:t>创建图表</a:t>
+            </a:r>
+            <a:endParaRPr lang="zh-CN" altLang="en-US" dirty="0"/>
+          </a:p>
+        </p:txBody>
+      </p:sp>
+      <p:sp>
+        <p:nvSpPr>
+          <p:cNvPr id="3" name="Content Placeholder 2"/>
+          <p:cNvSpPr>
+            <a:spLocks noGrp="1"/>
+          </p:cNvSpPr>
+          <p:nvPr>
+            <p:ph idx="1"/>
+          </p:nvPr>
+        </p:nvSpPr>
+        <p:spPr/>
+        <p:txBody>
+          <a:bodyPr/>
+          <a:lstStyle/>
+          <a:p>
+            <a:r>
+              <a:rPr lang="zh-CN" altLang="en-US" dirty="0" smtClean="0"/>
+              <a:t>创建图表</a:t>
+            </a:r>
+            <a:endParaRPr lang="en-US" altLang="zh-CN" dirty="0" smtClean="0"/>
+          </a:p>
+          <a:p>
+            <a:r>
+              <a:rPr lang="zh-CN" altLang="en-US" dirty="0" smtClean="0"/>
+              <a:t>创建饼图，条形图，折线图</a:t>
+            </a:r>
+            <a:endParaRPr lang="en-US" altLang="zh-CN" dirty="0" smtClean="0"/>
+          </a:p>
+          <a:p>
+            <a:r>
+              <a:rPr lang="zh-CN" altLang="en-US" dirty="0"/>
+              <a:t>自定义</a:t>
+            </a:r>
+            <a:r>
+              <a:rPr lang="zh-CN" altLang="en-US" dirty="0" smtClean="0"/>
+              <a:t>图表</a:t>
+            </a:r>
+            <a:endParaRPr lang="en-US" altLang="zh-CN" dirty="0" smtClean="0"/>
+          </a:p>
+          <a:p>
+            <a:r>
+              <a:rPr lang="zh-CN" altLang="en-US" dirty="0" smtClean="0"/>
+              <a:t>创建组合图</a:t>
+            </a:r>
+            <a:endParaRPr lang="en-US" altLang="zh-CN" dirty="0" smtClean="0"/>
+          </a:p>
+          <a:p>
+            <a:r>
+              <a:rPr lang="zh-CN" altLang="en-US" dirty="0"/>
+              <a:t>复</a:t>
+            </a:r>
+            <a:r>
+              <a:rPr lang="zh-CN" altLang="en-US" dirty="0" smtClean="0"/>
+              <a:t>制图表</a:t>
+            </a:r>
+            <a:endParaRPr lang="en-US" altLang="zh-CN" dirty="0" smtClean="0"/>
+          </a:p>
+          <a:p>
+            <a:endParaRPr lang="en-US" altLang="zh-CN" dirty="0" smtClean="0"/>
+          </a:p>
+        </p:txBody>
+      </p:sp>
+    </p:spTree>
+    <p:extLst>
+      <p:ext uri="{BB962C8B-B14F-4D97-AF65-F5344CB8AC3E}">
+        <p14:creationId xmlns:p14="http://schemas.microsoft.com/office/powerpoint/2010/main" val="3097252939"/>
+      </p:ext>
+    </p:extLst>
+  </p:cSld>
+  <p:clrMapOvr>
+    <a:masterClrMapping/>
+  </p:clrMapOvr>
 </p:sld>
 </file>
 

</xml_diff>

<commit_message>
Complete the "Intruduce to Excel"
</commit_message>
<xml_diff>
--- a/Excel动手实验室.pptx
+++ b/Excel动手实验室.pptx
@@ -5,16 +5,17 @@
     <p:sldMasterId id="2147483648" r:id="rId1"/>
   </p:sldMasterIdLst>
   <p:notesMasterIdLst>
-    <p:notesMasterId r:id="rId9"/>
+    <p:notesMasterId r:id="rId10"/>
   </p:notesMasterIdLst>
   <p:sldIdLst>
     <p:sldId id="256" r:id="rId2"/>
-    <p:sldId id="257" r:id="rId3"/>
-    <p:sldId id="258" r:id="rId4"/>
-    <p:sldId id="259" r:id="rId5"/>
-    <p:sldId id="260" r:id="rId6"/>
-    <p:sldId id="261" r:id="rId7"/>
-    <p:sldId id="262" r:id="rId8"/>
+    <p:sldId id="263" r:id="rId3"/>
+    <p:sldId id="257" r:id="rId4"/>
+    <p:sldId id="258" r:id="rId5"/>
+    <p:sldId id="259" r:id="rId6"/>
+    <p:sldId id="260" r:id="rId7"/>
+    <p:sldId id="261" r:id="rId8"/>
+    <p:sldId id="262" r:id="rId9"/>
   </p:sldIdLst>
   <p:sldSz cx="12192000" cy="6858000"/>
   <p:notesSz cx="6858000" cy="9144000"/>
@@ -544,7 +545,7 @@
           <a:p>
             <a:fld id="{287A8CE8-17C0-4AF5-9FA8-F8884093900A}" type="slidenum">
               <a:rPr lang="zh-CN" altLang="en-US" smtClean="0"/>
-              <a:t>5</a:t>
+              <a:t>6</a:t>
             </a:fld>
             <a:endParaRPr lang="zh-CN" altLang="en-US"/>
           </a:p>
@@ -636,7 +637,7 @@
           <a:p>
             <a:fld id="{287A8CE8-17C0-4AF5-9FA8-F8884093900A}" type="slidenum">
               <a:rPr lang="zh-CN" altLang="en-US" smtClean="0"/>
-              <a:t>6</a:t>
+              <a:t>7</a:t>
             </a:fld>
             <a:endParaRPr lang="zh-CN" altLang="en-US"/>
           </a:p>
@@ -724,7 +725,7 @@
           <a:p>
             <a:fld id="{287A8CE8-17C0-4AF5-9FA8-F8884093900A}" type="slidenum">
               <a:rPr lang="zh-CN" altLang="en-US" smtClean="0"/>
-              <a:t>7</a:t>
+              <a:t>8</a:t>
             </a:fld>
             <a:endParaRPr lang="zh-CN" altLang="en-US"/>
           </a:p>
@@ -6669,12 +6670,24 @@
           <a:lstStyle/>
           <a:p>
             <a:r>
+              <a:rPr lang="en-US" altLang="zh-CN" dirty="0"/>
+              <a:t>Excel</a:t>
+            </a:r>
+            <a:r>
+              <a:rPr lang="zh-CN" altLang="en-US" dirty="0"/>
+              <a:t>动手实验</a:t>
+            </a:r>
+            <a:r>
+              <a:rPr lang="zh-CN" altLang="en-US" dirty="0" smtClean="0"/>
+              <a:t>室 </a:t>
+            </a:r>
+            <a:r>
               <a:rPr lang="en-US" altLang="zh-CN" dirty="0" smtClean="0"/>
-              <a:t>Excel</a:t>
+              <a:t>– </a:t>
             </a:r>
             <a:r>
               <a:rPr lang="zh-CN" altLang="en-US" dirty="0" smtClean="0"/>
-              <a:t>动手实验室</a:t>
+              <a:t>简介</a:t>
             </a:r>
             <a:endParaRPr lang="zh-CN" altLang="en-US" dirty="0"/>
           </a:p>
@@ -6692,75 +6705,88 @@
         </p:nvSpPr>
         <p:spPr/>
         <p:txBody>
-          <a:bodyPr>
-            <a:normAutofit/>
-          </a:bodyPr>
-          <a:lstStyle/>
-          <a:p>
+          <a:bodyPr/>
+          <a:lstStyle/>
+          <a:p>
+            <a:r>
+              <a:rPr lang="zh-CN" altLang="en-US" dirty="0" smtClean="0"/>
+              <a:t>基本介绍</a:t>
+            </a:r>
+            <a:endParaRPr lang="en-US" altLang="zh-CN" dirty="0" smtClean="0"/>
+          </a:p>
+          <a:p>
+            <a:pPr lvl="1"/>
+            <a:r>
+              <a:rPr lang="zh-CN" altLang="en-US" dirty="0" smtClean="0"/>
+              <a:t>界面，单元格格式，格式化为表格，表</a:t>
+            </a:r>
             <a:r>
               <a:rPr lang="zh-CN" altLang="en-US" dirty="0"/>
-              <a:t>初</a:t>
+              <a:t>格设</a:t>
             </a:r>
             <a:r>
               <a:rPr lang="zh-CN" altLang="en-US" dirty="0" smtClean="0"/>
-              <a:t>级</a:t>
+              <a:t>计，单元格样式</a:t>
             </a:r>
             <a:endParaRPr lang="en-US" altLang="zh-CN" dirty="0" smtClean="0"/>
           </a:p>
           <a:p>
+            <a:r>
+              <a:rPr lang="zh-CN" altLang="en-US" dirty="0" smtClean="0"/>
+              <a:t>行列操作</a:t>
+            </a:r>
+            <a:endParaRPr lang="en-US" altLang="zh-CN" dirty="0" smtClean="0"/>
+          </a:p>
+          <a:p>
             <a:pPr lvl="1"/>
             <a:r>
               <a:rPr lang="zh-CN" altLang="en-US" dirty="0"/>
-              <a:t>对数</a:t>
+              <a:t>插</a:t>
             </a:r>
             <a:r>
               <a:rPr lang="zh-CN" altLang="en-US" dirty="0" smtClean="0"/>
-              <a:t>字求和</a:t>
+              <a:t>入，删除，移动，复制，粘贴</a:t>
             </a:r>
             <a:endParaRPr lang="en-US" altLang="zh-CN" dirty="0" smtClean="0"/>
           </a:p>
           <a:p>
+            <a:r>
+              <a:rPr lang="zh-CN" altLang="en-US" dirty="0" smtClean="0"/>
+              <a:t>公式</a:t>
+            </a:r>
+            <a:endParaRPr lang="en-US" altLang="zh-CN" dirty="0" smtClean="0"/>
+          </a:p>
+          <a:p>
             <a:pPr lvl="1"/>
             <a:r>
+              <a:rPr lang="zh-CN" altLang="en-US" dirty="0"/>
+              <a:t>求</a:t>
+            </a:r>
+            <a:r>
               <a:rPr lang="zh-CN" altLang="en-US" dirty="0" smtClean="0"/>
-              <a:t>基本数学运算</a:t>
+              <a:t>和，计算 </a:t>
             </a:r>
             <a:endParaRPr lang="en-US" altLang="zh-CN" dirty="0" smtClean="0"/>
           </a:p>
           <a:p>
+            <a:r>
+              <a:rPr lang="zh-CN" altLang="en-US" dirty="0" smtClean="0"/>
+              <a:t>引用</a:t>
+            </a:r>
+            <a:endParaRPr lang="en-US" altLang="zh-CN" dirty="0" smtClean="0"/>
+          </a:p>
+          <a:p>
             <a:pPr lvl="1"/>
             <a:r>
               <a:rPr lang="zh-CN" altLang="en-US" dirty="0" smtClean="0"/>
-              <a:t>创建图表</a:t>
-            </a:r>
-            <a:endParaRPr lang="en-US" altLang="zh-CN" dirty="0"/>
-          </a:p>
-          <a:p>
-            <a:pPr lvl="1"/>
-            <a:r>
-              <a:rPr lang="zh-CN" altLang="en-US" dirty="0" smtClean="0"/>
-              <a:t>冻结或锁定窗格</a:t>
+              <a:t>相对引用，绝对引用</a:t>
             </a:r>
             <a:endParaRPr lang="en-US" altLang="zh-CN" dirty="0" smtClean="0"/>
           </a:p>
           <a:p>
-            <a:pPr lvl="1"/>
-            <a:r>
-              <a:rPr lang="zh-CN" altLang="en-US" dirty="0" smtClean="0"/>
-              <a:t>自动填从 </a:t>
-            </a:r>
-            <a:r>
-              <a:rPr lang="en-US" altLang="zh-CN" dirty="0" smtClean="0"/>
-              <a:t>&amp; </a:t>
-            </a:r>
-            <a:r>
-              <a:rPr lang="zh-CN" altLang="en-US" dirty="0" smtClean="0"/>
-              <a:t>快速填充</a:t>
-            </a:r>
             <a:endParaRPr lang="en-US" altLang="zh-CN" dirty="0" smtClean="0"/>
           </a:p>
           <a:p>
-            <a:pPr lvl="1"/>
             <a:endParaRPr lang="zh-CN" altLang="en-US" dirty="0"/>
           </a:p>
         </p:txBody>
@@ -6768,32 +6794,13 @@
     </p:spTree>
     <p:extLst>
       <p:ext uri="{BB962C8B-B14F-4D97-AF65-F5344CB8AC3E}">
-        <p14:creationId xmlns:p14="http://schemas.microsoft.com/office/powerpoint/2010/main" val="3992487303"/>
+        <p14:creationId xmlns:p14="http://schemas.microsoft.com/office/powerpoint/2010/main" val="4085697418"/>
       </p:ext>
     </p:extLst>
   </p:cSld>
   <p:clrMapOvr>
     <a:masterClrMapping/>
   </p:clrMapOvr>
-  <mc:AlternateContent xmlns:mc="http://schemas.openxmlformats.org/markup-compatibility/2006" xmlns:p14="http://schemas.microsoft.com/office/powerpoint/2010/main">
-    <mc:Choice Requires="p14">
-      <p:transition spd="med" p14:dur="700">
-        <p:fade/>
-      </p:transition>
-    </mc:Choice>
-    <mc:Fallback xmlns="">
-      <p:transition spd="med">
-        <p:fade/>
-      </p:transition>
-    </mc:Fallback>
-  </mc:AlternateContent>
-  <p:timing>
-    <p:tnLst>
-      <p:par>
-        <p:cTn id="1" dur="indefinite" restart="never" nodeType="tmRoot"/>
-      </p:par>
-    </p:tnLst>
-  </p:timing>
 </p:sld>
 </file>
 
@@ -6830,98 +6837,106 @@
           <a:lstStyle/>
           <a:p>
             <a:r>
-              <a:rPr lang="en-US" altLang="zh-CN" dirty="0"/>
+              <a:rPr lang="en-US" altLang="zh-CN" dirty="0" smtClean="0"/>
               <a:t>Excel</a:t>
             </a:r>
             <a:r>
+              <a:rPr lang="zh-CN" altLang="en-US" dirty="0" smtClean="0"/>
+              <a:t>动手实验室</a:t>
+            </a:r>
+            <a:endParaRPr lang="zh-CN" altLang="en-US" dirty="0"/>
+          </a:p>
+        </p:txBody>
+      </p:sp>
+      <p:sp>
+        <p:nvSpPr>
+          <p:cNvPr id="3" name="Content Placeholder 2"/>
+          <p:cNvSpPr>
+            <a:spLocks noGrp="1"/>
+          </p:cNvSpPr>
+          <p:nvPr>
+            <p:ph idx="1"/>
+          </p:nvPr>
+        </p:nvSpPr>
+        <p:spPr/>
+        <p:txBody>
+          <a:bodyPr>
+            <a:normAutofit/>
+          </a:bodyPr>
+          <a:lstStyle/>
+          <a:p>
+            <a:r>
               <a:rPr lang="zh-CN" altLang="en-US" dirty="0"/>
-              <a:t>动手实验室</a:t>
-            </a:r>
-          </a:p>
-        </p:txBody>
-      </p:sp>
-      <p:sp>
-        <p:nvSpPr>
-          <p:cNvPr id="3" name="Content Placeholder 2"/>
-          <p:cNvSpPr>
-            <a:spLocks noGrp="1"/>
-          </p:cNvSpPr>
-          <p:nvPr>
-            <p:ph idx="1"/>
-          </p:nvPr>
-        </p:nvSpPr>
-        <p:spPr/>
-        <p:txBody>
-          <a:bodyPr/>
-          <a:lstStyle/>
-          <a:p>
+              <a:t>初</a:t>
+            </a:r>
             <a:r>
               <a:rPr lang="zh-CN" altLang="en-US" dirty="0" smtClean="0"/>
-              <a:t>中</a:t>
-            </a:r>
+              <a:t>级</a:t>
+            </a:r>
+            <a:endParaRPr lang="en-US" altLang="zh-CN" dirty="0" smtClean="0"/>
+          </a:p>
+          <a:p>
+            <a:pPr lvl="1"/>
             <a:r>
               <a:rPr lang="zh-CN" altLang="en-US" dirty="0"/>
-              <a:t>级</a:t>
+              <a:t>对数</a:t>
+            </a:r>
+            <a:r>
+              <a:rPr lang="zh-CN" altLang="en-US" dirty="0" smtClean="0"/>
+              <a:t>字求和</a:t>
+            </a:r>
+            <a:endParaRPr lang="en-US" altLang="zh-CN" dirty="0" smtClean="0"/>
+          </a:p>
+          <a:p>
+            <a:pPr lvl="1"/>
+            <a:r>
+              <a:rPr lang="zh-CN" altLang="en-US" dirty="0" smtClean="0"/>
+              <a:t>基本数学运算</a:t>
+            </a:r>
+            <a:endParaRPr lang="en-US" altLang="zh-CN" dirty="0" smtClean="0"/>
+          </a:p>
+          <a:p>
+            <a:pPr lvl="1"/>
+            <a:r>
+              <a:rPr lang="zh-CN" altLang="en-US" dirty="0" smtClean="0"/>
+              <a:t>创建图表</a:t>
             </a:r>
             <a:endParaRPr lang="en-US" altLang="zh-CN" dirty="0"/>
           </a:p>
           <a:p>
             <a:pPr lvl="1"/>
             <a:r>
-              <a:rPr lang="zh-CN" altLang="en-US" dirty="0"/>
-              <a:t>加减时间</a:t>
-            </a:r>
-            <a:endParaRPr lang="en-US" altLang="zh-CN" dirty="0"/>
+              <a:rPr lang="zh-CN" altLang="en-US" dirty="0" smtClean="0"/>
+              <a:t>冻结或锁定窗格</a:t>
+            </a:r>
+            <a:endParaRPr lang="en-US" altLang="zh-CN" dirty="0" smtClean="0"/>
           </a:p>
           <a:p>
             <a:pPr lvl="1"/>
             <a:r>
-              <a:rPr lang="zh-CN" altLang="en-US" dirty="0"/>
-              <a:t>求一组数的平均值</a:t>
-            </a:r>
-            <a:endParaRPr lang="en-US" altLang="zh-CN" dirty="0"/>
+              <a:rPr lang="zh-CN" altLang="en-US" dirty="0" smtClean="0"/>
+              <a:t>自动填从 </a:t>
+            </a:r>
+            <a:r>
+              <a:rPr lang="en-US" altLang="zh-CN" dirty="0" smtClean="0"/>
+              <a:t>&amp; </a:t>
+            </a:r>
+            <a:r>
+              <a:rPr lang="zh-CN" altLang="en-US" dirty="0" smtClean="0"/>
+              <a:t>快速填充</a:t>
+            </a:r>
+            <a:endParaRPr lang="en-US" altLang="zh-CN" dirty="0" smtClean="0"/>
           </a:p>
           <a:p>
             <a:pPr lvl="1"/>
-            <a:r>
-              <a:rPr lang="zh-CN" altLang="en-US" dirty="0"/>
-              <a:t>插入页眉页脚</a:t>
-            </a:r>
-            <a:endParaRPr lang="en-US" altLang="zh-CN" dirty="0"/>
-          </a:p>
-          <a:p>
-            <a:pPr lvl="1"/>
-            <a:r>
-              <a:rPr lang="zh-CN" altLang="en-US" dirty="0"/>
-              <a:t>数据排序和筛选</a:t>
-            </a:r>
-            <a:endParaRPr lang="en-US" altLang="zh-CN" dirty="0"/>
-          </a:p>
-          <a:p>
-            <a:pPr lvl="1"/>
-            <a:r>
-              <a:rPr lang="zh-CN" altLang="en-US" dirty="0"/>
-              <a:t>条件格式</a:t>
-            </a:r>
-            <a:endParaRPr lang="en-US" altLang="zh-CN" dirty="0"/>
-          </a:p>
-          <a:p>
-            <a:pPr lvl="1"/>
-            <a:r>
-              <a:rPr lang="en-US" altLang="zh-CN" dirty="0"/>
-              <a:t>VLOOKUP</a:t>
-            </a:r>
-            <a:r>
-              <a:rPr lang="zh-CN" altLang="en-US" dirty="0"/>
-              <a:t>函数</a:t>
-            </a:r>
+            <a:endParaRPr lang="zh-CN" altLang="en-US" dirty="0"/>
           </a:p>
         </p:txBody>
       </p:sp>
     </p:spTree>
     <p:extLst>
       <p:ext uri="{BB962C8B-B14F-4D97-AF65-F5344CB8AC3E}">
-        <p14:creationId xmlns:p14="http://schemas.microsoft.com/office/powerpoint/2010/main" val="535843245"/>
+        <p14:creationId xmlns:p14="http://schemas.microsoft.com/office/powerpoint/2010/main" val="3992487303"/>
       </p:ext>
     </p:extLst>
   </p:cSld>
@@ -6983,139 +6998,98 @@
           <a:lstStyle/>
           <a:p>
             <a:r>
-              <a:rPr lang="en-US" altLang="zh-CN" dirty="0" smtClean="0"/>
+              <a:rPr lang="en-US" altLang="zh-CN" dirty="0"/>
               <a:t>Excel</a:t>
             </a:r>
             <a:r>
+              <a:rPr lang="zh-CN" altLang="en-US" dirty="0"/>
+              <a:t>动手实验室</a:t>
+            </a:r>
+          </a:p>
+        </p:txBody>
+      </p:sp>
+      <p:sp>
+        <p:nvSpPr>
+          <p:cNvPr id="3" name="Content Placeholder 2"/>
+          <p:cNvSpPr>
+            <a:spLocks noGrp="1"/>
+          </p:cNvSpPr>
+          <p:nvPr>
+            <p:ph idx="1"/>
+          </p:nvPr>
+        </p:nvSpPr>
+        <p:spPr/>
+        <p:txBody>
+          <a:bodyPr/>
+          <a:lstStyle/>
+          <a:p>
+            <a:r>
               <a:rPr lang="zh-CN" altLang="en-US" dirty="0" smtClean="0"/>
-              <a:t>动手实验室</a:t>
-            </a:r>
-            <a:endParaRPr lang="zh-CN" altLang="en-US" dirty="0"/>
-          </a:p>
-        </p:txBody>
-      </p:sp>
-      <p:sp>
-        <p:nvSpPr>
-          <p:cNvPr id="3" name="Content Placeholder 2"/>
-          <p:cNvSpPr>
-            <a:spLocks noGrp="1"/>
-          </p:cNvSpPr>
-          <p:nvPr>
-            <p:ph idx="1"/>
-          </p:nvPr>
-        </p:nvSpPr>
-        <p:spPr/>
-        <p:txBody>
-          <a:bodyPr/>
-          <a:lstStyle/>
-          <a:p>
+              <a:t>中</a:t>
+            </a:r>
             <a:r>
               <a:rPr lang="zh-CN" altLang="en-US" dirty="0"/>
-              <a:t>高</a:t>
-            </a:r>
-            <a:r>
-              <a:rPr lang="zh-CN" altLang="en-US" dirty="0" smtClean="0"/>
               <a:t>级</a:t>
             </a:r>
-            <a:endParaRPr lang="en-US" altLang="zh-CN" dirty="0" smtClean="0"/>
+            <a:endParaRPr lang="en-US" altLang="zh-CN" dirty="0"/>
           </a:p>
           <a:p>
             <a:pPr lvl="1"/>
             <a:r>
               <a:rPr lang="zh-CN" altLang="en-US" dirty="0"/>
-              <a:t>高</a:t>
-            </a:r>
-            <a:r>
-              <a:rPr lang="zh-CN" altLang="en-US" dirty="0" smtClean="0"/>
-              <a:t>级</a:t>
-            </a:r>
-            <a:r>
-              <a:rPr lang="en-US" altLang="zh-CN" dirty="0" smtClean="0"/>
-              <a:t>IF</a:t>
-            </a:r>
-            <a:r>
-              <a:rPr lang="zh-CN" altLang="en-US" dirty="0" smtClean="0"/>
+              <a:t>加减时间</a:t>
+            </a:r>
+            <a:endParaRPr lang="en-US" altLang="zh-CN" dirty="0"/>
+          </a:p>
+          <a:p>
+            <a:pPr lvl="1"/>
+            <a:r>
+              <a:rPr lang="zh-CN" altLang="en-US" dirty="0"/>
+              <a:t>求一组数的平均值</a:t>
+            </a:r>
+            <a:endParaRPr lang="en-US" altLang="zh-CN" dirty="0"/>
+          </a:p>
+          <a:p>
+            <a:pPr lvl="1"/>
+            <a:r>
+              <a:rPr lang="zh-CN" altLang="en-US" dirty="0"/>
+              <a:t>插入页眉页脚</a:t>
+            </a:r>
+            <a:endParaRPr lang="en-US" altLang="zh-CN" dirty="0"/>
+          </a:p>
+          <a:p>
+            <a:pPr lvl="1"/>
+            <a:r>
+              <a:rPr lang="zh-CN" altLang="en-US" dirty="0"/>
+              <a:t>数据排序和筛选</a:t>
+            </a:r>
+            <a:endParaRPr lang="en-US" altLang="zh-CN" dirty="0"/>
+          </a:p>
+          <a:p>
+            <a:pPr lvl="1"/>
+            <a:r>
+              <a:rPr lang="zh-CN" altLang="en-US" dirty="0"/>
+              <a:t>条件格式</a:t>
+            </a:r>
+            <a:endParaRPr lang="en-US" altLang="zh-CN" dirty="0"/>
+          </a:p>
+          <a:p>
+            <a:pPr lvl="1"/>
+            <a:r>
+              <a:rPr lang="en-US" altLang="zh-CN" dirty="0"/>
+              <a:t>VLOOKUP</a:t>
+            </a:r>
+            <a:r>
+              <a:rPr lang="zh-CN" altLang="en-US" dirty="0"/>
               <a:t>函数</a:t>
             </a:r>
-            <a:endParaRPr lang="en-US" altLang="zh-CN" dirty="0" smtClean="0"/>
-          </a:p>
-          <a:p>
-            <a:pPr lvl="1"/>
-            <a:r>
-              <a:rPr lang="zh-CN" altLang="en-US" dirty="0"/>
-              <a:t>数</a:t>
-            </a:r>
-            <a:r>
-              <a:rPr lang="zh-CN" altLang="en-US" dirty="0" smtClean="0"/>
-              <a:t>组公式</a:t>
-            </a:r>
-            <a:endParaRPr lang="en-US" altLang="zh-CN" dirty="0" smtClean="0"/>
-          </a:p>
-          <a:p>
-            <a:pPr lvl="1"/>
-            <a:r>
-              <a:rPr lang="zh-CN" altLang="en-US" dirty="0"/>
-              <a:t>创</a:t>
-            </a:r>
-            <a:r>
-              <a:rPr lang="zh-CN" altLang="en-US" dirty="0" smtClean="0"/>
-              <a:t>建和管理下拉列表</a:t>
-            </a:r>
-            <a:endParaRPr lang="en-US" altLang="zh-CN" dirty="0" smtClean="0"/>
-          </a:p>
-          <a:p>
-            <a:pPr lvl="1"/>
-            <a:r>
-              <a:rPr lang="zh-CN" altLang="en-US" dirty="0" smtClean="0"/>
-              <a:t>创建数据透视表并分析数据</a:t>
-            </a:r>
-            <a:endParaRPr lang="en-US" altLang="zh-CN" dirty="0" smtClean="0"/>
-          </a:p>
-          <a:p>
-            <a:pPr lvl="1"/>
-            <a:r>
-              <a:rPr lang="zh-CN" altLang="en-US" dirty="0" smtClean="0"/>
-              <a:t>密码保护</a:t>
-            </a:r>
-            <a:endParaRPr lang="en-US" altLang="zh-CN" dirty="0" smtClean="0"/>
-          </a:p>
-          <a:p>
-            <a:pPr lvl="1"/>
-            <a:r>
-              <a:rPr lang="zh-CN" altLang="en-US" dirty="0"/>
-              <a:t>打</a:t>
-            </a:r>
-            <a:r>
-              <a:rPr lang="zh-CN" altLang="en-US" dirty="0" smtClean="0"/>
-              <a:t>印</a:t>
-            </a:r>
-            <a:endParaRPr lang="en-US" altLang="zh-CN" dirty="0" smtClean="0"/>
-          </a:p>
-          <a:p>
-            <a:pPr lvl="1"/>
-            <a:r>
-              <a:rPr lang="en-US" altLang="zh-CN" dirty="0" smtClean="0"/>
-              <a:t>Power pivot</a:t>
-            </a:r>
-          </a:p>
-          <a:p>
-            <a:pPr lvl="1"/>
-            <a:r>
-              <a:rPr lang="en-US" altLang="zh-CN" dirty="0" smtClean="0"/>
-              <a:t>Excel</a:t>
-            </a:r>
-            <a:r>
-              <a:rPr lang="zh-CN" altLang="en-US" dirty="0" smtClean="0"/>
-              <a:t>数据模型</a:t>
-            </a:r>
-            <a:endParaRPr lang="zh-CN" altLang="en-US" dirty="0"/>
           </a:p>
         </p:txBody>
       </p:sp>
     </p:spTree>
     <p:extLst>
       <p:ext uri="{BB962C8B-B14F-4D97-AF65-F5344CB8AC3E}">
-        <p14:creationId xmlns:p14="http://schemas.microsoft.com/office/powerpoint/2010/main" val="3732972814"/>
+        <p14:creationId xmlns:p14="http://schemas.microsoft.com/office/powerpoint/2010/main" val="535843245"/>
       </p:ext>
     </p:extLst>
   </p:cSld>
@@ -7177,58 +7151,56 @@
           <a:lstStyle/>
           <a:p>
             <a:r>
-              <a:rPr lang="en-US" altLang="zh-CN" dirty="0"/>
+              <a:rPr lang="en-US" altLang="zh-CN" dirty="0" smtClean="0"/>
               <a:t>Excel</a:t>
             </a:r>
             <a:r>
+              <a:rPr lang="zh-CN" altLang="en-US" dirty="0" smtClean="0"/>
+              <a:t>动手实验室</a:t>
+            </a:r>
+            <a:endParaRPr lang="zh-CN" altLang="en-US" dirty="0"/>
+          </a:p>
+        </p:txBody>
+      </p:sp>
+      <p:sp>
+        <p:nvSpPr>
+          <p:cNvPr id="3" name="Content Placeholder 2"/>
+          <p:cNvSpPr>
+            <a:spLocks noGrp="1"/>
+          </p:cNvSpPr>
+          <p:nvPr>
+            <p:ph idx="1"/>
+          </p:nvPr>
+        </p:nvSpPr>
+        <p:spPr/>
+        <p:txBody>
+          <a:bodyPr/>
+          <a:lstStyle/>
+          <a:p>
+            <a:r>
               <a:rPr lang="zh-CN" altLang="en-US" dirty="0"/>
-              <a:t>动手实验</a:t>
+              <a:t>高</a:t>
             </a:r>
             <a:r>
               <a:rPr lang="zh-CN" altLang="en-US" dirty="0" smtClean="0"/>
-              <a:t>室 </a:t>
+              <a:t>级</a:t>
+            </a:r>
+            <a:endParaRPr lang="en-US" altLang="zh-CN" dirty="0" smtClean="0"/>
+          </a:p>
+          <a:p>
+            <a:pPr lvl="1"/>
+            <a:r>
+              <a:rPr lang="zh-CN" altLang="en-US" dirty="0"/>
+              <a:t>高</a:t>
+            </a:r>
+            <a:r>
+              <a:rPr lang="zh-CN" altLang="en-US" dirty="0" smtClean="0"/>
+              <a:t>级</a:t>
             </a:r>
             <a:r>
               <a:rPr lang="en-US" altLang="zh-CN" dirty="0" smtClean="0"/>
-              <a:t>- </a:t>
-            </a:r>
-            <a:r>
-              <a:rPr lang="zh-CN" altLang="en-US" dirty="0" smtClean="0"/>
-              <a:t>对数字求和</a:t>
-            </a:r>
-            <a:endParaRPr lang="zh-CN" altLang="en-US" dirty="0"/>
-          </a:p>
-        </p:txBody>
-      </p:sp>
-      <p:sp>
-        <p:nvSpPr>
-          <p:cNvPr id="3" name="Content Placeholder 2"/>
-          <p:cNvSpPr>
-            <a:spLocks noGrp="1"/>
-          </p:cNvSpPr>
-          <p:nvPr>
-            <p:ph idx="1"/>
-          </p:nvPr>
-        </p:nvSpPr>
-        <p:spPr/>
-        <p:txBody>
-          <a:bodyPr/>
-          <a:lstStyle/>
-          <a:p>
-            <a:r>
-              <a:rPr lang="zh-CN" altLang="en-US" dirty="0" smtClean="0"/>
-              <a:t>公式</a:t>
-            </a:r>
-            <a:endParaRPr lang="en-US" altLang="zh-CN" dirty="0" smtClean="0"/>
-          </a:p>
-          <a:p>
-            <a:r>
-              <a:rPr lang="zh-CN" altLang="en-US" dirty="0" smtClean="0"/>
-              <a:t>自动求和按钮</a:t>
-            </a:r>
-            <a:endParaRPr lang="en-US" altLang="zh-CN" dirty="0" smtClean="0"/>
-          </a:p>
-          <a:p>
+              <a:t>IF</a:t>
+            </a:r>
             <a:r>
               <a:rPr lang="zh-CN" altLang="en-US" dirty="0" smtClean="0"/>
               <a:t>函数</a:t>
@@ -7238,61 +7210,98 @@
           <a:p>
             <a:pPr lvl="1"/>
             <a:r>
+              <a:rPr lang="zh-CN" altLang="en-US" dirty="0"/>
+              <a:t>数</a:t>
+            </a:r>
+            <a:r>
+              <a:rPr lang="zh-CN" altLang="en-US" dirty="0" smtClean="0"/>
+              <a:t>组公式</a:t>
+            </a:r>
+            <a:endParaRPr lang="en-US" altLang="zh-CN" dirty="0" smtClean="0"/>
+          </a:p>
+          <a:p>
+            <a:pPr lvl="1"/>
+            <a:r>
+              <a:rPr lang="zh-CN" altLang="en-US" dirty="0"/>
+              <a:t>创</a:t>
+            </a:r>
+            <a:r>
+              <a:rPr lang="zh-CN" altLang="en-US" dirty="0" smtClean="0"/>
+              <a:t>建和管理下拉列表</a:t>
+            </a:r>
+            <a:endParaRPr lang="en-US" altLang="zh-CN" dirty="0" smtClean="0"/>
+          </a:p>
+          <a:p>
+            <a:pPr lvl="1"/>
+            <a:r>
+              <a:rPr lang="zh-CN" altLang="en-US" dirty="0" smtClean="0"/>
+              <a:t>创建数据透视表并分析数据</a:t>
+            </a:r>
+            <a:endParaRPr lang="en-US" altLang="zh-CN" dirty="0" smtClean="0"/>
+          </a:p>
+          <a:p>
+            <a:pPr lvl="1"/>
+            <a:r>
+              <a:rPr lang="zh-CN" altLang="en-US" dirty="0" smtClean="0"/>
+              <a:t>密码保护</a:t>
+            </a:r>
+            <a:endParaRPr lang="en-US" altLang="zh-CN" dirty="0" smtClean="0"/>
+          </a:p>
+          <a:p>
+            <a:pPr lvl="1"/>
+            <a:r>
+              <a:rPr lang="zh-CN" altLang="en-US" dirty="0"/>
+              <a:t>打</a:t>
+            </a:r>
+            <a:r>
+              <a:rPr lang="zh-CN" altLang="en-US" dirty="0" smtClean="0"/>
+              <a:t>印</a:t>
+            </a:r>
+            <a:endParaRPr lang="en-US" altLang="zh-CN" dirty="0" smtClean="0"/>
+          </a:p>
+          <a:p>
+            <a:pPr lvl="1"/>
+            <a:r>
               <a:rPr lang="en-US" altLang="zh-CN" dirty="0" smtClean="0"/>
-              <a:t>SUM</a:t>
+              <a:t>Power pivot</a:t>
             </a:r>
           </a:p>
           <a:p>
             <a:pPr lvl="1"/>
             <a:r>
               <a:rPr lang="en-US" altLang="zh-CN" dirty="0" smtClean="0"/>
-              <a:t>SUMIF</a:t>
-            </a:r>
-          </a:p>
-          <a:p>
-            <a:pPr lvl="1"/>
-            <a:endParaRPr lang="en-US" altLang="zh-CN" dirty="0"/>
-          </a:p>
-          <a:p>
-            <a:endParaRPr lang="en-US" altLang="zh-CN" dirty="0" smtClean="0"/>
-          </a:p>
-          <a:p>
-            <a:endParaRPr lang="en-US" altLang="zh-CN" dirty="0"/>
-          </a:p>
-          <a:p>
-            <a:pPr marL="0" indent="0">
-              <a:buNone/>
-            </a:pPr>
+              <a:t>Excel</a:t>
+            </a:r>
             <a:r>
               <a:rPr lang="zh-CN" altLang="en-US" dirty="0" smtClean="0"/>
-              <a:t>从材料中，打开：</a:t>
-            </a:r>
-            <a:r>
-              <a:rPr lang="zh-CN" altLang="en-US" u="sng" dirty="0" smtClean="0"/>
-              <a:t>对数字求和</a:t>
-            </a:r>
-            <a:r>
-              <a:rPr lang="en-US" altLang="zh-CN" u="sng" dirty="0" smtClean="0"/>
-              <a:t>.</a:t>
-            </a:r>
-            <a:r>
-              <a:rPr lang="en-US" altLang="zh-CN" u="sng" dirty="0" err="1" smtClean="0"/>
-              <a:t>xlsx</a:t>
-            </a:r>
-            <a:endParaRPr lang="en-US" altLang="zh-CN" u="sng" dirty="0" smtClean="0"/>
+              <a:t>数据模型</a:t>
+            </a:r>
+            <a:endParaRPr lang="zh-CN" altLang="en-US" dirty="0"/>
           </a:p>
         </p:txBody>
       </p:sp>
     </p:spTree>
     <p:extLst>
       <p:ext uri="{BB962C8B-B14F-4D97-AF65-F5344CB8AC3E}">
-        <p14:creationId xmlns:p14="http://schemas.microsoft.com/office/powerpoint/2010/main" val="1256903372"/>
+        <p14:creationId xmlns:p14="http://schemas.microsoft.com/office/powerpoint/2010/main" val="3732972814"/>
       </p:ext>
     </p:extLst>
   </p:cSld>
   <p:clrMapOvr>
     <a:masterClrMapping/>
   </p:clrMapOvr>
+  <mc:AlternateContent xmlns:mc="http://schemas.openxmlformats.org/markup-compatibility/2006" xmlns:p14="http://schemas.microsoft.com/office/powerpoint/2010/main">
+    <mc:Choice Requires="p14">
+      <p:transition spd="med" p14:dur="700">
+        <p:fade/>
+      </p:transition>
+    </mc:Choice>
+    <mc:Fallback xmlns="">
+      <p:transition spd="med">
+        <p:fade/>
+      </p:transition>
+    </mc:Fallback>
+  </mc:AlternateContent>
   <p:timing>
     <p:tnLst>
       <p:par>
@@ -7341,6 +7350,165 @@
             </a:r>
             <a:r>
               <a:rPr lang="zh-CN" altLang="en-US" dirty="0"/>
+              <a:t>动手实验</a:t>
+            </a:r>
+            <a:r>
+              <a:rPr lang="zh-CN" altLang="en-US" dirty="0" smtClean="0"/>
+              <a:t>室 </a:t>
+            </a:r>
+            <a:r>
+              <a:rPr lang="en-US" altLang="zh-CN" dirty="0" smtClean="0"/>
+              <a:t>- </a:t>
+            </a:r>
+            <a:r>
+              <a:rPr lang="zh-CN" altLang="en-US" dirty="0" smtClean="0"/>
+              <a:t>对数字求和</a:t>
+            </a:r>
+            <a:endParaRPr lang="zh-CN" altLang="en-US" dirty="0"/>
+          </a:p>
+        </p:txBody>
+      </p:sp>
+      <p:sp>
+        <p:nvSpPr>
+          <p:cNvPr id="3" name="Content Placeholder 2"/>
+          <p:cNvSpPr>
+            <a:spLocks noGrp="1"/>
+          </p:cNvSpPr>
+          <p:nvPr>
+            <p:ph idx="1"/>
+          </p:nvPr>
+        </p:nvSpPr>
+        <p:spPr/>
+        <p:txBody>
+          <a:bodyPr/>
+          <a:lstStyle/>
+          <a:p>
+            <a:r>
+              <a:rPr lang="zh-CN" altLang="en-US" dirty="0" smtClean="0"/>
+              <a:t>公式</a:t>
+            </a:r>
+            <a:endParaRPr lang="en-US" altLang="zh-CN" dirty="0" smtClean="0"/>
+          </a:p>
+          <a:p>
+            <a:r>
+              <a:rPr lang="zh-CN" altLang="en-US" dirty="0" smtClean="0"/>
+              <a:t>自动求和按钮</a:t>
+            </a:r>
+            <a:endParaRPr lang="en-US" altLang="zh-CN" dirty="0" smtClean="0"/>
+          </a:p>
+          <a:p>
+            <a:r>
+              <a:rPr lang="zh-CN" altLang="en-US" dirty="0" smtClean="0"/>
+              <a:t>函数</a:t>
+            </a:r>
+            <a:endParaRPr lang="en-US" altLang="zh-CN" dirty="0" smtClean="0"/>
+          </a:p>
+          <a:p>
+            <a:pPr lvl="1"/>
+            <a:r>
+              <a:rPr lang="en-US" altLang="zh-CN" dirty="0" smtClean="0"/>
+              <a:t>SUM</a:t>
+            </a:r>
+          </a:p>
+          <a:p>
+            <a:pPr lvl="1"/>
+            <a:r>
+              <a:rPr lang="en-US" altLang="zh-CN" dirty="0" smtClean="0"/>
+              <a:t>SUMIF</a:t>
+            </a:r>
+          </a:p>
+          <a:p>
+            <a:pPr lvl="1"/>
+            <a:endParaRPr lang="en-US" altLang="zh-CN" dirty="0"/>
+          </a:p>
+          <a:p>
+            <a:endParaRPr lang="en-US" altLang="zh-CN" dirty="0" smtClean="0"/>
+          </a:p>
+          <a:p>
+            <a:endParaRPr lang="en-US" altLang="zh-CN" dirty="0"/>
+          </a:p>
+          <a:p>
+            <a:pPr marL="0" indent="0">
+              <a:buNone/>
+            </a:pPr>
+            <a:r>
+              <a:rPr lang="zh-CN" altLang="en-US" dirty="0" smtClean="0"/>
+              <a:t>从材料中，打开：</a:t>
+            </a:r>
+            <a:r>
+              <a:rPr lang="zh-CN" altLang="en-US" u="sng" dirty="0" smtClean="0"/>
+              <a:t>对数字求和</a:t>
+            </a:r>
+            <a:r>
+              <a:rPr lang="en-US" altLang="zh-CN" u="sng" dirty="0" smtClean="0"/>
+              <a:t>.</a:t>
+            </a:r>
+            <a:r>
+              <a:rPr lang="en-US" altLang="zh-CN" u="sng" dirty="0" err="1" smtClean="0"/>
+              <a:t>xlsx</a:t>
+            </a:r>
+            <a:endParaRPr lang="en-US" altLang="zh-CN" u="sng" dirty="0" smtClean="0"/>
+          </a:p>
+        </p:txBody>
+      </p:sp>
+    </p:spTree>
+    <p:extLst>
+      <p:ext uri="{BB962C8B-B14F-4D97-AF65-F5344CB8AC3E}">
+        <p14:creationId xmlns:p14="http://schemas.microsoft.com/office/powerpoint/2010/main" val="1256903372"/>
+      </p:ext>
+    </p:extLst>
+  </p:cSld>
+  <p:clrMapOvr>
+    <a:masterClrMapping/>
+  </p:clrMapOvr>
+  <p:timing>
+    <p:tnLst>
+      <p:par>
+        <p:cTn id="1" dur="indefinite" restart="never" nodeType="tmRoot"/>
+      </p:par>
+    </p:tnLst>
+  </p:timing>
+</p:sld>
+</file>
+
+<file path=ppt/slides/slide7.xml><?xml version="1.0" encoding="utf-8"?>
+<p:sld xmlns:a="http://schemas.openxmlformats.org/drawingml/2006/main" xmlns:r="http://schemas.openxmlformats.org/officeDocument/2006/relationships" xmlns:p="http://schemas.openxmlformats.org/presentationml/2006/main">
+  <p:cSld>
+    <p:spTree>
+      <p:nvGrpSpPr>
+        <p:cNvPr id="1" name=""/>
+        <p:cNvGrpSpPr/>
+        <p:nvPr/>
+      </p:nvGrpSpPr>
+      <p:grpSpPr>
+        <a:xfrm>
+          <a:off x="0" y="0"/>
+          <a:ext cx="0" cy="0"/>
+          <a:chOff x="0" y="0"/>
+          <a:chExt cx="0" cy="0"/>
+        </a:xfrm>
+      </p:grpSpPr>
+      <p:sp>
+        <p:nvSpPr>
+          <p:cNvPr id="2" name="Title 1"/>
+          <p:cNvSpPr>
+            <a:spLocks noGrp="1"/>
+          </p:cNvSpPr>
+          <p:nvPr>
+            <p:ph type="title"/>
+          </p:nvPr>
+        </p:nvSpPr>
+        <p:spPr/>
+        <p:txBody>
+          <a:bodyPr/>
+          <a:lstStyle/>
+          <a:p>
+            <a:r>
+              <a:rPr lang="en-US" altLang="zh-CN" dirty="0"/>
+              <a:t>Excel</a:t>
+            </a:r>
+            <a:r>
+              <a:rPr lang="zh-CN" altLang="en-US" dirty="0"/>
               <a:t>动手实验室 </a:t>
             </a:r>
             <a:r>
@@ -7504,7 +7672,7 @@
 </p:sld>
 </file>
 
-<file path=ppt/slides/slide7.xml><?xml version="1.0" encoding="utf-8"?>
+<file path=ppt/slides/slide8.xml><?xml version="1.0" encoding="utf-8"?>
 <p:sld xmlns:a="http://schemas.openxmlformats.org/drawingml/2006/main" xmlns:r="http://schemas.openxmlformats.org/officeDocument/2006/relationships" xmlns:p="http://schemas.openxmlformats.org/presentationml/2006/main">
   <p:cSld>
     <p:spTree>

</xml_diff>

<commit_message>
Complete chapter "Freeze or lock panes"
</commit_message>
<xml_diff>
--- a/Excel动手实验室.pptx
+++ b/Excel动手实验室.pptx
@@ -5,7 +5,7 @@
     <p:sldMasterId id="2147483648" r:id="rId1"/>
   </p:sldMasterIdLst>
   <p:notesMasterIdLst>
-    <p:notesMasterId r:id="rId10"/>
+    <p:notesMasterId r:id="rId11"/>
   </p:notesMasterIdLst>
   <p:sldIdLst>
     <p:sldId id="256" r:id="rId2"/>
@@ -16,6 +16,7 @@
     <p:sldId id="260" r:id="rId7"/>
     <p:sldId id="261" r:id="rId8"/>
     <p:sldId id="262" r:id="rId9"/>
+    <p:sldId id="264" r:id="rId10"/>
   </p:sldIdLst>
   <p:sldSz cx="12192000" cy="6858000"/>
   <p:notesSz cx="6858000" cy="9144000"/>
@@ -7790,6 +7791,159 @@
     <p:extLst>
       <p:ext uri="{BB962C8B-B14F-4D97-AF65-F5344CB8AC3E}">
         <p14:creationId xmlns:p14="http://schemas.microsoft.com/office/powerpoint/2010/main" val="3097252939"/>
+      </p:ext>
+    </p:extLst>
+  </p:cSld>
+  <p:clrMapOvr>
+    <a:masterClrMapping/>
+  </p:clrMapOvr>
+</p:sld>
+</file>
+
+<file path=ppt/slides/slide9.xml><?xml version="1.0" encoding="utf-8"?>
+<p:sld xmlns:a="http://schemas.openxmlformats.org/drawingml/2006/main" xmlns:r="http://schemas.openxmlformats.org/officeDocument/2006/relationships" xmlns:p="http://schemas.openxmlformats.org/presentationml/2006/main">
+  <p:cSld>
+    <p:spTree>
+      <p:nvGrpSpPr>
+        <p:cNvPr id="1" name=""/>
+        <p:cNvGrpSpPr/>
+        <p:nvPr/>
+      </p:nvGrpSpPr>
+      <p:grpSpPr>
+        <a:xfrm>
+          <a:off x="0" y="0"/>
+          <a:ext cx="0" cy="0"/>
+          <a:chOff x="0" y="0"/>
+          <a:chExt cx="0" cy="0"/>
+        </a:xfrm>
+      </p:grpSpPr>
+      <p:sp>
+        <p:nvSpPr>
+          <p:cNvPr id="2" name="Title 1"/>
+          <p:cNvSpPr>
+            <a:spLocks noGrp="1"/>
+          </p:cNvSpPr>
+          <p:nvPr>
+            <p:ph type="title"/>
+          </p:nvPr>
+        </p:nvSpPr>
+        <p:spPr/>
+        <p:txBody>
+          <a:bodyPr/>
+          <a:lstStyle/>
+          <a:p>
+            <a:r>
+              <a:rPr lang="en-US" altLang="zh-CN" dirty="0" smtClean="0"/>
+              <a:t>Excel</a:t>
+            </a:r>
+            <a:r>
+              <a:rPr lang="zh-CN" altLang="en-US" dirty="0" smtClean="0"/>
+              <a:t>动手实验室 </a:t>
+            </a:r>
+            <a:r>
+              <a:rPr lang="en-US" altLang="zh-CN" dirty="0" smtClean="0"/>
+              <a:t>- </a:t>
+            </a:r>
+            <a:r>
+              <a:rPr lang="zh-CN" altLang="en-US" dirty="0" smtClean="0"/>
+              <a:t>冻</a:t>
+            </a:r>
+            <a:r>
+              <a:rPr lang="zh-CN" altLang="en-US" dirty="0"/>
+              <a:t>结或锁定窗格</a:t>
+            </a:r>
+          </a:p>
+        </p:txBody>
+      </p:sp>
+      <p:sp>
+        <p:nvSpPr>
+          <p:cNvPr id="3" name="Content Placeholder 2"/>
+          <p:cNvSpPr>
+            <a:spLocks noGrp="1"/>
+          </p:cNvSpPr>
+          <p:nvPr>
+            <p:ph idx="1"/>
+          </p:nvPr>
+        </p:nvSpPr>
+        <p:spPr/>
+        <p:txBody>
+          <a:bodyPr/>
+          <a:lstStyle/>
+          <a:p>
+            <a:r>
+              <a:rPr lang="zh-CN" altLang="en-US" dirty="0" smtClean="0"/>
+              <a:t>冻结窗格</a:t>
+            </a:r>
+            <a:endParaRPr lang="en-US" altLang="zh-CN" dirty="0" smtClean="0"/>
+          </a:p>
+          <a:p>
+            <a:pPr lvl="1"/>
+            <a:r>
+              <a:rPr lang="zh-CN" altLang="en-US" dirty="0" smtClean="0"/>
+              <a:t>冻结</a:t>
+            </a:r>
+            <a:r>
+              <a:rPr lang="zh-CN" altLang="en-US" dirty="0"/>
+              <a:t>首</a:t>
+            </a:r>
+            <a:r>
+              <a:rPr lang="zh-CN" altLang="en-US" dirty="0" smtClean="0"/>
+              <a:t>行</a:t>
+            </a:r>
+            <a:endParaRPr lang="en-US" altLang="zh-CN" dirty="0" smtClean="0"/>
+          </a:p>
+          <a:p>
+            <a:pPr lvl="1"/>
+            <a:r>
+              <a:rPr lang="zh-CN" altLang="en-US" dirty="0"/>
+              <a:t>冻</a:t>
+            </a:r>
+            <a:r>
+              <a:rPr lang="zh-CN" altLang="en-US" dirty="0" smtClean="0"/>
+              <a:t>结首列</a:t>
+            </a:r>
+            <a:endParaRPr lang="en-US" altLang="zh-CN" dirty="0" smtClean="0"/>
+          </a:p>
+          <a:p>
+            <a:pPr lvl="1"/>
+            <a:r>
+              <a:rPr lang="zh-CN" altLang="en-US" dirty="0" smtClean="0"/>
+              <a:t>冻结自定义行、列</a:t>
+            </a:r>
+            <a:endParaRPr lang="en-US" altLang="zh-CN" dirty="0" smtClean="0"/>
+          </a:p>
+          <a:p>
+            <a:r>
+              <a:rPr lang="zh-CN" altLang="en-US" dirty="0"/>
+              <a:t>打</a:t>
+            </a:r>
+            <a:r>
+              <a:rPr lang="zh-CN" altLang="en-US" dirty="0" smtClean="0"/>
+              <a:t>印</a:t>
+            </a:r>
+            <a:endParaRPr lang="en-US" altLang="zh-CN" dirty="0" smtClean="0"/>
+          </a:p>
+          <a:p>
+            <a:pPr lvl="1"/>
+            <a:r>
+              <a:rPr lang="zh-CN" altLang="en-US" dirty="0"/>
+              <a:t>每一</a:t>
+            </a:r>
+            <a:r>
+              <a:rPr lang="zh-CN" altLang="en-US" dirty="0" smtClean="0"/>
+              <a:t>页打印标题</a:t>
+            </a:r>
+            <a:endParaRPr lang="en-US" altLang="zh-CN" dirty="0" smtClean="0"/>
+          </a:p>
+          <a:p>
+            <a:endParaRPr lang="zh-CN" altLang="en-US" dirty="0"/>
+          </a:p>
+        </p:txBody>
+      </p:sp>
+    </p:spTree>
+    <p:extLst>
+      <p:ext uri="{BB962C8B-B14F-4D97-AF65-F5344CB8AC3E}">
+        <p14:creationId xmlns:p14="http://schemas.microsoft.com/office/powerpoint/2010/main" val="251198405"/>
       </p:ext>
     </p:extLst>
   </p:cSld>

</xml_diff>

<commit_message>
Complete chapter "Understand and use cell references"
</commit_message>
<xml_diff>
--- a/Excel动手实验室.pptx
+++ b/Excel动手实验室.pptx
@@ -5,7 +5,7 @@
     <p:sldMasterId id="2147483648" r:id="rId1"/>
   </p:sldMasterIdLst>
   <p:notesMasterIdLst>
-    <p:notesMasterId r:id="rId11"/>
+    <p:notesMasterId r:id="rId12"/>
   </p:notesMasterIdLst>
   <p:sldIdLst>
     <p:sldId id="256" r:id="rId2"/>
@@ -17,6 +17,7 @@
     <p:sldId id="261" r:id="rId8"/>
     <p:sldId id="262" r:id="rId9"/>
     <p:sldId id="264" r:id="rId10"/>
+    <p:sldId id="265" r:id="rId11"/>
   </p:sldIdLst>
   <p:sldSz cx="12192000" cy="6858000"/>
   <p:notesSz cx="6858000" cy="9144000"/>
@@ -6638,6 +6639,112 @@
 </p:sld>
 </file>
 
+<file path=ppt/slides/slide10.xml><?xml version="1.0" encoding="utf-8"?>
+<p:sld xmlns:a="http://schemas.openxmlformats.org/drawingml/2006/main" xmlns:r="http://schemas.openxmlformats.org/officeDocument/2006/relationships" xmlns:p="http://schemas.openxmlformats.org/presentationml/2006/main">
+  <p:cSld>
+    <p:spTree>
+      <p:nvGrpSpPr>
+        <p:cNvPr id="1" name=""/>
+        <p:cNvGrpSpPr/>
+        <p:nvPr/>
+      </p:nvGrpSpPr>
+      <p:grpSpPr>
+        <a:xfrm>
+          <a:off x="0" y="0"/>
+          <a:ext cx="0" cy="0"/>
+          <a:chOff x="0" y="0"/>
+          <a:chExt cx="0" cy="0"/>
+        </a:xfrm>
+      </p:grpSpPr>
+      <p:sp>
+        <p:nvSpPr>
+          <p:cNvPr id="2" name="Title 1"/>
+          <p:cNvSpPr>
+            <a:spLocks noGrp="1"/>
+          </p:cNvSpPr>
+          <p:nvPr>
+            <p:ph type="title"/>
+          </p:nvPr>
+        </p:nvSpPr>
+        <p:spPr/>
+        <p:txBody>
+          <a:bodyPr/>
+          <a:lstStyle/>
+          <a:p>
+            <a:r>
+              <a:rPr lang="en-US" altLang="zh-CN" dirty="0"/>
+              <a:t>Excel</a:t>
+            </a:r>
+            <a:r>
+              <a:rPr lang="zh-CN" altLang="en-US" dirty="0"/>
+              <a:t>动手实验室 </a:t>
+            </a:r>
+            <a:r>
+              <a:rPr lang="en-US" altLang="zh-CN" dirty="0" smtClean="0"/>
+              <a:t>– </a:t>
+            </a:r>
+            <a:r>
+              <a:rPr lang="zh-CN" altLang="en-US" dirty="0" smtClean="0"/>
+              <a:t>单元格引用</a:t>
+            </a:r>
+            <a:endParaRPr lang="zh-CN" altLang="en-US" dirty="0"/>
+          </a:p>
+        </p:txBody>
+      </p:sp>
+      <p:sp>
+        <p:nvSpPr>
+          <p:cNvPr id="3" name="Content Placeholder 2"/>
+          <p:cNvSpPr>
+            <a:spLocks noGrp="1"/>
+          </p:cNvSpPr>
+          <p:nvPr>
+            <p:ph idx="1"/>
+          </p:nvPr>
+        </p:nvSpPr>
+        <p:spPr/>
+        <p:txBody>
+          <a:bodyPr/>
+          <a:lstStyle/>
+          <a:p>
+            <a:r>
+              <a:rPr lang="zh-CN" altLang="en-US" dirty="0" smtClean="0"/>
+              <a:t>相对单元格引用</a:t>
+            </a:r>
+            <a:endParaRPr lang="en-US" altLang="zh-CN" dirty="0" smtClean="0"/>
+          </a:p>
+          <a:p>
+            <a:r>
+              <a:rPr lang="zh-CN" altLang="en-US" dirty="0"/>
+              <a:t>绝</a:t>
+            </a:r>
+            <a:r>
+              <a:rPr lang="zh-CN" altLang="en-US" dirty="0" smtClean="0"/>
+              <a:t>对单元格引用</a:t>
+            </a:r>
+            <a:endParaRPr lang="en-US" altLang="zh-CN" dirty="0" smtClean="0"/>
+          </a:p>
+          <a:p>
+            <a:pPr lvl="1"/>
+            <a:r>
+              <a:rPr lang="zh-CN" altLang="en-US" dirty="0"/>
+              <a:t>快捷键</a:t>
+            </a:r>
+          </a:p>
+        </p:txBody>
+      </p:sp>
+    </p:spTree>
+    <p:extLst>
+      <p:ext uri="{BB962C8B-B14F-4D97-AF65-F5344CB8AC3E}">
+        <p14:creationId xmlns:p14="http://schemas.microsoft.com/office/powerpoint/2010/main" val="2115986330"/>
+      </p:ext>
+    </p:extLst>
+  </p:cSld>
+  <p:clrMapOvr>
+    <a:masterClrMapping/>
+  </p:clrMapOvr>
+</p:sld>
+</file>
+
 <file path=ppt/slides/slide2.xml><?xml version="1.0" encoding="utf-8"?>
 <p:sld xmlns:a="http://schemas.openxmlformats.org/drawingml/2006/main" xmlns:r="http://schemas.openxmlformats.org/officeDocument/2006/relationships" xmlns:p="http://schemas.openxmlformats.org/presentationml/2006/main">
   <p:cSld>
@@ -6908,15 +7015,43 @@
             <a:pPr lvl="1"/>
             <a:r>
               <a:rPr lang="zh-CN" altLang="en-US" dirty="0" smtClean="0"/>
-              <a:t>冻结或锁定窗格</a:t>
+              <a:t>冻结或锁定窗</a:t>
+            </a:r>
+            <a:r>
+              <a:rPr lang="zh-CN" altLang="en-US" dirty="0" smtClean="0"/>
+              <a:t>格</a:t>
             </a:r>
             <a:endParaRPr lang="en-US" altLang="zh-CN" dirty="0" smtClean="0"/>
           </a:p>
           <a:p>
             <a:pPr lvl="1"/>
             <a:r>
+              <a:rPr lang="zh-CN" altLang="en-US" dirty="0"/>
+              <a:t>单元</a:t>
+            </a:r>
+            <a:r>
               <a:rPr lang="zh-CN" altLang="en-US" dirty="0" smtClean="0"/>
-              <a:t>自动填从 </a:t>
+              <a:t>格引用</a:t>
+            </a:r>
+            <a:endParaRPr lang="en-US" altLang="zh-CN" dirty="0" smtClean="0"/>
+          </a:p>
+          <a:p>
+            <a:pPr lvl="1"/>
+            <a:r>
+              <a:rPr lang="zh-CN" altLang="en-US" dirty="0" smtClean="0"/>
+              <a:t>自</a:t>
+            </a:r>
+            <a:r>
+              <a:rPr lang="zh-CN" altLang="en-US" dirty="0" smtClean="0"/>
+              <a:t>动</a:t>
+            </a:r>
+            <a:r>
+              <a:rPr lang="zh-CN" altLang="en-US" dirty="0"/>
+              <a:t>填充</a:t>
+            </a:r>
+            <a:r>
+              <a:rPr lang="zh-CN" altLang="en-US" dirty="0" smtClean="0"/>
+              <a:t> </a:t>
             </a:r>
             <a:r>
               <a:rPr lang="en-US" altLang="zh-CN" dirty="0" smtClean="0"/>

</xml_diff>

<commit_message>
Complete the chapter "AutoFill and Flash Fill"
</commit_message>
<xml_diff>
--- a/Excel动手实验室.pptx
+++ b/Excel动手实验室.pptx
@@ -5,7 +5,7 @@
     <p:sldMasterId id="2147483648" r:id="rId1"/>
   </p:sldMasterIdLst>
   <p:notesMasterIdLst>
-    <p:notesMasterId r:id="rId12"/>
+    <p:notesMasterId r:id="rId13"/>
   </p:notesMasterIdLst>
   <p:sldIdLst>
     <p:sldId id="256" r:id="rId2"/>
@@ -18,6 +18,7 @@
     <p:sldId id="262" r:id="rId9"/>
     <p:sldId id="264" r:id="rId10"/>
     <p:sldId id="265" r:id="rId11"/>
+    <p:sldId id="266" r:id="rId12"/>
   </p:sldIdLst>
   <p:sldSz cx="12192000" cy="6858000"/>
   <p:notesSz cx="6858000" cy="9144000"/>
@@ -6745,6 +6746,177 @@
 </p:sld>
 </file>
 
+<file path=ppt/slides/slide11.xml><?xml version="1.0" encoding="utf-8"?>
+<p:sld xmlns:a="http://schemas.openxmlformats.org/drawingml/2006/main" xmlns:r="http://schemas.openxmlformats.org/officeDocument/2006/relationships" xmlns:p="http://schemas.openxmlformats.org/presentationml/2006/main">
+  <p:cSld>
+    <p:spTree>
+      <p:nvGrpSpPr>
+        <p:cNvPr id="1" name=""/>
+        <p:cNvGrpSpPr/>
+        <p:nvPr/>
+      </p:nvGrpSpPr>
+      <p:grpSpPr>
+        <a:xfrm>
+          <a:off x="0" y="0"/>
+          <a:ext cx="0" cy="0"/>
+          <a:chOff x="0" y="0"/>
+          <a:chExt cx="0" cy="0"/>
+        </a:xfrm>
+      </p:grpSpPr>
+      <p:sp>
+        <p:nvSpPr>
+          <p:cNvPr id="2" name="Title 1"/>
+          <p:cNvSpPr>
+            <a:spLocks noGrp="1"/>
+          </p:cNvSpPr>
+          <p:nvPr>
+            <p:ph type="title"/>
+          </p:nvPr>
+        </p:nvSpPr>
+        <p:spPr/>
+        <p:txBody>
+          <a:bodyPr/>
+          <a:lstStyle/>
+          <a:p>
+            <a:r>
+              <a:rPr lang="en-US" altLang="zh-CN" dirty="0"/>
+              <a:t>Excel</a:t>
+            </a:r>
+            <a:r>
+              <a:rPr lang="zh-CN" altLang="en-US" dirty="0"/>
+              <a:t>动手实验</a:t>
+            </a:r>
+            <a:r>
+              <a:rPr lang="zh-CN" altLang="en-US" dirty="0" smtClean="0"/>
+              <a:t>室 </a:t>
+            </a:r>
+            <a:r>
+              <a:rPr lang="en-US" altLang="zh-CN" dirty="0" smtClean="0"/>
+              <a:t>– </a:t>
+            </a:r>
+            <a:r>
+              <a:rPr lang="zh-CN" altLang="en-US" dirty="0" smtClean="0"/>
+              <a:t>填充</a:t>
+            </a:r>
+            <a:endParaRPr lang="zh-CN" altLang="en-US" dirty="0"/>
+          </a:p>
+        </p:txBody>
+      </p:sp>
+      <p:sp>
+        <p:nvSpPr>
+          <p:cNvPr id="3" name="Content Placeholder 2"/>
+          <p:cNvSpPr>
+            <a:spLocks noGrp="1"/>
+          </p:cNvSpPr>
+          <p:nvPr>
+            <p:ph idx="1"/>
+          </p:nvPr>
+        </p:nvSpPr>
+        <p:spPr/>
+        <p:txBody>
+          <a:bodyPr/>
+          <a:lstStyle/>
+          <a:p>
+            <a:r>
+              <a:rPr lang="zh-CN" altLang="en-US" dirty="0" smtClean="0"/>
+              <a:t>自动填充</a:t>
+            </a:r>
+            <a:endParaRPr lang="en-US" altLang="zh-CN" dirty="0" smtClean="0"/>
+          </a:p>
+          <a:p>
+            <a:pPr lvl="1"/>
+            <a:r>
+              <a:rPr lang="zh-CN" altLang="en-US" dirty="0"/>
+              <a:t>复制单元</a:t>
+            </a:r>
+            <a:r>
+              <a:rPr lang="zh-CN" altLang="en-US" dirty="0" smtClean="0"/>
+              <a:t>格</a:t>
+            </a:r>
+            <a:endParaRPr lang="en-US" altLang="zh-CN" dirty="0" smtClean="0"/>
+          </a:p>
+          <a:p>
+            <a:pPr lvl="1"/>
+            <a:r>
+              <a:rPr lang="zh-CN" altLang="en-US" dirty="0"/>
+              <a:t>填充序列</a:t>
+            </a:r>
+            <a:endParaRPr lang="en-US" altLang="zh-CN" dirty="0" smtClean="0"/>
+          </a:p>
+          <a:p>
+            <a:r>
+              <a:rPr lang="zh-CN" altLang="en-US" dirty="0"/>
+              <a:t>快</a:t>
+            </a:r>
+            <a:r>
+              <a:rPr lang="zh-CN" altLang="en-US" dirty="0" smtClean="0"/>
+              <a:t>速填充</a:t>
+            </a:r>
+            <a:endParaRPr lang="en-US" altLang="zh-CN" dirty="0" smtClean="0"/>
+          </a:p>
+          <a:p>
+            <a:pPr lvl="1"/>
+            <a:r>
+              <a:rPr lang="zh-CN" altLang="en-US" dirty="0"/>
+              <a:t>数</a:t>
+            </a:r>
+            <a:r>
+              <a:rPr lang="zh-CN" altLang="en-US" dirty="0" smtClean="0"/>
+              <a:t>字</a:t>
+            </a:r>
+            <a:endParaRPr lang="en-US" altLang="zh-CN" dirty="0" smtClean="0"/>
+          </a:p>
+          <a:p>
+            <a:pPr lvl="1"/>
+            <a:r>
+              <a:rPr lang="zh-CN" altLang="en-US" dirty="0"/>
+              <a:t>文字合</a:t>
+            </a:r>
+            <a:r>
+              <a:rPr lang="zh-CN" altLang="en-US" dirty="0" smtClean="0"/>
+              <a:t>并</a:t>
+            </a:r>
+            <a:endParaRPr lang="en-US" altLang="zh-CN" dirty="0" smtClean="0"/>
+          </a:p>
+          <a:p>
+            <a:pPr lvl="1"/>
+            <a:r>
+              <a:rPr lang="zh-CN" altLang="en-US" dirty="0"/>
+              <a:t>文</a:t>
+            </a:r>
+            <a:r>
+              <a:rPr lang="zh-CN" altLang="en-US" dirty="0" smtClean="0"/>
+              <a:t>字拆分</a:t>
+            </a:r>
+            <a:endParaRPr lang="en-US" altLang="zh-CN" dirty="0" smtClean="0"/>
+          </a:p>
+          <a:p>
+            <a:pPr lvl="1"/>
+            <a:r>
+              <a:rPr lang="zh-CN" altLang="en-US" dirty="0"/>
+              <a:t>文</a:t>
+            </a:r>
+            <a:r>
+              <a:rPr lang="zh-CN" altLang="en-US" dirty="0" smtClean="0"/>
+              <a:t>字提取</a:t>
+            </a:r>
+            <a:endParaRPr lang="en-US" altLang="zh-CN" dirty="0" smtClean="0"/>
+          </a:p>
+        </p:txBody>
+      </p:sp>
+    </p:spTree>
+    <p:extLst>
+      <p:ext uri="{BB962C8B-B14F-4D97-AF65-F5344CB8AC3E}">
+        <p14:creationId xmlns:p14="http://schemas.microsoft.com/office/powerpoint/2010/main" val="4040290946"/>
+      </p:ext>
+    </p:extLst>
+  </p:cSld>
+  <p:clrMapOvr>
+    <a:masterClrMapping/>
+  </p:clrMapOvr>
+</p:sld>
+</file>
+
 <file path=ppt/slides/slide2.xml><?xml version="1.0" encoding="utf-8"?>
 <p:sld xmlns:a="http://schemas.openxmlformats.org/drawingml/2006/main" xmlns:r="http://schemas.openxmlformats.org/officeDocument/2006/relationships" xmlns:p="http://schemas.openxmlformats.org/presentationml/2006/main">
   <p:cSld>
@@ -7047,19 +7219,23 @@
             </a:r>
             <a:r>
               <a:rPr lang="zh-CN" altLang="en-US" dirty="0"/>
-              <a:t>填充</a:t>
+              <a:t>填</a:t>
             </a:r>
             <a:r>
               <a:rPr lang="zh-CN" altLang="en-US" dirty="0" smtClean="0"/>
-              <a:t> </a:t>
-            </a:r>
-            <a:r>
-              <a:rPr lang="en-US" altLang="zh-CN" dirty="0" smtClean="0"/>
-              <a:t>&amp; </a:t>
-            </a:r>
+              <a:t>充</a:t>
+            </a:r>
+            <a:endParaRPr lang="en-US" altLang="zh-CN" dirty="0"/>
+          </a:p>
+          <a:p>
+            <a:pPr lvl="1"/>
             <a:r>
               <a:rPr lang="zh-CN" altLang="en-US" dirty="0" smtClean="0"/>
-              <a:t>快速填充</a:t>
+              <a:t>快</a:t>
+            </a:r>
+            <a:r>
+              <a:rPr lang="zh-CN" altLang="en-US" dirty="0" smtClean="0"/>
+              <a:t>速填充</a:t>
             </a:r>
             <a:endParaRPr lang="en-US" altLang="zh-CN" dirty="0" smtClean="0"/>
           </a:p>

</xml_diff>

<commit_message>
Complete chapter "Add or subtract time"
</commit_message>
<xml_diff>
--- a/Excel动手实验室.pptx
+++ b/Excel动手实验室.pptx
@@ -5,7 +5,7 @@
     <p:sldMasterId id="2147483648" r:id="rId1"/>
   </p:sldMasterIdLst>
   <p:notesMasterIdLst>
-    <p:notesMasterId r:id="rId13"/>
+    <p:notesMasterId r:id="rId14"/>
   </p:notesMasterIdLst>
   <p:sldIdLst>
     <p:sldId id="256" r:id="rId2"/>
@@ -19,6 +19,7 @@
     <p:sldId id="264" r:id="rId10"/>
     <p:sldId id="265" r:id="rId11"/>
     <p:sldId id="266" r:id="rId12"/>
+    <p:sldId id="267" r:id="rId13"/>
   </p:sldIdLst>
   <p:sldSz cx="12192000" cy="6858000"/>
   <p:notesSz cx="6858000" cy="9144000"/>
@@ -738,6 +739,94 @@
     <p:extLst>
       <p:ext uri="{BB962C8B-B14F-4D97-AF65-F5344CB8AC3E}">
         <p14:creationId xmlns:p14="http://schemas.microsoft.com/office/powerpoint/2010/main" val="2314056287"/>
+      </p:ext>
+    </p:extLst>
+  </p:cSld>
+  <p:clrMapOvr>
+    <a:masterClrMapping/>
+  </p:clrMapOvr>
+</p:notes>
+</file>
+
+<file path=ppt/notesSlides/notesSlide4.xml><?xml version="1.0" encoding="utf-8"?>
+<p:notes xmlns:a="http://schemas.openxmlformats.org/drawingml/2006/main" xmlns:r="http://schemas.openxmlformats.org/officeDocument/2006/relationships" xmlns:p="http://schemas.openxmlformats.org/presentationml/2006/main">
+  <p:cSld>
+    <p:spTree>
+      <p:nvGrpSpPr>
+        <p:cNvPr id="1" name=""/>
+        <p:cNvGrpSpPr/>
+        <p:nvPr/>
+      </p:nvGrpSpPr>
+      <p:grpSpPr>
+        <a:xfrm>
+          <a:off x="0" y="0"/>
+          <a:ext cx="0" cy="0"/>
+          <a:chOff x="0" y="0"/>
+          <a:chExt cx="0" cy="0"/>
+        </a:xfrm>
+      </p:grpSpPr>
+      <p:sp>
+        <p:nvSpPr>
+          <p:cNvPr id="2" name="Slide Image Placeholder 1"/>
+          <p:cNvSpPr>
+            <a:spLocks noGrp="1" noRot="1" noChangeAspect="1"/>
+          </p:cNvSpPr>
+          <p:nvPr>
+            <p:ph type="sldImg"/>
+          </p:nvPr>
+        </p:nvSpPr>
+        <p:spPr/>
+      </p:sp>
+      <p:sp>
+        <p:nvSpPr>
+          <p:cNvPr id="3" name="Notes Placeholder 2"/>
+          <p:cNvSpPr>
+            <a:spLocks noGrp="1"/>
+          </p:cNvSpPr>
+          <p:nvPr>
+            <p:ph type="body" idx="1"/>
+          </p:nvPr>
+        </p:nvSpPr>
+        <p:spPr/>
+        <p:txBody>
+          <a:bodyPr/>
+          <a:lstStyle/>
+          <a:p>
+            <a:r>
+              <a:rPr lang="zh-CN" altLang="en-US" dirty="0" smtClean="0"/>
+              <a:t>初级结束</a:t>
+            </a:r>
+            <a:endParaRPr lang="en-US" altLang="zh-CN" dirty="0" smtClean="0"/>
+          </a:p>
+        </p:txBody>
+      </p:sp>
+      <p:sp>
+        <p:nvSpPr>
+          <p:cNvPr id="4" name="Slide Number Placeholder 3"/>
+          <p:cNvSpPr>
+            <a:spLocks noGrp="1"/>
+          </p:cNvSpPr>
+          <p:nvPr>
+            <p:ph type="sldNum" sz="quarter" idx="10"/>
+          </p:nvPr>
+        </p:nvSpPr>
+        <p:spPr/>
+        <p:txBody>
+          <a:bodyPr/>
+          <a:lstStyle/>
+          <a:p>
+            <a:fld id="{287A8CE8-17C0-4AF5-9FA8-F8884093900A}" type="slidenum">
+              <a:rPr lang="zh-CN" altLang="en-US" smtClean="0"/>
+              <a:t>11</a:t>
+            </a:fld>
+            <a:endParaRPr lang="zh-CN" altLang="en-US"/>
+          </a:p>
+        </p:txBody>
+      </p:sp>
+    </p:spTree>
+    <p:extLst>
+      <p:ext uri="{BB962C8B-B14F-4D97-AF65-F5344CB8AC3E}">
+        <p14:creationId xmlns:p14="http://schemas.microsoft.com/office/powerpoint/2010/main" val="3652844556"/>
       </p:ext>
     </p:extLst>
   </p:cSld>
@@ -6908,6 +6997,189 @@
     <p:extLst>
       <p:ext uri="{BB962C8B-B14F-4D97-AF65-F5344CB8AC3E}">
         <p14:creationId xmlns:p14="http://schemas.microsoft.com/office/powerpoint/2010/main" val="4040290946"/>
+      </p:ext>
+    </p:extLst>
+  </p:cSld>
+  <p:clrMapOvr>
+    <a:masterClrMapping/>
+  </p:clrMapOvr>
+</p:sld>
+</file>
+
+<file path=ppt/slides/slide12.xml><?xml version="1.0" encoding="utf-8"?>
+<p:sld xmlns:a="http://schemas.openxmlformats.org/drawingml/2006/main" xmlns:r="http://schemas.openxmlformats.org/officeDocument/2006/relationships" xmlns:p="http://schemas.openxmlformats.org/presentationml/2006/main">
+  <p:cSld>
+    <p:spTree>
+      <p:nvGrpSpPr>
+        <p:cNvPr id="1" name=""/>
+        <p:cNvGrpSpPr/>
+        <p:nvPr/>
+      </p:nvGrpSpPr>
+      <p:grpSpPr>
+        <a:xfrm>
+          <a:off x="0" y="0"/>
+          <a:ext cx="0" cy="0"/>
+          <a:chOff x="0" y="0"/>
+          <a:chExt cx="0" cy="0"/>
+        </a:xfrm>
+      </p:grpSpPr>
+      <p:sp>
+        <p:nvSpPr>
+          <p:cNvPr id="2" name="Title 1"/>
+          <p:cNvSpPr>
+            <a:spLocks noGrp="1"/>
+          </p:cNvSpPr>
+          <p:nvPr>
+            <p:ph type="title"/>
+          </p:nvPr>
+        </p:nvSpPr>
+        <p:spPr/>
+        <p:txBody>
+          <a:bodyPr/>
+          <a:lstStyle/>
+          <a:p>
+            <a:r>
+              <a:rPr lang="en-US" altLang="zh-CN" dirty="0" smtClean="0"/>
+              <a:t>Excel</a:t>
+            </a:r>
+            <a:r>
+              <a:rPr lang="zh-CN" altLang="en-US" dirty="0" smtClean="0"/>
+              <a:t>动手实验室 </a:t>
+            </a:r>
+            <a:r>
+              <a:rPr lang="en-US" altLang="zh-CN" dirty="0" smtClean="0"/>
+              <a:t>– </a:t>
+            </a:r>
+            <a:r>
+              <a:rPr lang="zh-CN" altLang="en-US" dirty="0" smtClean="0"/>
+              <a:t>加减时间</a:t>
+            </a:r>
+            <a:endParaRPr lang="zh-CN" altLang="en-US" dirty="0"/>
+          </a:p>
+        </p:txBody>
+      </p:sp>
+      <p:sp>
+        <p:nvSpPr>
+          <p:cNvPr id="3" name="Content Placeholder 2"/>
+          <p:cNvSpPr>
+            <a:spLocks noGrp="1"/>
+          </p:cNvSpPr>
+          <p:nvPr>
+            <p:ph idx="1"/>
+          </p:nvPr>
+        </p:nvSpPr>
+        <p:spPr/>
+        <p:txBody>
+          <a:bodyPr/>
+          <a:lstStyle/>
+          <a:p>
+            <a:r>
+              <a:rPr lang="zh-CN" altLang="en-US" dirty="0" smtClean="0"/>
+              <a:t>时间相加</a:t>
+            </a:r>
+            <a:endParaRPr lang="en-US" altLang="zh-CN" dirty="0" smtClean="0"/>
+          </a:p>
+          <a:p>
+            <a:pPr lvl="1"/>
+            <a:r>
+              <a:rPr lang="zh-CN" altLang="en-US" dirty="0" smtClean="0"/>
+              <a:t>小于</a:t>
+            </a:r>
+            <a:r>
+              <a:rPr lang="en-US" altLang="zh-CN" dirty="0" smtClean="0"/>
+              <a:t>24</a:t>
+            </a:r>
+            <a:r>
+              <a:rPr lang="zh-CN" altLang="en-US" dirty="0" smtClean="0"/>
+              <a:t>小时</a:t>
+            </a:r>
+            <a:endParaRPr lang="en-US" altLang="zh-CN" dirty="0" smtClean="0"/>
+          </a:p>
+          <a:p>
+            <a:pPr lvl="1"/>
+            <a:r>
+              <a:rPr lang="zh-CN" altLang="en-US" dirty="0"/>
+              <a:t>大于</a:t>
+            </a:r>
+            <a:r>
+              <a:rPr lang="en-US" altLang="zh-CN" dirty="0" smtClean="0"/>
+              <a:t>24</a:t>
+            </a:r>
+            <a:r>
+              <a:rPr lang="zh-CN" altLang="en-US" dirty="0" smtClean="0"/>
+              <a:t>小时</a:t>
+            </a:r>
+            <a:endParaRPr lang="en-US" altLang="zh-CN" dirty="0" smtClean="0"/>
+          </a:p>
+          <a:p>
+            <a:pPr lvl="1"/>
+            <a:r>
+              <a:rPr lang="en-US" altLang="zh-CN" dirty="0" smtClean="0"/>
+              <a:t>TIME</a:t>
+            </a:r>
+            <a:r>
+              <a:rPr lang="zh-CN" altLang="en-US" dirty="0" smtClean="0"/>
+              <a:t>函数</a:t>
+            </a:r>
+            <a:endParaRPr lang="en-US" altLang="zh-CN" dirty="0" smtClean="0"/>
+          </a:p>
+          <a:p>
+            <a:r>
+              <a:rPr lang="zh-CN" altLang="en-US" dirty="0" smtClean="0"/>
+              <a:t>时间相减</a:t>
+            </a:r>
+            <a:endParaRPr lang="en-US" altLang="zh-CN" dirty="0" smtClean="0"/>
+          </a:p>
+          <a:p>
+            <a:pPr lvl="1"/>
+            <a:r>
+              <a:rPr lang="zh-CN" altLang="en-US" dirty="0" smtClean="0"/>
+              <a:t>小于</a:t>
+            </a:r>
+            <a:r>
+              <a:rPr lang="en-US" altLang="zh-CN" dirty="0" smtClean="0"/>
+              <a:t>24</a:t>
+            </a:r>
+            <a:r>
+              <a:rPr lang="zh-CN" altLang="en-US" dirty="0" smtClean="0"/>
+              <a:t>小时</a:t>
+            </a:r>
+            <a:endParaRPr lang="en-US" altLang="zh-CN" dirty="0" smtClean="0"/>
+          </a:p>
+          <a:p>
+            <a:pPr lvl="1"/>
+            <a:r>
+              <a:rPr lang="zh-CN" altLang="en-US" dirty="0" smtClean="0"/>
+              <a:t>大于</a:t>
+            </a:r>
+            <a:r>
+              <a:rPr lang="en-US" altLang="zh-CN" dirty="0" smtClean="0"/>
+              <a:t>24</a:t>
+            </a:r>
+            <a:r>
+              <a:rPr lang="zh-CN" altLang="en-US" dirty="0" smtClean="0"/>
+              <a:t>小时</a:t>
+            </a:r>
+            <a:endParaRPr lang="en-US" altLang="zh-CN" dirty="0" smtClean="0"/>
+          </a:p>
+          <a:p>
+            <a:pPr lvl="1"/>
+            <a:r>
+              <a:rPr lang="en-US" altLang="zh-CN" dirty="0" smtClean="0"/>
+              <a:t>TIME</a:t>
+            </a:r>
+            <a:r>
+              <a:rPr lang="zh-CN" altLang="en-US" dirty="0" smtClean="0"/>
+              <a:t>函数</a:t>
+            </a:r>
+            <a:endParaRPr lang="en-US" altLang="zh-CN" dirty="0"/>
+          </a:p>
+        </p:txBody>
+      </p:sp>
+    </p:spTree>
+    <p:extLst>
+      <p:ext uri="{BB962C8B-B14F-4D97-AF65-F5344CB8AC3E}">
+        <p14:creationId xmlns:p14="http://schemas.microsoft.com/office/powerpoint/2010/main" val="605839095"/>
       </p:ext>
     </p:extLst>
   </p:cSld>

</xml_diff>

<commit_message>
Complete chapter "Average a group of numbers"
</commit_message>
<xml_diff>
--- a/Excel动手实验室.pptx
+++ b/Excel动手实验室.pptx
@@ -5,7 +5,7 @@
     <p:sldMasterId id="2147483648" r:id="rId1"/>
   </p:sldMasterIdLst>
   <p:notesMasterIdLst>
-    <p:notesMasterId r:id="rId14"/>
+    <p:notesMasterId r:id="rId15"/>
   </p:notesMasterIdLst>
   <p:sldIdLst>
     <p:sldId id="256" r:id="rId2"/>
@@ -20,6 +20,7 @@
     <p:sldId id="265" r:id="rId11"/>
     <p:sldId id="266" r:id="rId12"/>
     <p:sldId id="267" r:id="rId13"/>
+    <p:sldId id="268" r:id="rId14"/>
   </p:sldIdLst>
   <p:sldSz cx="12192000" cy="6858000"/>
   <p:notesSz cx="6858000" cy="9144000"/>
@@ -7189,6 +7190,125 @@
 </p:sld>
 </file>
 
+<file path=ppt/slides/slide13.xml><?xml version="1.0" encoding="utf-8"?>
+<p:sld xmlns:a="http://schemas.openxmlformats.org/drawingml/2006/main" xmlns:r="http://schemas.openxmlformats.org/officeDocument/2006/relationships" xmlns:p="http://schemas.openxmlformats.org/presentationml/2006/main">
+  <p:cSld>
+    <p:spTree>
+      <p:nvGrpSpPr>
+        <p:cNvPr id="1" name=""/>
+        <p:cNvGrpSpPr/>
+        <p:nvPr/>
+      </p:nvGrpSpPr>
+      <p:grpSpPr>
+        <a:xfrm>
+          <a:off x="0" y="0"/>
+          <a:ext cx="0" cy="0"/>
+          <a:chOff x="0" y="0"/>
+          <a:chExt cx="0" cy="0"/>
+        </a:xfrm>
+      </p:grpSpPr>
+      <p:sp>
+        <p:nvSpPr>
+          <p:cNvPr id="2" name="Title 1"/>
+          <p:cNvSpPr>
+            <a:spLocks noGrp="1"/>
+          </p:cNvSpPr>
+          <p:nvPr>
+            <p:ph type="title"/>
+          </p:nvPr>
+        </p:nvSpPr>
+        <p:spPr/>
+        <p:txBody>
+          <a:bodyPr/>
+          <a:lstStyle/>
+          <a:p>
+            <a:r>
+              <a:rPr lang="en-US" altLang="zh-CN" dirty="0" smtClean="0"/>
+              <a:t>Excel</a:t>
+            </a:r>
+            <a:r>
+              <a:rPr lang="zh-CN" altLang="en-US" dirty="0" smtClean="0"/>
+              <a:t>动手实验室 </a:t>
+            </a:r>
+            <a:r>
+              <a:rPr lang="en-US" altLang="zh-CN" dirty="0" smtClean="0"/>
+              <a:t>– </a:t>
+            </a:r>
+            <a:r>
+              <a:rPr lang="zh-CN" altLang="en-US" dirty="0" smtClean="0"/>
+              <a:t>求平均值</a:t>
+            </a:r>
+            <a:endParaRPr lang="zh-CN" altLang="en-US" dirty="0"/>
+          </a:p>
+        </p:txBody>
+      </p:sp>
+      <p:sp>
+        <p:nvSpPr>
+          <p:cNvPr id="3" name="Content Placeholder 2"/>
+          <p:cNvSpPr>
+            <a:spLocks noGrp="1"/>
+          </p:cNvSpPr>
+          <p:nvPr>
+            <p:ph idx="1"/>
+          </p:nvPr>
+        </p:nvSpPr>
+        <p:spPr/>
+        <p:txBody>
+          <a:bodyPr/>
+          <a:lstStyle/>
+          <a:p>
+            <a:r>
+              <a:rPr lang="zh-CN" altLang="en-US" dirty="0" smtClean="0"/>
+              <a:t>自动求和</a:t>
+            </a:r>
+            <a:endParaRPr lang="en-US" altLang="zh-CN" dirty="0" smtClean="0"/>
+          </a:p>
+          <a:p>
+            <a:pPr lvl="1"/>
+            <a:r>
+              <a:rPr lang="en-US" altLang="zh-CN" dirty="0" smtClean="0"/>
+              <a:t>AVERAGE</a:t>
+            </a:r>
+          </a:p>
+          <a:p>
+            <a:r>
+              <a:rPr lang="en-US" altLang="zh-CN" dirty="0" smtClean="0"/>
+              <a:t>AVERAGEIF</a:t>
+            </a:r>
+          </a:p>
+          <a:p>
+            <a:r>
+              <a:rPr lang="zh-CN" altLang="en-US" dirty="0"/>
+              <a:t>加</a:t>
+            </a:r>
+            <a:r>
+              <a:rPr lang="zh-CN" altLang="en-US" dirty="0" smtClean="0"/>
+              <a:t>权平均值</a:t>
+            </a:r>
+            <a:endParaRPr lang="en-US" altLang="zh-CN" dirty="0" smtClean="0"/>
+          </a:p>
+          <a:p>
+            <a:pPr lvl="1"/>
+            <a:r>
+              <a:rPr lang="en-US" altLang="zh-CN" dirty="0" smtClean="0"/>
+              <a:t>SUMPRODUCT</a:t>
+            </a:r>
+          </a:p>
+        </p:txBody>
+      </p:sp>
+    </p:spTree>
+    <p:extLst>
+      <p:ext uri="{BB962C8B-B14F-4D97-AF65-F5344CB8AC3E}">
+        <p14:creationId xmlns:p14="http://schemas.microsoft.com/office/powerpoint/2010/main" val="3138764011"/>
+      </p:ext>
+    </p:extLst>
+  </p:cSld>
+  <p:clrMapOvr>
+    <a:masterClrMapping/>
+  </p:clrMapOvr>
+</p:sld>
+</file>
+
 <file path=ppt/slides/slide2.xml><?xml version="1.0" encoding="utf-8"?>
 <p:sld xmlns:a="http://schemas.openxmlformats.org/drawingml/2006/main" xmlns:r="http://schemas.openxmlformats.org/officeDocument/2006/relationships" xmlns:p="http://schemas.openxmlformats.org/presentationml/2006/main">
   <p:cSld>
@@ -7628,8 +7748,12 @@
           <a:p>
             <a:pPr lvl="1"/>
             <a:r>
+              <a:rPr lang="zh-CN" altLang="en-US" dirty="0" smtClean="0"/>
+              <a:t>求平</a:t>
+            </a:r>
+            <a:r>
               <a:rPr lang="zh-CN" altLang="en-US" dirty="0"/>
-              <a:t>求一组数的平均值</a:t>
+              <a:t>均值</a:t>
             </a:r>
             <a:endParaRPr lang="en-US" altLang="zh-CN" dirty="0"/>
           </a:p>

</xml_diff>

<commit_message>
Finish chapter "Insert headers and footers"
</commit_message>
<xml_diff>
--- a/Excel动手实验室.pptx
+++ b/Excel动手实验室.pptx
@@ -5,7 +5,7 @@
     <p:sldMasterId id="2147483648" r:id="rId1"/>
   </p:sldMasterIdLst>
   <p:notesMasterIdLst>
-    <p:notesMasterId r:id="rId15"/>
+    <p:notesMasterId r:id="rId16"/>
   </p:notesMasterIdLst>
   <p:sldIdLst>
     <p:sldId id="256" r:id="rId2"/>
@@ -21,6 +21,7 @@
     <p:sldId id="266" r:id="rId12"/>
     <p:sldId id="267" r:id="rId13"/>
     <p:sldId id="268" r:id="rId14"/>
+    <p:sldId id="269" r:id="rId15"/>
   </p:sldIdLst>
   <p:sldSz cx="12192000" cy="6858000"/>
   <p:notesSz cx="6858000" cy="9144000"/>
@@ -209,7 +210,7 @@
           <a:p>
             <a:fld id="{1BA39FD8-4789-4E5D-8B57-25E95F0DBEC2}" type="datetimeFigureOut">
               <a:rPr lang="zh-CN" altLang="en-US" smtClean="0"/>
-              <a:t>2015/5/16</a:t>
+              <a:t>2015/5/17</a:t>
             </a:fld>
             <a:endParaRPr lang="zh-CN" altLang="en-US"/>
           </a:p>
@@ -1020,7 +1021,7 @@
           <a:p>
             <a:fld id="{4AAD347D-5ACD-4C99-B74B-A9C85AD731AF}" type="datetimeFigureOut">
               <a:rPr lang="en-US" dirty="0"/>
-              <a:t>5/16/2015</a:t>
+              <a:t>5/17/2015</a:t>
             </a:fld>
             <a:endParaRPr lang="en-US" dirty="0"/>
           </a:p>
@@ -1290,7 +1291,7 @@
           <a:p>
             <a:fld id="{4509A250-FF31-4206-8172-F9D3106AACB1}" type="datetimeFigureOut">
               <a:rPr lang="en-US" dirty="0"/>
-              <a:t>5/16/2015</a:t>
+              <a:t>5/17/2015</a:t>
             </a:fld>
             <a:endParaRPr lang="en-US" dirty="0"/>
           </a:p>
@@ -1479,7 +1480,7 @@
           <a:p>
             <a:fld id="{4509A250-FF31-4206-8172-F9D3106AACB1}" type="datetimeFigureOut">
               <a:rPr lang="en-US" dirty="0"/>
-              <a:t>5/16/2015</a:t>
+              <a:t>5/17/2015</a:t>
             </a:fld>
             <a:endParaRPr lang="en-US" dirty="0"/>
           </a:p>
@@ -1742,7 +1743,7 @@
           <a:p>
             <a:fld id="{4509A250-FF31-4206-8172-F9D3106AACB1}" type="datetimeFigureOut">
               <a:rPr lang="en-US" dirty="0"/>
-              <a:t>5/16/2015</a:t>
+              <a:t>5/17/2015</a:t>
             </a:fld>
             <a:endParaRPr lang="en-US" dirty="0"/>
           </a:p>
@@ -2069,7 +2070,7 @@
           <a:p>
             <a:fld id="{4509A250-FF31-4206-8172-F9D3106AACB1}" type="datetimeFigureOut">
               <a:rPr lang="en-US" dirty="0"/>
-              <a:t>5/16/2015</a:t>
+              <a:t>5/17/2015</a:t>
             </a:fld>
             <a:endParaRPr lang="en-US" dirty="0"/>
           </a:p>
@@ -2674,7 +2675,7 @@
           <a:p>
             <a:fld id="{4509A250-FF31-4206-8172-F9D3106AACB1}" type="datetimeFigureOut">
               <a:rPr lang="en-US" dirty="0"/>
-              <a:t>5/16/2015</a:t>
+              <a:t>5/17/2015</a:t>
             </a:fld>
             <a:endParaRPr lang="en-US" dirty="0"/>
           </a:p>
@@ -3516,7 +3517,7 @@
           <a:p>
             <a:fld id="{4509A250-FF31-4206-8172-F9D3106AACB1}" type="datetimeFigureOut">
               <a:rPr lang="en-US" dirty="0"/>
-              <a:t>5/16/2015</a:t>
+              <a:t>5/17/2015</a:t>
             </a:fld>
             <a:endParaRPr lang="en-US" dirty="0"/>
           </a:p>
@@ -3681,7 +3682,7 @@
           <a:p>
             <a:fld id="{4509A250-FF31-4206-8172-F9D3106AACB1}" type="datetimeFigureOut">
               <a:rPr lang="en-US" dirty="0"/>
-              <a:t>5/16/2015</a:t>
+              <a:t>5/17/2015</a:t>
             </a:fld>
             <a:endParaRPr lang="en-US" dirty="0"/>
           </a:p>
@@ -3856,7 +3857,7 @@
           <a:p>
             <a:fld id="{4509A250-FF31-4206-8172-F9D3106AACB1}" type="datetimeFigureOut">
               <a:rPr lang="en-US" dirty="0"/>
-              <a:t>5/16/2015</a:t>
+              <a:t>5/17/2015</a:t>
             </a:fld>
             <a:endParaRPr lang="en-US" dirty="0"/>
           </a:p>
@@ -4021,7 +4022,7 @@
           <a:p>
             <a:fld id="{4509A250-FF31-4206-8172-F9D3106AACB1}" type="datetimeFigureOut">
               <a:rPr lang="en-US" dirty="0"/>
-              <a:t>5/16/2015</a:t>
+              <a:t>5/17/2015</a:t>
             </a:fld>
             <a:endParaRPr lang="en-US" dirty="0"/>
           </a:p>
@@ -4260,7 +4261,7 @@
           <a:p>
             <a:fld id="{4509A250-FF31-4206-8172-F9D3106AACB1}" type="datetimeFigureOut">
               <a:rPr lang="en-US" dirty="0"/>
-              <a:t>5/16/2015</a:t>
+              <a:t>5/17/2015</a:t>
             </a:fld>
             <a:endParaRPr lang="en-US" dirty="0"/>
           </a:p>
@@ -4547,7 +4548,7 @@
           <a:p>
             <a:fld id="{4509A250-FF31-4206-8172-F9D3106AACB1}" type="datetimeFigureOut">
               <a:rPr lang="en-US" dirty="0"/>
-              <a:t>5/16/2015</a:t>
+              <a:t>5/17/2015</a:t>
             </a:fld>
             <a:endParaRPr lang="en-US" dirty="0"/>
           </a:p>
@@ -4980,7 +4981,7 @@
           <a:p>
             <a:fld id="{4509A250-FF31-4206-8172-F9D3106AACB1}" type="datetimeFigureOut">
               <a:rPr lang="en-US" dirty="0"/>
-              <a:t>5/16/2015</a:t>
+              <a:t>5/17/2015</a:t>
             </a:fld>
             <a:endParaRPr lang="en-US" dirty="0"/>
           </a:p>
@@ -5093,7 +5094,7 @@
           <a:p>
             <a:fld id="{4509A250-FF31-4206-8172-F9D3106AACB1}" type="datetimeFigureOut">
               <a:rPr lang="en-US" dirty="0"/>
-              <a:t>5/16/2015</a:t>
+              <a:t>5/17/2015</a:t>
             </a:fld>
             <a:endParaRPr lang="en-US" dirty="0"/>
           </a:p>
@@ -5183,7 +5184,7 @@
           <a:p>
             <a:fld id="{4509A250-FF31-4206-8172-F9D3106AACB1}" type="datetimeFigureOut">
               <a:rPr lang="en-US" dirty="0"/>
-              <a:t>5/16/2015</a:t>
+              <a:t>5/17/2015</a:t>
             </a:fld>
             <a:endParaRPr lang="en-US" dirty="0"/>
           </a:p>
@@ -5457,7 +5458,7 @@
           <a:p>
             <a:fld id="{4509A250-FF31-4206-8172-F9D3106AACB1}" type="datetimeFigureOut">
               <a:rPr lang="en-US" dirty="0"/>
-              <a:t>5/16/2015</a:t>
+              <a:t>5/17/2015</a:t>
             </a:fld>
             <a:endParaRPr lang="en-US" dirty="0"/>
           </a:p>
@@ -5727,7 +5728,7 @@
           <a:p>
             <a:fld id="{4509A250-FF31-4206-8172-F9D3106AACB1}" type="datetimeFigureOut">
               <a:rPr lang="en-US" dirty="0"/>
-              <a:t>5/16/2015</a:t>
+              <a:t>5/17/2015</a:t>
             </a:fld>
             <a:endParaRPr lang="en-US" dirty="0"/>
           </a:p>
@@ -6151,7 +6152,7 @@
           <a:p>
             <a:fld id="{4509A250-FF31-4206-8172-F9D3106AACB1}" type="datetimeFigureOut">
               <a:rPr lang="en-US" dirty="0"/>
-              <a:t>5/16/2015</a:t>
+              <a:t>5/17/2015</a:t>
             </a:fld>
             <a:endParaRPr lang="en-US" dirty="0"/>
           </a:p>
@@ -7309,6 +7310,188 @@
 </p:sld>
 </file>
 
+<file path=ppt/slides/slide14.xml><?xml version="1.0" encoding="utf-8"?>
+<p:sld xmlns:a="http://schemas.openxmlformats.org/drawingml/2006/main" xmlns:r="http://schemas.openxmlformats.org/officeDocument/2006/relationships" xmlns:p="http://schemas.openxmlformats.org/presentationml/2006/main">
+  <p:cSld>
+    <p:spTree>
+      <p:nvGrpSpPr>
+        <p:cNvPr id="1" name=""/>
+        <p:cNvGrpSpPr/>
+        <p:nvPr/>
+      </p:nvGrpSpPr>
+      <p:grpSpPr>
+        <a:xfrm>
+          <a:off x="0" y="0"/>
+          <a:ext cx="0" cy="0"/>
+          <a:chOff x="0" y="0"/>
+          <a:chExt cx="0" cy="0"/>
+        </a:xfrm>
+      </p:grpSpPr>
+      <p:sp>
+        <p:nvSpPr>
+          <p:cNvPr id="2" name="Title 1"/>
+          <p:cNvSpPr>
+            <a:spLocks noGrp="1"/>
+          </p:cNvSpPr>
+          <p:nvPr>
+            <p:ph type="title"/>
+          </p:nvPr>
+        </p:nvSpPr>
+        <p:spPr/>
+        <p:txBody>
+          <a:bodyPr/>
+          <a:lstStyle/>
+          <a:p>
+            <a:r>
+              <a:rPr lang="en-US" altLang="zh-CN" dirty="0" smtClean="0"/>
+              <a:t>Excel</a:t>
+            </a:r>
+            <a:r>
+              <a:rPr lang="zh-CN" altLang="en-US" dirty="0" smtClean="0"/>
+              <a:t>动手实验室 </a:t>
+            </a:r>
+            <a:r>
+              <a:rPr lang="en-US" altLang="zh-CN" dirty="0" smtClean="0"/>
+              <a:t>– </a:t>
+            </a:r>
+            <a:r>
+              <a:rPr lang="zh-CN" altLang="en-US" dirty="0" smtClean="0"/>
+              <a:t>插入页眉和页脚</a:t>
+            </a:r>
+            <a:endParaRPr lang="zh-CN" altLang="en-US" dirty="0"/>
+          </a:p>
+        </p:txBody>
+      </p:sp>
+      <p:sp>
+        <p:nvSpPr>
+          <p:cNvPr id="3" name="Content Placeholder 2"/>
+          <p:cNvSpPr>
+            <a:spLocks noGrp="1"/>
+          </p:cNvSpPr>
+          <p:nvPr>
+            <p:ph idx="1"/>
+          </p:nvPr>
+        </p:nvSpPr>
+        <p:spPr/>
+        <p:txBody>
+          <a:bodyPr/>
+          <a:lstStyle/>
+          <a:p>
+            <a:r>
+              <a:rPr lang="zh-CN" altLang="en-US" dirty="0" smtClean="0"/>
+              <a:t>插入页眉和页脚</a:t>
+            </a:r>
+            <a:endParaRPr lang="en-US" altLang="zh-CN" dirty="0" smtClean="0"/>
+          </a:p>
+          <a:p>
+            <a:r>
+              <a:rPr lang="zh-CN" altLang="en-US" dirty="0" smtClean="0"/>
+              <a:t>深入了解页码</a:t>
+            </a:r>
+            <a:endParaRPr lang="en-US" altLang="zh-CN" dirty="0" smtClean="0"/>
+          </a:p>
+          <a:p>
+            <a:pPr lvl="1"/>
+            <a:r>
+              <a:rPr lang="zh-CN" altLang="en-US" dirty="0"/>
+              <a:t>默</a:t>
+            </a:r>
+            <a:r>
+              <a:rPr lang="zh-CN" altLang="en-US" dirty="0" smtClean="0"/>
+              <a:t>认页码</a:t>
+            </a:r>
+            <a:endParaRPr lang="en-US" altLang="zh-CN" dirty="0" smtClean="0"/>
+          </a:p>
+          <a:p>
+            <a:pPr lvl="1"/>
+            <a:r>
+              <a:rPr lang="zh-CN" altLang="en-US" dirty="0" smtClean="0"/>
+              <a:t>页序</a:t>
+            </a:r>
+            <a:endParaRPr lang="en-US" altLang="zh-CN" dirty="0" smtClean="0"/>
+          </a:p>
+          <a:p>
+            <a:pPr lvl="1"/>
+            <a:r>
+              <a:rPr lang="zh-CN" altLang="en-US" dirty="0"/>
+              <a:t>奇偶</a:t>
+            </a:r>
+            <a:r>
+              <a:rPr lang="zh-CN" altLang="en-US" dirty="0" smtClean="0"/>
+              <a:t>页不同</a:t>
+            </a:r>
+            <a:endParaRPr lang="en-US" altLang="zh-CN" dirty="0" smtClean="0"/>
+          </a:p>
+          <a:p>
+            <a:r>
+              <a:rPr lang="zh-CN" altLang="en-US" dirty="0"/>
+              <a:t>页眉页</a:t>
+            </a:r>
+            <a:r>
+              <a:rPr lang="zh-CN" altLang="en-US" dirty="0" smtClean="0"/>
+              <a:t>脚详细信息</a:t>
+            </a:r>
+            <a:endParaRPr lang="en-US" altLang="zh-CN" dirty="0" smtClean="0"/>
+          </a:p>
+          <a:p>
+            <a:pPr lvl="1"/>
+            <a:r>
+              <a:rPr lang="zh-CN" altLang="en-US" dirty="0"/>
+              <a:t>同</a:t>
+            </a:r>
+            <a:r>
+              <a:rPr lang="zh-CN" altLang="en-US" dirty="0" smtClean="0"/>
+              <a:t>时添加页眉和页脚到多个工作表</a:t>
+            </a:r>
+            <a:endParaRPr lang="en-US" altLang="zh-CN" dirty="0" smtClean="0"/>
+          </a:p>
+          <a:p>
+            <a:pPr lvl="1"/>
+            <a:r>
+              <a:rPr lang="zh-CN" altLang="en-US" dirty="0"/>
+              <a:t>首页不</a:t>
+            </a:r>
+            <a:r>
+              <a:rPr lang="zh-CN" altLang="en-US" dirty="0" smtClean="0"/>
+              <a:t>同</a:t>
+            </a:r>
+            <a:endParaRPr lang="en-US" altLang="zh-CN" dirty="0" smtClean="0"/>
+          </a:p>
+          <a:p>
+            <a:pPr lvl="1"/>
+            <a:r>
+              <a:rPr lang="zh-CN" altLang="en-US" dirty="0" smtClean="0"/>
+              <a:t>合并元素</a:t>
+            </a:r>
+            <a:endParaRPr lang="en-US" altLang="zh-CN" dirty="0" smtClean="0"/>
+          </a:p>
+          <a:p>
+            <a:pPr lvl="1"/>
+            <a:r>
+              <a:rPr lang="zh-CN" altLang="en-US" dirty="0"/>
+              <a:t>设</a:t>
+            </a:r>
+            <a:r>
+              <a:rPr lang="zh-CN" altLang="en-US" dirty="0" smtClean="0"/>
+              <a:t>置元素格式</a:t>
+            </a:r>
+            <a:endParaRPr lang="zh-CN" altLang="en-US" dirty="0"/>
+          </a:p>
+        </p:txBody>
+      </p:sp>
+    </p:spTree>
+    <p:extLst>
+      <p:ext uri="{BB962C8B-B14F-4D97-AF65-F5344CB8AC3E}">
+        <p14:creationId xmlns:p14="http://schemas.microsoft.com/office/powerpoint/2010/main" val="1117982307"/>
+      </p:ext>
+    </p:extLst>
+  </p:cSld>
+  <p:clrMapOvr>
+    <a:masterClrMapping/>
+  </p:clrMapOvr>
+</p:sld>
+</file>
+
 <file path=ppt/slides/slide2.xml><?xml version="1.0" encoding="utf-8"?>
 <p:sld xmlns:a="http://schemas.openxmlformats.org/drawingml/2006/main" xmlns:r="http://schemas.openxmlformats.org/officeDocument/2006/relationships" xmlns:p="http://schemas.openxmlformats.org/presentationml/2006/main">
   <p:cSld>
@@ -7579,11 +7762,7 @@
             <a:pPr lvl="1"/>
             <a:r>
               <a:rPr lang="zh-CN" altLang="en-US" dirty="0" smtClean="0"/>
-              <a:t>冻结或锁定窗</a:t>
-            </a:r>
-            <a:r>
-              <a:rPr lang="zh-CN" altLang="en-US" dirty="0" smtClean="0"/>
-              <a:t>格</a:t>
+              <a:t>冻结或锁定窗格</a:t>
             </a:r>
             <a:endParaRPr lang="en-US" altLang="zh-CN" dirty="0" smtClean="0"/>
           </a:p>
@@ -7603,11 +7782,7 @@
             <a:pPr lvl="1"/>
             <a:r>
               <a:rPr lang="zh-CN" altLang="en-US" dirty="0" smtClean="0"/>
-              <a:t>自</a:t>
-            </a:r>
-            <a:r>
-              <a:rPr lang="zh-CN" altLang="en-US" dirty="0" smtClean="0"/>
-              <a:t>动</a:t>
+              <a:t>自动</a:t>
             </a:r>
             <a:r>
               <a:rPr lang="zh-CN" altLang="en-US" dirty="0"/>
@@ -7623,11 +7798,7 @@
             <a:pPr lvl="1"/>
             <a:r>
               <a:rPr lang="zh-CN" altLang="en-US" dirty="0" smtClean="0"/>
-              <a:t>快</a:t>
-            </a:r>
-            <a:r>
-              <a:rPr lang="zh-CN" altLang="en-US" dirty="0" smtClean="0"/>
-              <a:t>速填充</a:t>
+              <a:t>快速填充</a:t>
             </a:r>
             <a:endParaRPr lang="en-US" altLang="zh-CN" dirty="0" smtClean="0"/>
           </a:p>

</xml_diff>

<commit_message>
Complete chapter "Sort and filter data"
</commit_message>
<xml_diff>
--- a/Excel动手实验室.pptx
+++ b/Excel动手实验室.pptx
@@ -5,7 +5,7 @@
     <p:sldMasterId id="2147483648" r:id="rId1"/>
   </p:sldMasterIdLst>
   <p:notesMasterIdLst>
-    <p:notesMasterId r:id="rId17"/>
+    <p:notesMasterId r:id="rId19"/>
   </p:notesMasterIdLst>
   <p:sldIdLst>
     <p:sldId id="256" r:id="rId2"/>
@@ -23,6 +23,8 @@
     <p:sldId id="267" r:id="rId14"/>
     <p:sldId id="268" r:id="rId15"/>
     <p:sldId id="269" r:id="rId16"/>
+    <p:sldId id="271" r:id="rId17"/>
+    <p:sldId id="272" r:id="rId18"/>
   </p:sldIdLst>
   <p:sldSz cx="12192000" cy="6858000"/>
   <p:notesSz cx="6858000" cy="9144000"/>
@@ -7646,6 +7648,321 @@
 </p:sld>
 </file>
 
+<file path=ppt/slides/slide16.xml><?xml version="1.0" encoding="utf-8"?>
+<p:sld xmlns:a="http://schemas.openxmlformats.org/drawingml/2006/main" xmlns:r="http://schemas.openxmlformats.org/officeDocument/2006/relationships" xmlns:p="http://schemas.openxmlformats.org/presentationml/2006/main">
+  <p:cSld>
+    <p:spTree>
+      <p:nvGrpSpPr>
+        <p:cNvPr id="1" name=""/>
+        <p:cNvGrpSpPr/>
+        <p:nvPr/>
+      </p:nvGrpSpPr>
+      <p:grpSpPr>
+        <a:xfrm>
+          <a:off x="0" y="0"/>
+          <a:ext cx="0" cy="0"/>
+          <a:chOff x="0" y="0"/>
+          <a:chExt cx="0" cy="0"/>
+        </a:xfrm>
+      </p:grpSpPr>
+      <p:sp>
+        <p:nvSpPr>
+          <p:cNvPr id="2" name="Title 1"/>
+          <p:cNvSpPr>
+            <a:spLocks noGrp="1"/>
+          </p:cNvSpPr>
+          <p:nvPr>
+            <p:ph type="title"/>
+          </p:nvPr>
+        </p:nvSpPr>
+        <p:spPr/>
+        <p:txBody>
+          <a:bodyPr/>
+          <a:lstStyle/>
+          <a:p>
+            <a:r>
+              <a:rPr lang="en-US" altLang="zh-CN" dirty="0" smtClean="0"/>
+              <a:t>Excel</a:t>
+            </a:r>
+            <a:r>
+              <a:rPr lang="zh-CN" altLang="en-US" dirty="0" smtClean="0"/>
+              <a:t>动手实验室 </a:t>
+            </a:r>
+            <a:r>
+              <a:rPr lang="en-US" altLang="zh-CN" dirty="0" smtClean="0"/>
+              <a:t>- </a:t>
+            </a:r>
+            <a:r>
+              <a:rPr lang="zh-CN" altLang="en-US" dirty="0"/>
+              <a:t>数</a:t>
+            </a:r>
+            <a:r>
+              <a:rPr lang="zh-CN" altLang="en-US" dirty="0"/>
+              <a:t>据排序和筛选</a:t>
+            </a:r>
+          </a:p>
+        </p:txBody>
+      </p:sp>
+      <p:sp>
+        <p:nvSpPr>
+          <p:cNvPr id="3" name="Content Placeholder 2"/>
+          <p:cNvSpPr>
+            <a:spLocks noGrp="1"/>
+          </p:cNvSpPr>
+          <p:nvPr>
+            <p:ph idx="1"/>
+          </p:nvPr>
+        </p:nvSpPr>
+        <p:spPr/>
+        <p:txBody>
+          <a:bodyPr>
+            <a:normAutofit/>
+          </a:bodyPr>
+          <a:lstStyle/>
+          <a:p>
+            <a:r>
+              <a:rPr lang="zh-CN" altLang="en-US" dirty="0" smtClean="0"/>
+              <a:t>排序 </a:t>
+            </a:r>
+            <a:r>
+              <a:rPr lang="en-US" altLang="zh-CN" dirty="0" smtClean="0"/>
+              <a:t>&amp; </a:t>
+            </a:r>
+            <a:r>
+              <a:rPr lang="zh-CN" altLang="en-US" dirty="0" smtClean="0"/>
+              <a:t>筛选简介</a:t>
+            </a:r>
+            <a:endParaRPr lang="en-US" altLang="zh-CN" dirty="0" smtClean="0"/>
+          </a:p>
+          <a:p>
+            <a:r>
+              <a:rPr lang="zh-CN" altLang="en-US" dirty="0" smtClean="0"/>
+              <a:t>排序</a:t>
+            </a:r>
+            <a:endParaRPr lang="en-US" altLang="zh-CN" dirty="0" smtClean="0"/>
+          </a:p>
+          <a:p>
+            <a:pPr lvl="1"/>
+            <a:r>
+              <a:rPr lang="zh-CN" altLang="en-US" dirty="0" smtClean="0"/>
+              <a:t>单列排序</a:t>
+            </a:r>
+            <a:endParaRPr lang="en-US" altLang="zh-CN" dirty="0" smtClean="0"/>
+          </a:p>
+          <a:p>
+            <a:pPr lvl="1"/>
+            <a:r>
+              <a:rPr lang="zh-CN" altLang="en-US" dirty="0"/>
+              <a:t>多</a:t>
+            </a:r>
+            <a:r>
+              <a:rPr lang="zh-CN" altLang="en-US" dirty="0" smtClean="0"/>
+              <a:t>列排序</a:t>
+            </a:r>
+            <a:endParaRPr lang="en-US" altLang="zh-CN" dirty="0" smtClean="0"/>
+          </a:p>
+          <a:p>
+            <a:pPr lvl="1"/>
+            <a:r>
+              <a:rPr lang="zh-CN" altLang="en-US" dirty="0" smtClean="0"/>
+              <a:t>自定义排序</a:t>
+            </a:r>
+            <a:endParaRPr lang="en-US" altLang="zh-CN" dirty="0" smtClean="0"/>
+          </a:p>
+          <a:p>
+            <a:pPr lvl="1"/>
+            <a:r>
+              <a:rPr lang="zh-CN" altLang="en-US" dirty="0" smtClean="0"/>
+              <a:t>按照颜色排序</a:t>
+            </a:r>
+            <a:endParaRPr lang="en-US" altLang="zh-CN" dirty="0" smtClean="0"/>
+          </a:p>
+          <a:p>
+            <a:r>
+              <a:rPr lang="zh-CN" altLang="en-US" dirty="0"/>
+              <a:t>筛</a:t>
+            </a:r>
+            <a:r>
+              <a:rPr lang="zh-CN" altLang="en-US" dirty="0" smtClean="0"/>
+              <a:t>选</a:t>
+            </a:r>
+            <a:endParaRPr lang="en-US" altLang="zh-CN" dirty="0" smtClean="0"/>
+          </a:p>
+          <a:p>
+            <a:pPr lvl="1"/>
+            <a:r>
+              <a:rPr lang="zh-CN" altLang="en-US" dirty="0"/>
+              <a:t>自</a:t>
+            </a:r>
+            <a:r>
+              <a:rPr lang="zh-CN" altLang="en-US" dirty="0" smtClean="0"/>
+              <a:t>动筛选</a:t>
+            </a:r>
+            <a:endParaRPr lang="en-US" altLang="zh-CN" dirty="0" smtClean="0"/>
+          </a:p>
+          <a:p>
+            <a:pPr lvl="1"/>
+            <a:r>
+              <a:rPr lang="zh-CN" altLang="en-US" dirty="0"/>
+              <a:t>自定</a:t>
+            </a:r>
+            <a:r>
+              <a:rPr lang="zh-CN" altLang="en-US" dirty="0" smtClean="0"/>
+              <a:t>义筛选</a:t>
+            </a:r>
+            <a:endParaRPr lang="en-US" altLang="zh-CN" dirty="0" smtClean="0"/>
+          </a:p>
+        </p:txBody>
+      </p:sp>
+    </p:spTree>
+    <p:extLst>
+      <p:ext uri="{BB962C8B-B14F-4D97-AF65-F5344CB8AC3E}">
+        <p14:creationId xmlns:p14="http://schemas.microsoft.com/office/powerpoint/2010/main" val="90569552"/>
+      </p:ext>
+    </p:extLst>
+  </p:cSld>
+  <p:clrMapOvr>
+    <a:masterClrMapping/>
+  </p:clrMapOvr>
+</p:sld>
+</file>
+
+<file path=ppt/slides/slide17.xml><?xml version="1.0" encoding="utf-8"?>
+<p:sld xmlns:a="http://schemas.openxmlformats.org/drawingml/2006/main" xmlns:r="http://schemas.openxmlformats.org/officeDocument/2006/relationships" xmlns:p="http://schemas.openxmlformats.org/presentationml/2006/main">
+  <p:cSld>
+    <p:spTree>
+      <p:nvGrpSpPr>
+        <p:cNvPr id="1" name=""/>
+        <p:cNvGrpSpPr/>
+        <p:nvPr/>
+      </p:nvGrpSpPr>
+      <p:grpSpPr>
+        <a:xfrm>
+          <a:off x="0" y="0"/>
+          <a:ext cx="0" cy="0"/>
+          <a:chOff x="0" y="0"/>
+          <a:chExt cx="0" cy="0"/>
+        </a:xfrm>
+      </p:grpSpPr>
+      <p:sp>
+        <p:nvSpPr>
+          <p:cNvPr id="2" name="Title 1"/>
+          <p:cNvSpPr>
+            <a:spLocks noGrp="1"/>
+          </p:cNvSpPr>
+          <p:nvPr>
+            <p:ph type="title"/>
+          </p:nvPr>
+        </p:nvSpPr>
+        <p:spPr/>
+        <p:txBody>
+          <a:bodyPr/>
+          <a:lstStyle/>
+          <a:p>
+            <a:r>
+              <a:rPr lang="en-US" altLang="zh-CN" dirty="0" smtClean="0"/>
+              <a:t>Excel</a:t>
+            </a:r>
+            <a:r>
+              <a:rPr lang="zh-CN" altLang="en-US" dirty="0" smtClean="0"/>
+              <a:t>动手实验室 </a:t>
+            </a:r>
+            <a:r>
+              <a:rPr lang="en-US" altLang="zh-CN" dirty="0" smtClean="0"/>
+              <a:t>– </a:t>
+            </a:r>
+            <a:r>
+              <a:rPr lang="zh-CN" altLang="en-US" dirty="0" smtClean="0"/>
+              <a:t>高级筛选</a:t>
+            </a:r>
+            <a:endParaRPr lang="zh-CN" altLang="en-US" dirty="0"/>
+          </a:p>
+        </p:txBody>
+      </p:sp>
+      <p:sp>
+        <p:nvSpPr>
+          <p:cNvPr id="3" name="Content Placeholder 2"/>
+          <p:cNvSpPr>
+            <a:spLocks noGrp="1"/>
+          </p:cNvSpPr>
+          <p:nvPr>
+            <p:ph idx="1"/>
+          </p:nvPr>
+        </p:nvSpPr>
+        <p:spPr/>
+        <p:txBody>
+          <a:bodyPr/>
+          <a:lstStyle/>
+          <a:p>
+            <a:r>
+              <a:rPr lang="zh-CN" altLang="en-US" dirty="0"/>
+              <a:t>高级筛选</a:t>
+            </a:r>
+            <a:endParaRPr lang="en-US" altLang="zh-CN" dirty="0"/>
+          </a:p>
+          <a:p>
+            <a:pPr lvl="1"/>
+            <a:r>
+              <a:rPr lang="zh-CN" altLang="en-US" dirty="0"/>
+              <a:t>重复项</a:t>
+            </a:r>
+            <a:endParaRPr lang="en-US" altLang="zh-CN" dirty="0"/>
+          </a:p>
+          <a:p>
+            <a:pPr lvl="1"/>
+            <a:r>
+              <a:rPr lang="zh-CN" altLang="en-US" dirty="0"/>
+              <a:t>条件区</a:t>
+            </a:r>
+            <a:r>
+              <a:rPr lang="zh-CN" altLang="en-US" dirty="0" smtClean="0"/>
+              <a:t>域</a:t>
+            </a:r>
+            <a:endParaRPr lang="en-US" altLang="zh-CN" dirty="0" smtClean="0"/>
+          </a:p>
+          <a:p>
+            <a:pPr lvl="1"/>
+            <a:r>
+              <a:rPr lang="zh-CN" altLang="en-US" dirty="0" smtClean="0"/>
+              <a:t>条件区域自</a:t>
+            </a:r>
+            <a:r>
+              <a:rPr lang="zh-CN" altLang="en-US" dirty="0"/>
+              <a:t>定</a:t>
+            </a:r>
+            <a:r>
+              <a:rPr lang="zh-CN" altLang="en-US" dirty="0" smtClean="0"/>
+              <a:t>义条件</a:t>
+            </a:r>
+            <a:endParaRPr lang="en-US" altLang="zh-CN" dirty="0" smtClean="0"/>
+          </a:p>
+          <a:p>
+            <a:pPr lvl="1"/>
+            <a:r>
+              <a:rPr lang="zh-CN" altLang="en-US"/>
+              <a:t>复</a:t>
+            </a:r>
+            <a:r>
+              <a:rPr lang="zh-CN" altLang="en-US" smtClean="0"/>
+              <a:t>制筛选结果</a:t>
+            </a:r>
+            <a:endParaRPr lang="zh-CN" altLang="en-US"/>
+          </a:p>
+        </p:txBody>
+      </p:sp>
+    </p:spTree>
+    <p:extLst>
+      <p:ext uri="{BB962C8B-B14F-4D97-AF65-F5344CB8AC3E}">
+        <p14:creationId xmlns:p14="http://schemas.microsoft.com/office/powerpoint/2010/main" val="1666430600"/>
+      </p:ext>
+    </p:extLst>
+  </p:cSld>
+  <p:clrMapOvr>
+    <a:masterClrMapping/>
+  </p:clrMapOvr>
+</p:sld>
+</file>
+
 <file path=ppt/slides/slide2.xml><?xml version="1.0" encoding="utf-8"?>
 <p:sld xmlns:a="http://schemas.openxmlformats.org/drawingml/2006/main" xmlns:r="http://schemas.openxmlformats.org/officeDocument/2006/relationships" xmlns:p="http://schemas.openxmlformats.org/presentationml/2006/main">
   <p:cSld>
@@ -7817,7 +8134,7 @@
           </a:p>
           <a:p>
             <a:r>
-              <a:rPr lang="zh-CN" altLang="en-US"/>
+              <a:rPr lang="zh-CN" altLang="en-US" dirty="0"/>
               <a:t>兼容性</a:t>
             </a:r>
             <a:endParaRPr lang="en-US" altLang="zh-CN" dirty="0" smtClean="0"/>

</xml_diff>

<commit_message>
Complete "Use conditional formatting"
</commit_message>
<xml_diff>
--- a/Excel动手实验室.pptx
+++ b/Excel动手实验室.pptx
@@ -5,7 +5,7 @@
     <p:sldMasterId id="2147483648" r:id="rId1"/>
   </p:sldMasterIdLst>
   <p:notesMasterIdLst>
-    <p:notesMasterId r:id="rId19"/>
+    <p:notesMasterId r:id="rId20"/>
   </p:notesMasterIdLst>
   <p:sldIdLst>
     <p:sldId id="256" r:id="rId2"/>
@@ -25,6 +25,7 @@
     <p:sldId id="269" r:id="rId16"/>
     <p:sldId id="271" r:id="rId17"/>
     <p:sldId id="272" r:id="rId18"/>
+    <p:sldId id="273" r:id="rId19"/>
   </p:sldIdLst>
   <p:sldSz cx="12192000" cy="6858000"/>
   <p:notesSz cx="6858000" cy="9144000"/>
@@ -7939,14 +7940,14 @@
           <a:p>
             <a:pPr lvl="1"/>
             <a:r>
-              <a:rPr lang="zh-CN" altLang="en-US"/>
+              <a:rPr lang="zh-CN" altLang="en-US" dirty="0"/>
               <a:t>复</a:t>
             </a:r>
             <a:r>
-              <a:rPr lang="zh-CN" altLang="en-US" smtClean="0"/>
+              <a:rPr lang="zh-CN" altLang="en-US" dirty="0" smtClean="0"/>
               <a:t>制筛选结果</a:t>
             </a:r>
-            <a:endParaRPr lang="zh-CN" altLang="en-US"/>
+            <a:endParaRPr lang="zh-CN" altLang="en-US" dirty="0"/>
           </a:p>
         </p:txBody>
       </p:sp>
@@ -7954,6 +7955,146 @@
     <p:extLst>
       <p:ext uri="{BB962C8B-B14F-4D97-AF65-F5344CB8AC3E}">
         <p14:creationId xmlns:p14="http://schemas.microsoft.com/office/powerpoint/2010/main" val="1666430600"/>
+      </p:ext>
+    </p:extLst>
+  </p:cSld>
+  <p:clrMapOvr>
+    <a:masterClrMapping/>
+  </p:clrMapOvr>
+</p:sld>
+</file>
+
+<file path=ppt/slides/slide18.xml><?xml version="1.0" encoding="utf-8"?>
+<p:sld xmlns:a="http://schemas.openxmlformats.org/drawingml/2006/main" xmlns:r="http://schemas.openxmlformats.org/officeDocument/2006/relationships" xmlns:p="http://schemas.openxmlformats.org/presentationml/2006/main">
+  <p:cSld>
+    <p:spTree>
+      <p:nvGrpSpPr>
+        <p:cNvPr id="1" name=""/>
+        <p:cNvGrpSpPr/>
+        <p:nvPr/>
+      </p:nvGrpSpPr>
+      <p:grpSpPr>
+        <a:xfrm>
+          <a:off x="0" y="0"/>
+          <a:ext cx="0" cy="0"/>
+          <a:chOff x="0" y="0"/>
+          <a:chExt cx="0" cy="0"/>
+        </a:xfrm>
+      </p:grpSpPr>
+      <p:sp>
+        <p:nvSpPr>
+          <p:cNvPr id="2" name="Title 1"/>
+          <p:cNvSpPr>
+            <a:spLocks noGrp="1"/>
+          </p:cNvSpPr>
+          <p:nvPr>
+            <p:ph type="title"/>
+          </p:nvPr>
+        </p:nvSpPr>
+        <p:spPr/>
+        <p:txBody>
+          <a:bodyPr/>
+          <a:lstStyle/>
+          <a:p>
+            <a:r>
+              <a:rPr lang="en-US" altLang="zh-CN" dirty="0" smtClean="0"/>
+              <a:t>Excel</a:t>
+            </a:r>
+            <a:r>
+              <a:rPr lang="zh-CN" altLang="en-US" dirty="0" smtClean="0"/>
+              <a:t>动手实验室 </a:t>
+            </a:r>
+            <a:r>
+              <a:rPr lang="en-US" altLang="zh-CN" dirty="0" smtClean="0"/>
+              <a:t>– </a:t>
+            </a:r>
+            <a:r>
+              <a:rPr lang="zh-CN" altLang="en-US" dirty="0" smtClean="0"/>
+              <a:t>使用条件格式</a:t>
+            </a:r>
+            <a:endParaRPr lang="zh-CN" altLang="en-US" dirty="0"/>
+          </a:p>
+        </p:txBody>
+      </p:sp>
+      <p:sp>
+        <p:nvSpPr>
+          <p:cNvPr id="3" name="Content Placeholder 2"/>
+          <p:cNvSpPr>
+            <a:spLocks noGrp="1"/>
+          </p:cNvSpPr>
+          <p:nvPr>
+            <p:ph idx="1"/>
+          </p:nvPr>
+        </p:nvSpPr>
+        <p:spPr/>
+        <p:txBody>
+          <a:bodyPr/>
+          <a:lstStyle/>
+          <a:p>
+            <a:r>
+              <a:rPr lang="zh-CN" altLang="en-US" dirty="0" smtClean="0"/>
+              <a:t>简介</a:t>
+            </a:r>
+            <a:endParaRPr lang="en-US" altLang="zh-CN" dirty="0" smtClean="0"/>
+          </a:p>
+          <a:p>
+            <a:pPr lvl="1"/>
+            <a:r>
+              <a:rPr lang="zh-CN" altLang="en-US" dirty="0" smtClean="0"/>
+              <a:t>条件格式</a:t>
+            </a:r>
+            <a:endParaRPr lang="en-US" altLang="zh-CN" dirty="0" smtClean="0"/>
+          </a:p>
+          <a:p>
+            <a:pPr lvl="1"/>
+            <a:r>
+              <a:rPr lang="zh-CN" altLang="en-US" dirty="0"/>
+              <a:t>多</a:t>
+            </a:r>
+            <a:r>
+              <a:rPr lang="zh-CN" altLang="en-US" dirty="0" smtClean="0"/>
+              <a:t>种条件格式</a:t>
+            </a:r>
+            <a:endParaRPr lang="en-US" altLang="zh-CN" dirty="0" smtClean="0"/>
+          </a:p>
+          <a:p>
+            <a:r>
+              <a:rPr lang="zh-CN" altLang="en-US" dirty="0" smtClean="0"/>
+              <a:t>为日期设置条件格式</a:t>
+            </a:r>
+            <a:endParaRPr lang="en-US" altLang="zh-CN" dirty="0" smtClean="0"/>
+          </a:p>
+          <a:p>
+            <a:pPr lvl="1"/>
+            <a:r>
+              <a:rPr lang="en-US" altLang="zh-CN" dirty="0" smtClean="0"/>
+              <a:t>TODAY</a:t>
+            </a:r>
+          </a:p>
+          <a:p>
+            <a:r>
+              <a:rPr lang="zh-CN" altLang="en-US" dirty="0" smtClean="0"/>
+              <a:t>为文本设置条件格式</a:t>
+            </a:r>
+            <a:endParaRPr lang="en-US" altLang="zh-CN" dirty="0" smtClean="0"/>
+          </a:p>
+          <a:p>
+            <a:r>
+              <a:rPr lang="zh-CN" altLang="en-US" dirty="0"/>
+              <a:t>复</a:t>
+            </a:r>
+            <a:r>
+              <a:rPr lang="zh-CN" altLang="en-US" dirty="0" smtClean="0"/>
+              <a:t>制和删除条件格式</a:t>
+            </a:r>
+            <a:endParaRPr lang="zh-CN" altLang="en-US" dirty="0"/>
+          </a:p>
+        </p:txBody>
+      </p:sp>
+    </p:spTree>
+    <p:extLst>
+      <p:ext uri="{BB962C8B-B14F-4D97-AF65-F5344CB8AC3E}">
+        <p14:creationId xmlns:p14="http://schemas.microsoft.com/office/powerpoint/2010/main" val="665936835"/>
       </p:ext>
     </p:extLst>
   </p:cSld>

</xml_diff>

<commit_message>
Complete "Take conditional formatting to the next level"
</commit_message>
<xml_diff>
--- a/Excel动手实验室.pptx
+++ b/Excel动手实验室.pptx
@@ -5,7 +5,7 @@
     <p:sldMasterId id="2147483648" r:id="rId1"/>
   </p:sldMasterIdLst>
   <p:notesMasterIdLst>
-    <p:notesMasterId r:id="rId20"/>
+    <p:notesMasterId r:id="rId21"/>
   </p:notesMasterIdLst>
   <p:sldIdLst>
     <p:sldId id="256" r:id="rId2"/>
@@ -26,6 +26,7 @@
     <p:sldId id="271" r:id="rId17"/>
     <p:sldId id="272" r:id="rId18"/>
     <p:sldId id="273" r:id="rId19"/>
+    <p:sldId id="274" r:id="rId20"/>
   </p:sldIdLst>
   <p:sldSz cx="12192000" cy="6858000"/>
   <p:notesSz cx="6858000" cy="9144000"/>
@@ -8095,6 +8096,191 @@
     <p:extLst>
       <p:ext uri="{BB962C8B-B14F-4D97-AF65-F5344CB8AC3E}">
         <p14:creationId xmlns:p14="http://schemas.microsoft.com/office/powerpoint/2010/main" val="665936835"/>
+      </p:ext>
+    </p:extLst>
+  </p:cSld>
+  <p:clrMapOvr>
+    <a:masterClrMapping/>
+  </p:clrMapOvr>
+</p:sld>
+</file>
+
+<file path=ppt/slides/slide19.xml><?xml version="1.0" encoding="utf-8"?>
+<p:sld xmlns:a="http://schemas.openxmlformats.org/drawingml/2006/main" xmlns:r="http://schemas.openxmlformats.org/officeDocument/2006/relationships" xmlns:p="http://schemas.openxmlformats.org/presentationml/2006/main">
+  <p:cSld>
+    <p:spTree>
+      <p:nvGrpSpPr>
+        <p:cNvPr id="1" name=""/>
+        <p:cNvGrpSpPr/>
+        <p:nvPr/>
+      </p:nvGrpSpPr>
+      <p:grpSpPr>
+        <a:xfrm>
+          <a:off x="0" y="0"/>
+          <a:ext cx="0" cy="0"/>
+          <a:chOff x="0" y="0"/>
+          <a:chExt cx="0" cy="0"/>
+        </a:xfrm>
+      </p:grpSpPr>
+      <p:sp>
+        <p:nvSpPr>
+          <p:cNvPr id="2" name="Title 1"/>
+          <p:cNvSpPr>
+            <a:spLocks noGrp="1"/>
+          </p:cNvSpPr>
+          <p:nvPr>
+            <p:ph type="title"/>
+          </p:nvPr>
+        </p:nvSpPr>
+        <p:spPr/>
+        <p:txBody>
+          <a:bodyPr/>
+          <a:lstStyle/>
+          <a:p>
+            <a:r>
+              <a:rPr lang="en-US" altLang="zh-CN" dirty="0" smtClean="0"/>
+              <a:t>Excel</a:t>
+            </a:r>
+            <a:r>
+              <a:rPr lang="zh-CN" altLang="en-US" dirty="0" smtClean="0"/>
+              <a:t>动手实验室 </a:t>
+            </a:r>
+            <a:r>
+              <a:rPr lang="en-US" altLang="zh-CN" dirty="0" smtClean="0"/>
+              <a:t>- </a:t>
+            </a:r>
+            <a:r>
+              <a:rPr lang="zh-CN" altLang="en-US" dirty="0" smtClean="0"/>
+              <a:t>条</a:t>
+            </a:r>
+            <a:r>
+              <a:rPr lang="zh-CN" altLang="en-US" dirty="0"/>
+              <a:t>件格</a:t>
+            </a:r>
+            <a:r>
+              <a:rPr lang="zh-CN" altLang="en-US" dirty="0" smtClean="0"/>
+              <a:t>式（高级）</a:t>
+            </a:r>
+            <a:endParaRPr lang="zh-CN" altLang="en-US" dirty="0"/>
+          </a:p>
+        </p:txBody>
+      </p:sp>
+      <p:sp>
+        <p:nvSpPr>
+          <p:cNvPr id="3" name="Content Placeholder 2"/>
+          <p:cNvSpPr>
+            <a:spLocks noGrp="1"/>
+          </p:cNvSpPr>
+          <p:nvPr>
+            <p:ph idx="1"/>
+          </p:nvPr>
+        </p:nvSpPr>
+        <p:spPr/>
+        <p:txBody>
+          <a:bodyPr/>
+          <a:lstStyle/>
+          <a:p>
+            <a:r>
+              <a:rPr lang="zh-CN" altLang="en-US" dirty="0" smtClean="0"/>
+              <a:t>创建规则</a:t>
+            </a:r>
+            <a:endParaRPr lang="en-US" altLang="zh-CN" dirty="0" smtClean="0"/>
+          </a:p>
+          <a:p>
+            <a:pPr lvl="1"/>
+            <a:r>
+              <a:rPr lang="zh-CN" altLang="en-US" dirty="0" smtClean="0"/>
+              <a:t>错误单元格</a:t>
+            </a:r>
+            <a:endParaRPr lang="en-US" altLang="zh-CN" dirty="0" smtClean="0"/>
+          </a:p>
+          <a:p>
+            <a:r>
+              <a:rPr lang="zh-CN" altLang="en-US" dirty="0"/>
+              <a:t>公</a:t>
+            </a:r>
+            <a:r>
+              <a:rPr lang="zh-CN" altLang="en-US" dirty="0" smtClean="0"/>
+              <a:t>式应用条件格式</a:t>
+            </a:r>
+            <a:endParaRPr lang="en-US" altLang="zh-CN" dirty="0" smtClean="0"/>
+          </a:p>
+          <a:p>
+            <a:pPr lvl="1"/>
+            <a:r>
+              <a:rPr lang="zh-CN" altLang="en-US" dirty="0"/>
+              <a:t>活</a:t>
+            </a:r>
+            <a:r>
+              <a:rPr lang="zh-CN" altLang="en-US" dirty="0" smtClean="0"/>
+              <a:t>动单元格</a:t>
+            </a:r>
+            <a:endParaRPr lang="en-US" altLang="zh-CN" dirty="0" smtClean="0"/>
+          </a:p>
+          <a:p>
+            <a:pPr lvl="1"/>
+            <a:r>
+              <a:rPr lang="en-US" altLang="zh-CN" dirty="0" smtClean="0"/>
+              <a:t>AND</a:t>
+            </a:r>
+          </a:p>
+          <a:p>
+            <a:r>
+              <a:rPr lang="zh-CN" altLang="en-US" dirty="0"/>
+              <a:t>管</a:t>
+            </a:r>
+            <a:r>
+              <a:rPr lang="zh-CN" altLang="en-US" dirty="0" smtClean="0"/>
+              <a:t>理条件格式</a:t>
+            </a:r>
+            <a:endParaRPr lang="en-US" altLang="zh-CN" dirty="0" smtClean="0"/>
+          </a:p>
+          <a:p>
+            <a:pPr lvl="1"/>
+            <a:r>
+              <a:rPr lang="zh-CN" altLang="en-US" dirty="0"/>
+              <a:t>优</a:t>
+            </a:r>
+            <a:r>
+              <a:rPr lang="zh-CN" altLang="en-US"/>
+              <a:t>先</a:t>
+            </a:r>
+            <a:r>
+              <a:rPr lang="zh-CN" altLang="en-US" smtClean="0"/>
+              <a:t>级</a:t>
+            </a:r>
+            <a:endParaRPr lang="en-US" altLang="zh-CN" smtClean="0"/>
+          </a:p>
+          <a:p>
+            <a:pPr lvl="1"/>
+            <a:r>
+              <a:rPr lang="zh-CN" altLang="en-US"/>
+              <a:t>查</a:t>
+            </a:r>
+            <a:r>
+              <a:rPr lang="zh-CN" altLang="en-US" smtClean="0"/>
+              <a:t>看</a:t>
+            </a:r>
+            <a:endParaRPr lang="en-US" altLang="zh-CN" smtClean="0"/>
+          </a:p>
+          <a:p>
+            <a:pPr lvl="1"/>
+            <a:r>
+              <a:rPr lang="zh-CN" altLang="en-US"/>
+              <a:t>排</a:t>
+            </a:r>
+            <a:r>
+              <a:rPr lang="zh-CN" altLang="en-US" smtClean="0"/>
+              <a:t>序和筛选</a:t>
+            </a:r>
+            <a:endParaRPr lang="zh-CN" altLang="en-US" dirty="0"/>
+          </a:p>
+        </p:txBody>
+      </p:sp>
+    </p:spTree>
+    <p:extLst>
+      <p:ext uri="{BB962C8B-B14F-4D97-AF65-F5344CB8AC3E}">
+        <p14:creationId xmlns:p14="http://schemas.microsoft.com/office/powerpoint/2010/main" val="3964956504"/>
       </p:ext>
     </p:extLst>
   </p:cSld>

</xml_diff>

<commit_message>
Complete the "VLOOKUP function"
</commit_message>
<xml_diff>
--- a/Excel动手实验室.pptx
+++ b/Excel动手实验室.pptx
@@ -5,7 +5,7 @@
     <p:sldMasterId id="2147483648" r:id="rId1"/>
   </p:sldMasterIdLst>
   <p:notesMasterIdLst>
-    <p:notesMasterId r:id="rId21"/>
+    <p:notesMasterId r:id="rId23"/>
   </p:notesMasterIdLst>
   <p:sldIdLst>
     <p:sldId id="256" r:id="rId2"/>
@@ -27,6 +27,8 @@
     <p:sldId id="272" r:id="rId18"/>
     <p:sldId id="273" r:id="rId19"/>
     <p:sldId id="274" r:id="rId20"/>
+    <p:sldId id="275" r:id="rId21"/>
+    <p:sldId id="276" r:id="rId22"/>
   </p:sldIdLst>
   <p:sldSz cx="12192000" cy="6858000"/>
   <p:notesSz cx="6858000" cy="9144000"/>
@@ -834,6 +836,94 @@
     <p:extLst>
       <p:ext uri="{BB962C8B-B14F-4D97-AF65-F5344CB8AC3E}">
         <p14:creationId xmlns:p14="http://schemas.microsoft.com/office/powerpoint/2010/main" val="3652844556"/>
+      </p:ext>
+    </p:extLst>
+  </p:cSld>
+  <p:clrMapOvr>
+    <a:masterClrMapping/>
+  </p:clrMapOvr>
+</p:notes>
+</file>
+
+<file path=ppt/notesSlides/notesSlide5.xml><?xml version="1.0" encoding="utf-8"?>
+<p:notes xmlns:a="http://schemas.openxmlformats.org/drawingml/2006/main" xmlns:r="http://schemas.openxmlformats.org/officeDocument/2006/relationships" xmlns:p="http://schemas.openxmlformats.org/presentationml/2006/main">
+  <p:cSld>
+    <p:spTree>
+      <p:nvGrpSpPr>
+        <p:cNvPr id="1" name=""/>
+        <p:cNvGrpSpPr/>
+        <p:nvPr/>
+      </p:nvGrpSpPr>
+      <p:grpSpPr>
+        <a:xfrm>
+          <a:off x="0" y="0"/>
+          <a:ext cx="0" cy="0"/>
+          <a:chOff x="0" y="0"/>
+          <a:chExt cx="0" cy="0"/>
+        </a:xfrm>
+      </p:grpSpPr>
+      <p:sp>
+        <p:nvSpPr>
+          <p:cNvPr id="2" name="Slide Image Placeholder 1"/>
+          <p:cNvSpPr>
+            <a:spLocks noGrp="1" noRot="1" noChangeAspect="1"/>
+          </p:cNvSpPr>
+          <p:nvPr>
+            <p:ph type="sldImg"/>
+          </p:nvPr>
+        </p:nvSpPr>
+        <p:spPr/>
+      </p:sp>
+      <p:sp>
+        <p:nvSpPr>
+          <p:cNvPr id="3" name="Notes Placeholder 2"/>
+          <p:cNvSpPr>
+            <a:spLocks noGrp="1"/>
+          </p:cNvSpPr>
+          <p:nvPr>
+            <p:ph type="body" idx="1"/>
+          </p:nvPr>
+        </p:nvSpPr>
+        <p:spPr/>
+        <p:txBody>
+          <a:bodyPr/>
+          <a:lstStyle/>
+          <a:p>
+            <a:r>
+              <a:rPr lang="zh-CN" altLang="en-US" dirty="0" smtClean="0"/>
+              <a:t>中级结束</a:t>
+            </a:r>
+            <a:endParaRPr lang="zh-CN" altLang="en-US" dirty="0"/>
+          </a:p>
+        </p:txBody>
+      </p:sp>
+      <p:sp>
+        <p:nvSpPr>
+          <p:cNvPr id="4" name="Slide Number Placeholder 3"/>
+          <p:cNvSpPr>
+            <a:spLocks noGrp="1"/>
+          </p:cNvSpPr>
+          <p:nvPr>
+            <p:ph type="sldNum" sz="quarter" idx="10"/>
+          </p:nvPr>
+        </p:nvSpPr>
+        <p:spPr/>
+        <p:txBody>
+          <a:bodyPr/>
+          <a:lstStyle/>
+          <a:p>
+            <a:fld id="{287A8CE8-17C0-4AF5-9FA8-F8884093900A}" type="slidenum">
+              <a:rPr lang="zh-CN" altLang="en-US" smtClean="0"/>
+              <a:t>20</a:t>
+            </a:fld>
+            <a:endParaRPr lang="zh-CN" altLang="en-US"/>
+          </a:p>
+        </p:txBody>
+      </p:sp>
+    </p:spTree>
+    <p:extLst>
+      <p:ext uri="{BB962C8B-B14F-4D97-AF65-F5344CB8AC3E}">
+        <p14:creationId xmlns:p14="http://schemas.microsoft.com/office/powerpoint/2010/main" val="4271758003"/>
       </p:ext>
     </p:extLst>
   </p:cSld>
@@ -8239,38 +8329,34 @@
             <a:pPr lvl="1"/>
             <a:r>
               <a:rPr lang="zh-CN" altLang="en-US" dirty="0"/>
-              <a:t>优</a:t>
-            </a:r>
-            <a:r>
-              <a:rPr lang="zh-CN" altLang="en-US"/>
-              <a:t>先</a:t>
-            </a:r>
-            <a:r>
-              <a:rPr lang="zh-CN" altLang="en-US" smtClean="0"/>
+              <a:t>优先</a:t>
+            </a:r>
+            <a:r>
+              <a:rPr lang="zh-CN" altLang="en-US" dirty="0" smtClean="0"/>
               <a:t>级</a:t>
             </a:r>
-            <a:endParaRPr lang="en-US" altLang="zh-CN" smtClean="0"/>
+            <a:endParaRPr lang="en-US" altLang="zh-CN" dirty="0" smtClean="0"/>
           </a:p>
           <a:p>
             <a:pPr lvl="1"/>
             <a:r>
-              <a:rPr lang="zh-CN" altLang="en-US"/>
+              <a:rPr lang="zh-CN" altLang="en-US" dirty="0"/>
               <a:t>查</a:t>
             </a:r>
             <a:r>
-              <a:rPr lang="zh-CN" altLang="en-US" smtClean="0"/>
+              <a:rPr lang="zh-CN" altLang="en-US" dirty="0" smtClean="0"/>
               <a:t>看</a:t>
             </a:r>
-            <a:endParaRPr lang="en-US" altLang="zh-CN" smtClean="0"/>
+            <a:endParaRPr lang="en-US" altLang="zh-CN" dirty="0" smtClean="0"/>
           </a:p>
           <a:p>
             <a:pPr lvl="1"/>
             <a:r>
-              <a:rPr lang="zh-CN" altLang="en-US"/>
+              <a:rPr lang="zh-CN" altLang="en-US" dirty="0"/>
               <a:t>排</a:t>
             </a:r>
             <a:r>
-              <a:rPr lang="zh-CN" altLang="en-US" smtClean="0"/>
+              <a:rPr lang="zh-CN" altLang="en-US" dirty="0" smtClean="0"/>
               <a:t>序和筛选</a:t>
             </a:r>
             <a:endParaRPr lang="zh-CN" altLang="en-US" dirty="0"/>
@@ -8472,6 +8558,346 @@
     <p:extLst>
       <p:ext uri="{BB962C8B-B14F-4D97-AF65-F5344CB8AC3E}">
         <p14:creationId xmlns:p14="http://schemas.microsoft.com/office/powerpoint/2010/main" val="585672565"/>
+      </p:ext>
+    </p:extLst>
+  </p:cSld>
+  <p:clrMapOvr>
+    <a:masterClrMapping/>
+  </p:clrMapOvr>
+</p:sld>
+</file>
+
+<file path=ppt/slides/slide20.xml><?xml version="1.0" encoding="utf-8"?>
+<p:sld xmlns:a="http://schemas.openxmlformats.org/drawingml/2006/main" xmlns:r="http://schemas.openxmlformats.org/officeDocument/2006/relationships" xmlns:p="http://schemas.openxmlformats.org/presentationml/2006/main">
+  <p:cSld>
+    <p:spTree>
+      <p:nvGrpSpPr>
+        <p:cNvPr id="1" name=""/>
+        <p:cNvGrpSpPr/>
+        <p:nvPr/>
+      </p:nvGrpSpPr>
+      <p:grpSpPr>
+        <a:xfrm>
+          <a:off x="0" y="0"/>
+          <a:ext cx="0" cy="0"/>
+          <a:chOff x="0" y="0"/>
+          <a:chExt cx="0" cy="0"/>
+        </a:xfrm>
+      </p:grpSpPr>
+      <p:sp>
+        <p:nvSpPr>
+          <p:cNvPr id="2" name="Title 1"/>
+          <p:cNvSpPr>
+            <a:spLocks noGrp="1"/>
+          </p:cNvSpPr>
+          <p:nvPr>
+            <p:ph type="title"/>
+          </p:nvPr>
+        </p:nvSpPr>
+        <p:spPr/>
+        <p:txBody>
+          <a:bodyPr/>
+          <a:lstStyle/>
+          <a:p>
+            <a:r>
+              <a:rPr lang="en-US" altLang="zh-CN" dirty="0" smtClean="0"/>
+              <a:t>Excel</a:t>
+            </a:r>
+            <a:r>
+              <a:rPr lang="zh-CN" altLang="en-US" dirty="0" smtClean="0"/>
+              <a:t>动手实验室 </a:t>
+            </a:r>
+            <a:r>
+              <a:rPr lang="en-US" altLang="zh-CN" dirty="0" smtClean="0"/>
+              <a:t>- VLOOKUP</a:t>
+            </a:r>
+            <a:endParaRPr lang="zh-CN" altLang="en-US" dirty="0"/>
+          </a:p>
+        </p:txBody>
+      </p:sp>
+      <p:sp>
+        <p:nvSpPr>
+          <p:cNvPr id="3" name="Content Placeholder 2"/>
+          <p:cNvSpPr>
+            <a:spLocks noGrp="1"/>
+          </p:cNvSpPr>
+          <p:nvPr>
+            <p:ph idx="1"/>
+          </p:nvPr>
+        </p:nvSpPr>
+        <p:spPr/>
+        <p:txBody>
+          <a:bodyPr/>
+          <a:lstStyle/>
+          <a:p>
+            <a:r>
+              <a:rPr lang="en-US" altLang="zh-CN" dirty="0" smtClean="0"/>
+              <a:t>VLOOKUP</a:t>
+            </a:r>
+          </a:p>
+          <a:p>
+            <a:pPr lvl="1"/>
+            <a:r>
+              <a:rPr lang="zh-CN" altLang="en-US" dirty="0"/>
+              <a:t>查</a:t>
+            </a:r>
+            <a:r>
+              <a:rPr lang="zh-CN" altLang="en-US" dirty="0" smtClean="0"/>
+              <a:t>阅值</a:t>
+            </a:r>
+            <a:endParaRPr lang="en-US" altLang="zh-CN" dirty="0" smtClean="0"/>
+          </a:p>
+          <a:p>
+            <a:pPr lvl="1"/>
+            <a:r>
+              <a:rPr lang="zh-CN" altLang="en-US" dirty="0" smtClean="0"/>
+              <a:t>查阅表格</a:t>
+            </a:r>
+            <a:endParaRPr lang="en-US" altLang="zh-CN" dirty="0" smtClean="0"/>
+          </a:p>
+          <a:p>
+            <a:pPr lvl="1"/>
+            <a:r>
+              <a:rPr lang="zh-CN" altLang="en-US" dirty="0" smtClean="0"/>
+              <a:t>列引用</a:t>
+            </a:r>
+            <a:endParaRPr lang="en-US" altLang="zh-CN" dirty="0" smtClean="0"/>
+          </a:p>
+          <a:p>
+            <a:pPr lvl="1"/>
+            <a:r>
+              <a:rPr lang="zh-CN" altLang="en-US" dirty="0" smtClean="0"/>
+              <a:t>区域查阅</a:t>
+            </a:r>
+            <a:endParaRPr lang="en-US" altLang="zh-CN" dirty="0" smtClean="0"/>
+          </a:p>
+          <a:p>
+            <a:r>
+              <a:rPr lang="zh-CN" altLang="en-US" dirty="0"/>
+              <a:t>容易犯</a:t>
+            </a:r>
+            <a:r>
+              <a:rPr lang="zh-CN" altLang="en-US" dirty="0" smtClean="0"/>
+              <a:t>的错误</a:t>
+            </a:r>
+            <a:endParaRPr lang="en-US" altLang="zh-CN" dirty="0" smtClean="0"/>
+          </a:p>
+          <a:p>
+            <a:pPr lvl="1"/>
+            <a:r>
+              <a:rPr lang="zh-CN" altLang="en-US" dirty="0" smtClean="0"/>
+              <a:t>超越表格在查阅值右侧或另外一张工作表</a:t>
+            </a:r>
+            <a:endParaRPr lang="en-US" altLang="zh-CN" dirty="0" smtClean="0"/>
+          </a:p>
+          <a:p>
+            <a:pPr lvl="1"/>
+            <a:r>
+              <a:rPr lang="zh-CN" altLang="en-US" dirty="0" smtClean="0"/>
+              <a:t>按列排列数据</a:t>
+            </a:r>
+            <a:endParaRPr lang="en-US" altLang="zh-CN" dirty="0" smtClean="0"/>
+          </a:p>
+          <a:p>
+            <a:pPr lvl="1"/>
+            <a:r>
+              <a:rPr lang="zh-CN" altLang="en-US" dirty="0"/>
+              <a:t>复</a:t>
+            </a:r>
+            <a:r>
+              <a:rPr lang="zh-CN" altLang="en-US" dirty="0" smtClean="0"/>
+              <a:t>制时绝对单元格引用</a:t>
+            </a:r>
+            <a:endParaRPr lang="zh-CN" altLang="en-US" dirty="0"/>
+          </a:p>
+        </p:txBody>
+      </p:sp>
+    </p:spTree>
+    <p:extLst>
+      <p:ext uri="{BB962C8B-B14F-4D97-AF65-F5344CB8AC3E}">
+        <p14:creationId xmlns:p14="http://schemas.microsoft.com/office/powerpoint/2010/main" val="3629747466"/>
+      </p:ext>
+    </p:extLst>
+  </p:cSld>
+  <p:clrMapOvr>
+    <a:masterClrMapping/>
+  </p:clrMapOvr>
+</p:sld>
+</file>
+
+<file path=ppt/slides/slide21.xml><?xml version="1.0" encoding="utf-8"?>
+<p:sld xmlns:a="http://schemas.openxmlformats.org/drawingml/2006/main" xmlns:r="http://schemas.openxmlformats.org/officeDocument/2006/relationships" xmlns:p="http://schemas.openxmlformats.org/presentationml/2006/main">
+  <p:cSld>
+    <p:spTree>
+      <p:nvGrpSpPr>
+        <p:cNvPr id="1" name=""/>
+        <p:cNvGrpSpPr/>
+        <p:nvPr/>
+      </p:nvGrpSpPr>
+      <p:grpSpPr>
+        <a:xfrm>
+          <a:off x="0" y="0"/>
+          <a:ext cx="0" cy="0"/>
+          <a:chOff x="0" y="0"/>
+          <a:chExt cx="0" cy="0"/>
+        </a:xfrm>
+      </p:grpSpPr>
+      <p:sp>
+        <p:nvSpPr>
+          <p:cNvPr id="2" name="Title 1"/>
+          <p:cNvSpPr>
+            <a:spLocks noGrp="1"/>
+          </p:cNvSpPr>
+          <p:nvPr>
+            <p:ph type="title"/>
+          </p:nvPr>
+        </p:nvSpPr>
+        <p:spPr/>
+        <p:txBody>
+          <a:bodyPr/>
+          <a:lstStyle/>
+          <a:p>
+            <a:r>
+              <a:rPr lang="en-US" altLang="zh-CN" dirty="0" smtClean="0"/>
+              <a:t>Excel</a:t>
+            </a:r>
+            <a:r>
+              <a:rPr lang="zh-CN" altLang="en-US" dirty="0" smtClean="0"/>
+              <a:t>动手实验室 </a:t>
+            </a:r>
+            <a:r>
+              <a:rPr lang="en-US" altLang="zh-CN" dirty="0" smtClean="0"/>
+              <a:t>– </a:t>
+            </a:r>
+            <a:r>
+              <a:rPr lang="zh-CN" altLang="en-US" dirty="0" smtClean="0"/>
+              <a:t>高级</a:t>
+            </a:r>
+            <a:r>
+              <a:rPr lang="en-US" altLang="zh-CN" dirty="0" smtClean="0"/>
+              <a:t>IF</a:t>
+            </a:r>
+            <a:r>
+              <a:rPr lang="zh-CN" altLang="en-US" dirty="0" smtClean="0"/>
+              <a:t>函数</a:t>
+            </a:r>
+            <a:endParaRPr lang="zh-CN" altLang="en-US" dirty="0"/>
+          </a:p>
+        </p:txBody>
+      </p:sp>
+      <p:sp>
+        <p:nvSpPr>
+          <p:cNvPr id="3" name="Content Placeholder 2"/>
+          <p:cNvSpPr>
+            <a:spLocks noGrp="1"/>
+          </p:cNvSpPr>
+          <p:nvPr>
+            <p:ph idx="1"/>
+          </p:nvPr>
+        </p:nvSpPr>
+        <p:spPr/>
+        <p:txBody>
+          <a:bodyPr/>
+          <a:lstStyle/>
+          <a:p>
+            <a:r>
+              <a:rPr lang="en-US" altLang="zh-CN" dirty="0" smtClean="0"/>
+              <a:t>IF</a:t>
+            </a:r>
+            <a:r>
+              <a:rPr lang="zh-CN" altLang="en-US" dirty="0" smtClean="0"/>
+              <a:t>函数</a:t>
+            </a:r>
+            <a:endParaRPr lang="en-US" altLang="zh-CN" dirty="0" smtClean="0"/>
+          </a:p>
+          <a:p>
+            <a:pPr lvl="1"/>
+            <a:r>
+              <a:rPr lang="zh-CN" altLang="en-US" dirty="0" smtClean="0"/>
+              <a:t>比较文本</a:t>
+            </a:r>
+            <a:endParaRPr lang="en-US" altLang="zh-CN" dirty="0" smtClean="0"/>
+          </a:p>
+          <a:p>
+            <a:pPr lvl="1"/>
+            <a:r>
+              <a:rPr lang="en-US" altLang="zh-CN" dirty="0" smtClean="0"/>
+              <a:t>TRIM</a:t>
+            </a:r>
+          </a:p>
+          <a:p>
+            <a:r>
+              <a:rPr lang="zh-CN" altLang="en-US" dirty="0"/>
+              <a:t>嵌</a:t>
+            </a:r>
+            <a:r>
+              <a:rPr lang="zh-CN" altLang="en-US" dirty="0" smtClean="0"/>
+              <a:t>套</a:t>
+            </a:r>
+            <a:r>
+              <a:rPr lang="en-US" altLang="zh-CN" dirty="0" smtClean="0"/>
+              <a:t>IF</a:t>
+            </a:r>
+            <a:r>
+              <a:rPr lang="zh-CN" altLang="en-US" dirty="0" smtClean="0"/>
+              <a:t>函数</a:t>
+            </a:r>
+            <a:endParaRPr lang="en-US" altLang="zh-CN" dirty="0" smtClean="0"/>
+          </a:p>
+          <a:p>
+            <a:r>
+              <a:rPr lang="zh-CN" altLang="en-US" dirty="0" smtClean="0"/>
+              <a:t>带</a:t>
+            </a:r>
+            <a:r>
+              <a:rPr lang="en-US" altLang="zh-CN" dirty="0" smtClean="0"/>
+              <a:t>AND</a:t>
+            </a:r>
+            <a:r>
+              <a:rPr lang="zh-CN" altLang="en-US" dirty="0" smtClean="0"/>
+              <a:t>和</a:t>
+            </a:r>
+            <a:r>
+              <a:rPr lang="en-US" altLang="zh-CN" dirty="0" smtClean="0"/>
+              <a:t>OR</a:t>
+            </a:r>
+            <a:r>
+              <a:rPr lang="zh-CN" altLang="en-US" dirty="0"/>
+              <a:t>函</a:t>
+            </a:r>
+            <a:r>
+              <a:rPr lang="zh-CN" altLang="en-US" dirty="0" smtClean="0"/>
+              <a:t>数的</a:t>
+            </a:r>
+            <a:r>
+              <a:rPr lang="en-US" altLang="zh-CN" dirty="0" smtClean="0"/>
+              <a:t>IF</a:t>
+            </a:r>
+            <a:r>
+              <a:rPr lang="zh-CN" altLang="en-US" dirty="0" smtClean="0"/>
+              <a:t>函数</a:t>
+            </a:r>
+            <a:endParaRPr lang="en-US" altLang="zh-CN" dirty="0" smtClean="0"/>
+          </a:p>
+          <a:p>
+            <a:r>
+              <a:rPr lang="en-US" altLang="zh-CN" dirty="0" smtClean="0"/>
+              <a:t>COUNTIFS &amp; SUMIFS</a:t>
+            </a:r>
+          </a:p>
+          <a:p>
+            <a:r>
+              <a:rPr lang="en-US" altLang="zh-CN" dirty="0" smtClean="0"/>
+              <a:t>AVERAGEIFS &amp; IFERROR</a:t>
+            </a:r>
+            <a:endParaRPr lang="zh-CN" altLang="en-US" dirty="0"/>
+          </a:p>
+        </p:txBody>
+      </p:sp>
+    </p:spTree>
+    <p:extLst>
+      <p:ext uri="{BB962C8B-B14F-4D97-AF65-F5344CB8AC3E}">
+        <p14:creationId xmlns:p14="http://schemas.microsoft.com/office/powerpoint/2010/main" val="972231451"/>
       </p:ext>
     </p:extLst>
   </p:cSld>

</xml_diff>

<commit_message>
Complete "Create and manage drop-down lists"
</commit_message>
<xml_diff>
--- a/Excel动手实验室.pptx
+++ b/Excel动手实验室.pptx
@@ -5,7 +5,7 @@
     <p:sldMasterId id="2147483648" r:id="rId1"/>
   </p:sldMasterIdLst>
   <p:notesMasterIdLst>
-    <p:notesMasterId r:id="rId24"/>
+    <p:notesMasterId r:id="rId25"/>
   </p:notesMasterIdLst>
   <p:sldIdLst>
     <p:sldId id="256" r:id="rId2"/>
@@ -30,6 +30,7 @@
     <p:sldId id="275" r:id="rId21"/>
     <p:sldId id="276" r:id="rId22"/>
     <p:sldId id="277" r:id="rId23"/>
+    <p:sldId id="278" r:id="rId24"/>
   </p:sldIdLst>
   <p:sldSz cx="12192000" cy="6858000"/>
   <p:notesSz cx="6858000" cy="9144000"/>
@@ -6893,13 +6894,13 @@
   <p:clrMapOvr>
     <a:masterClrMapping/>
   </p:clrMapOvr>
-  <mc:AlternateContent xmlns:mc="http://schemas.openxmlformats.org/markup-compatibility/2006" xmlns:p14="http://schemas.microsoft.com/office/powerpoint/2010/main">
-    <mc:Choice Requires="p14">
+  <mc:AlternateContent xmlns:mc="http://schemas.openxmlformats.org/markup-compatibility/2006">
+    <mc:Choice xmlns:p14="http://schemas.microsoft.com/office/powerpoint/2010/main" Requires="p14">
       <p:transition spd="med" p14:dur="700">
         <p:fade/>
       </p:transition>
     </mc:Choice>
-    <mc:Fallback xmlns="">
+    <mc:Fallback>
       <p:transition spd="med">
         <p:fade/>
       </p:transition>
@@ -7065,6 +7066,18 @@
   <p:clrMapOvr>
     <a:masterClrMapping/>
   </p:clrMapOvr>
+  <mc:AlternateContent xmlns:mc="http://schemas.openxmlformats.org/markup-compatibility/2006">
+    <mc:Choice xmlns:p14="http://schemas.microsoft.com/office/powerpoint/2010/main" Requires="p14">
+      <p:transition spd="med" p14:dur="700">
+        <p:fade/>
+      </p:transition>
+    </mc:Choice>
+    <mc:Fallback>
+      <p:transition spd="med">
+        <p:fade/>
+      </p:transition>
+    </mc:Fallback>
+  </mc:AlternateContent>
 </p:sld>
 </file>
 
@@ -7171,6 +7184,18 @@
   <p:clrMapOvr>
     <a:masterClrMapping/>
   </p:clrMapOvr>
+  <mc:AlternateContent xmlns:mc="http://schemas.openxmlformats.org/markup-compatibility/2006">
+    <mc:Choice xmlns:p14="http://schemas.microsoft.com/office/powerpoint/2010/main" Requires="p14">
+      <p:transition spd="med" p14:dur="700">
+        <p:fade/>
+      </p:transition>
+    </mc:Choice>
+    <mc:Fallback>
+      <p:transition spd="med">
+        <p:fade/>
+      </p:transition>
+    </mc:Fallback>
+  </mc:AlternateContent>
 </p:sld>
 </file>
 
@@ -7342,6 +7367,18 @@
   <p:clrMapOvr>
     <a:masterClrMapping/>
   </p:clrMapOvr>
+  <mc:AlternateContent xmlns:mc="http://schemas.openxmlformats.org/markup-compatibility/2006">
+    <mc:Choice xmlns:p14="http://schemas.microsoft.com/office/powerpoint/2010/main" Requires="p14">
+      <p:transition spd="med" p14:dur="700">
+        <p:fade/>
+      </p:transition>
+    </mc:Choice>
+    <mc:Fallback>
+      <p:transition spd="med">
+        <p:fade/>
+      </p:transition>
+    </mc:Fallback>
+  </mc:AlternateContent>
 </p:sld>
 </file>
 
@@ -7525,6 +7562,18 @@
   <p:clrMapOvr>
     <a:masterClrMapping/>
   </p:clrMapOvr>
+  <mc:AlternateContent xmlns:mc="http://schemas.openxmlformats.org/markup-compatibility/2006">
+    <mc:Choice xmlns:p14="http://schemas.microsoft.com/office/powerpoint/2010/main" Requires="p14">
+      <p:transition spd="med" p14:dur="700">
+        <p:fade/>
+      </p:transition>
+    </mc:Choice>
+    <mc:Fallback>
+      <p:transition spd="med">
+        <p:fade/>
+      </p:transition>
+    </mc:Fallback>
+  </mc:AlternateContent>
 </p:sld>
 </file>
 
@@ -7644,6 +7693,18 @@
   <p:clrMapOvr>
     <a:masterClrMapping/>
   </p:clrMapOvr>
+  <mc:AlternateContent xmlns:mc="http://schemas.openxmlformats.org/markup-compatibility/2006">
+    <mc:Choice xmlns:p14="http://schemas.microsoft.com/office/powerpoint/2010/main" Requires="p14">
+      <p:transition spd="med" p14:dur="700">
+        <p:fade/>
+      </p:transition>
+    </mc:Choice>
+    <mc:Fallback>
+      <p:transition spd="med">
+        <p:fade/>
+      </p:transition>
+    </mc:Fallback>
+  </mc:AlternateContent>
 </p:sld>
 </file>
 
@@ -7826,6 +7887,18 @@
   <p:clrMapOvr>
     <a:masterClrMapping/>
   </p:clrMapOvr>
+  <mc:AlternateContent xmlns:mc="http://schemas.openxmlformats.org/markup-compatibility/2006">
+    <mc:Choice xmlns:p14="http://schemas.microsoft.com/office/powerpoint/2010/main" Requires="p14">
+      <p:transition spd="med" p14:dur="700">
+        <p:fade/>
+      </p:transition>
+    </mc:Choice>
+    <mc:Fallback>
+      <p:transition spd="med">
+        <p:fade/>
+      </p:transition>
+    </mc:Fallback>
+  </mc:AlternateContent>
 </p:sld>
 </file>
 
@@ -8005,6 +8078,18 @@
   <p:clrMapOvr>
     <a:masterClrMapping/>
   </p:clrMapOvr>
+  <mc:AlternateContent xmlns:mc="http://schemas.openxmlformats.org/markup-compatibility/2006">
+    <mc:Choice xmlns:p14="http://schemas.microsoft.com/office/powerpoint/2010/main" Requires="p14">
+      <p:transition spd="med" p14:dur="700">
+        <p:fade/>
+      </p:transition>
+    </mc:Choice>
+    <mc:Fallback>
+      <p:transition spd="med">
+        <p:fade/>
+      </p:transition>
+    </mc:Fallback>
+  </mc:AlternateContent>
 </p:sld>
 </file>
 
@@ -8141,6 +8226,18 @@
   <p:clrMapOvr>
     <a:masterClrMapping/>
   </p:clrMapOvr>
+  <mc:AlternateContent xmlns:mc="http://schemas.openxmlformats.org/markup-compatibility/2006">
+    <mc:Choice xmlns:p14="http://schemas.microsoft.com/office/powerpoint/2010/main" Requires="p14">
+      <p:transition spd="med" p14:dur="700">
+        <p:fade/>
+      </p:transition>
+    </mc:Choice>
+    <mc:Fallback>
+      <p:transition spd="med">
+        <p:fade/>
+      </p:transition>
+    </mc:Fallback>
+  </mc:AlternateContent>
 </p:sld>
 </file>
 
@@ -8281,6 +8378,18 @@
   <p:clrMapOvr>
     <a:masterClrMapping/>
   </p:clrMapOvr>
+  <mc:AlternateContent xmlns:mc="http://schemas.openxmlformats.org/markup-compatibility/2006">
+    <mc:Choice xmlns:p14="http://schemas.microsoft.com/office/powerpoint/2010/main" Requires="p14">
+      <p:transition spd="med" p14:dur="700">
+        <p:fade/>
+      </p:transition>
+    </mc:Choice>
+    <mc:Fallback>
+      <p:transition spd="med">
+        <p:fade/>
+      </p:transition>
+    </mc:Fallback>
+  </mc:AlternateContent>
 </p:sld>
 </file>
 
@@ -8462,6 +8571,18 @@
   <p:clrMapOvr>
     <a:masterClrMapping/>
   </p:clrMapOvr>
+  <mc:AlternateContent xmlns:mc="http://schemas.openxmlformats.org/markup-compatibility/2006">
+    <mc:Choice xmlns:p14="http://schemas.microsoft.com/office/powerpoint/2010/main" Requires="p14">
+      <p:transition spd="med" p14:dur="700">
+        <p:fade/>
+      </p:transition>
+    </mc:Choice>
+    <mc:Fallback>
+      <p:transition spd="med">
+        <p:fade/>
+      </p:transition>
+    </mc:Fallback>
+  </mc:AlternateContent>
 </p:sld>
 </file>
 
@@ -8653,6 +8774,18 @@
   <p:clrMapOvr>
     <a:masterClrMapping/>
   </p:clrMapOvr>
+  <mc:AlternateContent xmlns:mc="http://schemas.openxmlformats.org/markup-compatibility/2006">
+    <mc:Choice xmlns:p14="http://schemas.microsoft.com/office/powerpoint/2010/main" Requires="p14">
+      <p:transition spd="med" p14:dur="700">
+        <p:fade/>
+      </p:transition>
+    </mc:Choice>
+    <mc:Fallback>
+      <p:transition spd="med">
+        <p:fade/>
+      </p:transition>
+    </mc:Fallback>
+  </mc:AlternateContent>
 </p:sld>
 </file>
 
@@ -8811,6 +8944,18 @@
   <p:clrMapOvr>
     <a:masterClrMapping/>
   </p:clrMapOvr>
+  <mc:AlternateContent xmlns:mc="http://schemas.openxmlformats.org/markup-compatibility/2006">
+    <mc:Choice xmlns:p14="http://schemas.microsoft.com/office/powerpoint/2010/main" Requires="p14">
+      <p:transition spd="med" p14:dur="700">
+        <p:fade/>
+      </p:transition>
+    </mc:Choice>
+    <mc:Fallback>
+      <p:transition spd="med">
+        <p:fade/>
+      </p:transition>
+    </mc:Fallback>
+  </mc:AlternateContent>
 </p:sld>
 </file>
 
@@ -8993,6 +9138,18 @@
   <p:clrMapOvr>
     <a:masterClrMapping/>
   </p:clrMapOvr>
+  <mc:AlternateContent xmlns:mc="http://schemas.openxmlformats.org/markup-compatibility/2006">
+    <mc:Choice xmlns:p14="http://schemas.microsoft.com/office/powerpoint/2010/main" Requires="p14">
+      <p:transition spd="med" p14:dur="700">
+        <p:fade/>
+      </p:transition>
+    </mc:Choice>
+    <mc:Fallback>
+      <p:transition spd="med">
+        <p:fade/>
+      </p:transition>
+    </mc:Fallback>
+  </mc:AlternateContent>
 </p:sld>
 </file>
 
@@ -9103,6 +9260,221 @@
   <p:clrMapOvr>
     <a:masterClrMapping/>
   </p:clrMapOvr>
+  <mc:AlternateContent xmlns:mc="http://schemas.openxmlformats.org/markup-compatibility/2006">
+    <mc:Choice xmlns:p14="http://schemas.microsoft.com/office/powerpoint/2010/main" Requires="p14">
+      <p:transition spd="med" p14:dur="700">
+        <p:fade/>
+      </p:transition>
+    </mc:Choice>
+    <mc:Fallback>
+      <p:transition spd="med">
+        <p:fade/>
+      </p:transition>
+    </mc:Fallback>
+  </mc:AlternateContent>
+</p:sld>
+</file>
+
+<file path=ppt/slides/slide23.xml><?xml version="1.0" encoding="utf-8"?>
+<p:sld xmlns:a="http://schemas.openxmlformats.org/drawingml/2006/main" xmlns:r="http://schemas.openxmlformats.org/officeDocument/2006/relationships" xmlns:p="http://schemas.openxmlformats.org/presentationml/2006/main">
+  <p:cSld>
+    <p:spTree>
+      <p:nvGrpSpPr>
+        <p:cNvPr id="1" name=""/>
+        <p:cNvGrpSpPr/>
+        <p:nvPr/>
+      </p:nvGrpSpPr>
+      <p:grpSpPr>
+        <a:xfrm>
+          <a:off x="0" y="0"/>
+          <a:ext cx="0" cy="0"/>
+          <a:chOff x="0" y="0"/>
+          <a:chExt cx="0" cy="0"/>
+        </a:xfrm>
+      </p:grpSpPr>
+      <p:sp>
+        <p:nvSpPr>
+          <p:cNvPr id="2" name="Title 1"/>
+          <p:cNvSpPr>
+            <a:spLocks noGrp="1"/>
+          </p:cNvSpPr>
+          <p:nvPr>
+            <p:ph type="title"/>
+          </p:nvPr>
+        </p:nvSpPr>
+        <p:spPr/>
+        <p:txBody>
+          <a:bodyPr/>
+          <a:lstStyle/>
+          <a:p>
+            <a:r>
+              <a:rPr lang="en-US" altLang="zh-CN" dirty="0" smtClean="0"/>
+              <a:t>Excel</a:t>
+            </a:r>
+            <a:r>
+              <a:rPr lang="zh-CN" altLang="en-US" dirty="0" smtClean="0"/>
+              <a:t>动手实验室 </a:t>
+            </a:r>
+            <a:r>
+              <a:rPr lang="en-US" altLang="zh-CN" dirty="0" smtClean="0"/>
+              <a:t>– </a:t>
+            </a:r>
+            <a:r>
+              <a:rPr lang="zh-CN" altLang="en-US" dirty="0" smtClean="0"/>
+              <a:t>下拉列表</a:t>
+            </a:r>
+            <a:endParaRPr lang="zh-CN" altLang="en-US" dirty="0"/>
+          </a:p>
+        </p:txBody>
+      </p:sp>
+      <p:sp>
+        <p:nvSpPr>
+          <p:cNvPr id="3" name="Content Placeholder 2"/>
+          <p:cNvSpPr>
+            <a:spLocks noGrp="1"/>
+          </p:cNvSpPr>
+          <p:nvPr>
+            <p:ph idx="1"/>
+          </p:nvPr>
+        </p:nvSpPr>
+        <p:spPr/>
+        <p:txBody>
+          <a:bodyPr>
+            <a:normAutofit lnSpcReduction="10000"/>
+          </a:bodyPr>
+          <a:lstStyle/>
+          <a:p>
+            <a:r>
+              <a:rPr lang="zh-CN" altLang="en-US" dirty="0" smtClean="0"/>
+              <a:t>创建下拉列表</a:t>
+            </a:r>
+            <a:endParaRPr lang="en-US" altLang="zh-CN" dirty="0" smtClean="0"/>
+          </a:p>
+          <a:p>
+            <a:pPr lvl="1"/>
+            <a:r>
+              <a:rPr lang="zh-CN" altLang="en-US" dirty="0" smtClean="0"/>
+              <a:t>英文逗号</a:t>
+            </a:r>
+            <a:endParaRPr lang="en-US" altLang="zh-CN" dirty="0" smtClean="0"/>
+          </a:p>
+          <a:p>
+            <a:pPr lvl="1"/>
+            <a:r>
+              <a:rPr lang="zh-CN" altLang="en-US" dirty="0"/>
+              <a:t>单元</a:t>
+            </a:r>
+            <a:r>
+              <a:rPr lang="zh-CN" altLang="en-US" dirty="0" smtClean="0"/>
+              <a:t>格区域</a:t>
+            </a:r>
+            <a:endParaRPr lang="en-US" altLang="zh-CN" dirty="0" smtClean="0"/>
+          </a:p>
+          <a:p>
+            <a:pPr lvl="1"/>
+            <a:r>
+              <a:rPr lang="zh-CN" altLang="en-US" dirty="0" smtClean="0"/>
+              <a:t>命名区域</a:t>
+            </a:r>
+            <a:endParaRPr lang="en-US" altLang="zh-CN" dirty="0" smtClean="0"/>
+          </a:p>
+          <a:p>
+            <a:r>
+              <a:rPr lang="zh-CN" altLang="en-US" dirty="0" smtClean="0"/>
+              <a:t>输入消息</a:t>
+            </a:r>
+            <a:endParaRPr lang="en-US" altLang="zh-CN" dirty="0" smtClean="0"/>
+          </a:p>
+          <a:p>
+            <a:r>
+              <a:rPr lang="zh-CN" altLang="en-US" dirty="0"/>
+              <a:t>错</a:t>
+            </a:r>
+            <a:r>
+              <a:rPr lang="zh-CN" altLang="en-US" dirty="0" smtClean="0"/>
+              <a:t>误消息</a:t>
+            </a:r>
+            <a:endParaRPr lang="en-US" altLang="zh-CN" dirty="0" smtClean="0"/>
+          </a:p>
+          <a:p>
+            <a:r>
+              <a:rPr lang="zh-CN" altLang="en-US" dirty="0"/>
+              <a:t>管</a:t>
+            </a:r>
+            <a:r>
+              <a:rPr lang="zh-CN" altLang="en-US" dirty="0" smtClean="0"/>
+              <a:t>理下拉列表</a:t>
+            </a:r>
+            <a:endParaRPr lang="en-US" altLang="zh-CN" dirty="0" smtClean="0"/>
+          </a:p>
+          <a:p>
+            <a:pPr lvl="1"/>
+            <a:r>
+              <a:rPr lang="zh-CN" altLang="en-US" dirty="0"/>
+              <a:t>隐</a:t>
+            </a:r>
+            <a:r>
+              <a:rPr lang="zh-CN" altLang="en-US" dirty="0" smtClean="0"/>
+              <a:t>藏列、行</a:t>
+            </a:r>
+            <a:endParaRPr lang="en-US" altLang="zh-CN" dirty="0" smtClean="0"/>
+          </a:p>
+          <a:p>
+            <a:pPr lvl="1"/>
+            <a:r>
+              <a:rPr lang="zh-CN" altLang="en-US" dirty="0"/>
+              <a:t>隐</a:t>
+            </a:r>
+            <a:r>
+              <a:rPr lang="zh-CN" altLang="en-US" dirty="0" smtClean="0"/>
+              <a:t>藏工作表</a:t>
+            </a:r>
+            <a:endParaRPr lang="en-US" altLang="zh-CN" dirty="0" smtClean="0"/>
+          </a:p>
+          <a:p>
+            <a:pPr lvl="1"/>
+            <a:r>
+              <a:rPr lang="zh-CN" altLang="en-US" dirty="0"/>
+              <a:t>密码保</a:t>
+            </a:r>
+            <a:r>
+              <a:rPr lang="zh-CN" altLang="en-US" dirty="0" smtClean="0"/>
+              <a:t>护</a:t>
+            </a:r>
+            <a:endParaRPr lang="en-US" altLang="zh-CN" dirty="0" smtClean="0"/>
+          </a:p>
+          <a:p>
+            <a:pPr lvl="1"/>
+            <a:r>
+              <a:rPr lang="zh-CN" altLang="en-US" dirty="0" smtClean="0"/>
+              <a:t>锁定单元格</a:t>
+            </a:r>
+            <a:endParaRPr lang="zh-CN" altLang="en-US" dirty="0"/>
+          </a:p>
+        </p:txBody>
+      </p:sp>
+    </p:spTree>
+    <p:extLst>
+      <p:ext uri="{BB962C8B-B14F-4D97-AF65-F5344CB8AC3E}">
+        <p14:creationId xmlns:p14="http://schemas.microsoft.com/office/powerpoint/2010/main" val="481654297"/>
+      </p:ext>
+    </p:extLst>
+  </p:cSld>
+  <p:clrMapOvr>
+    <a:masterClrMapping/>
+  </p:clrMapOvr>
+  <mc:AlternateContent xmlns:mc="http://schemas.openxmlformats.org/markup-compatibility/2006">
+    <mc:Choice xmlns:p14="http://schemas.microsoft.com/office/powerpoint/2010/main" Requires="p14">
+      <p:transition spd="med" p14:dur="700">
+        <p:fade/>
+      </p:transition>
+    </mc:Choice>
+    <mc:Fallback>
+      <p:transition spd="med">
+        <p:fade/>
+      </p:transition>
+    </mc:Fallback>
+  </mc:AlternateContent>
 </p:sld>
 </file>
 
@@ -9270,6 +9642,18 @@
   <p:clrMapOvr>
     <a:masterClrMapping/>
   </p:clrMapOvr>
+  <mc:AlternateContent xmlns:mc="http://schemas.openxmlformats.org/markup-compatibility/2006">
+    <mc:Choice xmlns:p14="http://schemas.microsoft.com/office/powerpoint/2010/main" Requires="p14">
+      <p:transition spd="med" p14:dur="700">
+        <p:fade/>
+      </p:transition>
+    </mc:Choice>
+    <mc:Fallback>
+      <p:transition spd="med">
+        <p:fade/>
+      </p:transition>
+    </mc:Fallback>
+  </mc:AlternateContent>
 </p:sld>
 </file>
 
@@ -9432,13 +9816,13 @@
   <p:clrMapOvr>
     <a:masterClrMapping/>
   </p:clrMapOvr>
-  <mc:AlternateContent xmlns:mc="http://schemas.openxmlformats.org/markup-compatibility/2006" xmlns:p14="http://schemas.microsoft.com/office/powerpoint/2010/main">
-    <mc:Choice Requires="p14">
+  <mc:AlternateContent xmlns:mc="http://schemas.openxmlformats.org/markup-compatibility/2006">
+    <mc:Choice xmlns:p14="http://schemas.microsoft.com/office/powerpoint/2010/main" Requires="p14">
       <p:transition spd="med" p14:dur="700">
         <p:fade/>
       </p:transition>
     </mc:Choice>
-    <mc:Fallback xmlns="">
+    <mc:Fallback>
       <p:transition spd="med">
         <p:fade/>
       </p:transition>
@@ -9589,13 +9973,13 @@
   <p:clrMapOvr>
     <a:masterClrMapping/>
   </p:clrMapOvr>
-  <mc:AlternateContent xmlns:mc="http://schemas.openxmlformats.org/markup-compatibility/2006" xmlns:p14="http://schemas.microsoft.com/office/powerpoint/2010/main">
-    <mc:Choice Requires="p14">
+  <mc:AlternateContent xmlns:mc="http://schemas.openxmlformats.org/markup-compatibility/2006">
+    <mc:Choice xmlns:p14="http://schemas.microsoft.com/office/powerpoint/2010/main" Requires="p14">
       <p:transition spd="med" p14:dur="700">
         <p:fade/>
       </p:transition>
     </mc:Choice>
-    <mc:Fallback xmlns="">
+    <mc:Fallback>
       <p:transition spd="med">
         <p:fade/>
       </p:transition>
@@ -9783,13 +10167,13 @@
   <p:clrMapOvr>
     <a:masterClrMapping/>
   </p:clrMapOvr>
-  <mc:AlternateContent xmlns:mc="http://schemas.openxmlformats.org/markup-compatibility/2006" xmlns:p14="http://schemas.microsoft.com/office/powerpoint/2010/main">
-    <mc:Choice Requires="p14">
+  <mc:AlternateContent xmlns:mc="http://schemas.openxmlformats.org/markup-compatibility/2006">
+    <mc:Choice xmlns:p14="http://schemas.microsoft.com/office/powerpoint/2010/main" Requires="p14">
       <p:transition spd="med" p14:dur="700">
         <p:fade/>
       </p:transition>
     </mc:Choice>
-    <mc:Fallback xmlns="">
+    <mc:Fallback>
       <p:transition spd="med">
         <p:fade/>
       </p:transition>
@@ -9954,6 +10338,18 @@
   <p:clrMapOvr>
     <a:masterClrMapping/>
   </p:clrMapOvr>
+  <mc:AlternateContent xmlns:mc="http://schemas.openxmlformats.org/markup-compatibility/2006">
+    <mc:Choice xmlns:p14="http://schemas.microsoft.com/office/powerpoint/2010/main" Requires="p14">
+      <p:transition spd="med" p14:dur="700">
+        <p:fade/>
+      </p:transition>
+    </mc:Choice>
+    <mc:Fallback>
+      <p:transition spd="med">
+        <p:fade/>
+      </p:transition>
+    </mc:Fallback>
+  </mc:AlternateContent>
   <p:timing>
     <p:tnLst>
       <p:par>
@@ -10155,6 +10551,18 @@
   <p:clrMapOvr>
     <a:masterClrMapping/>
   </p:clrMapOvr>
+  <mc:AlternateContent xmlns:mc="http://schemas.openxmlformats.org/markup-compatibility/2006">
+    <mc:Choice xmlns:p14="http://schemas.microsoft.com/office/powerpoint/2010/main" Requires="p14">
+      <p:transition spd="med" p14:dur="700">
+        <p:fade/>
+      </p:transition>
+    </mc:Choice>
+    <mc:Fallback>
+      <p:transition spd="med">
+        <p:fade/>
+      </p:transition>
+    </mc:Fallback>
+  </mc:AlternateContent>
   <p:timing>
     <p:tnLst>
       <p:par>
@@ -10289,6 +10697,18 @@
   <p:clrMapOvr>
     <a:masterClrMapping/>
   </p:clrMapOvr>
+  <mc:AlternateContent xmlns:mc="http://schemas.openxmlformats.org/markup-compatibility/2006">
+    <mc:Choice xmlns:p14="http://schemas.microsoft.com/office/powerpoint/2010/main" Requires="p14">
+      <p:transition spd="med" p14:dur="700">
+        <p:fade/>
+      </p:transition>
+    </mc:Choice>
+    <mc:Fallback>
+      <p:transition spd="med">
+        <p:fade/>
+      </p:transition>
+    </mc:Fallback>
+  </mc:AlternateContent>
 </p:sld>
 </file>
 

</xml_diff>

<commit_message>
Complete "Create a PivotTable and analyze your data"
</commit_message>
<xml_diff>
--- a/Excel动手实验室.pptx
+++ b/Excel动手实验室.pptx
@@ -5,7 +5,7 @@
     <p:sldMasterId id="2147483648" r:id="rId1"/>
   </p:sldMasterIdLst>
   <p:notesMasterIdLst>
-    <p:notesMasterId r:id="rId25"/>
+    <p:notesMasterId r:id="rId27"/>
   </p:notesMasterIdLst>
   <p:sldIdLst>
     <p:sldId id="256" r:id="rId2"/>
@@ -31,6 +31,8 @@
     <p:sldId id="276" r:id="rId22"/>
     <p:sldId id="277" r:id="rId23"/>
     <p:sldId id="278" r:id="rId24"/>
+    <p:sldId id="279" r:id="rId25"/>
+    <p:sldId id="280" r:id="rId26"/>
   </p:sldIdLst>
   <p:sldSz cx="12192000" cy="6858000"/>
   <p:notesSz cx="6858000" cy="9144000"/>
@@ -9475,6 +9477,326 @@
       </p:transition>
     </mc:Fallback>
   </mc:AlternateContent>
+</p:sld>
+</file>
+
+<file path=ppt/slides/slide24.xml><?xml version="1.0" encoding="utf-8"?>
+<p:sld xmlns:a="http://schemas.openxmlformats.org/drawingml/2006/main" xmlns:r="http://schemas.openxmlformats.org/officeDocument/2006/relationships" xmlns:p="http://schemas.openxmlformats.org/presentationml/2006/main">
+  <p:cSld>
+    <p:spTree>
+      <p:nvGrpSpPr>
+        <p:cNvPr id="1" name=""/>
+        <p:cNvGrpSpPr/>
+        <p:nvPr/>
+      </p:nvGrpSpPr>
+      <p:grpSpPr>
+        <a:xfrm>
+          <a:off x="0" y="0"/>
+          <a:ext cx="0" cy="0"/>
+          <a:chOff x="0" y="0"/>
+          <a:chExt cx="0" cy="0"/>
+        </a:xfrm>
+      </p:grpSpPr>
+      <p:sp>
+        <p:nvSpPr>
+          <p:cNvPr id="2" name="Title 1"/>
+          <p:cNvSpPr>
+            <a:spLocks noGrp="1"/>
+          </p:cNvSpPr>
+          <p:nvPr>
+            <p:ph type="title"/>
+          </p:nvPr>
+        </p:nvSpPr>
+        <p:spPr/>
+        <p:txBody>
+          <a:bodyPr/>
+          <a:lstStyle/>
+          <a:p>
+            <a:r>
+              <a:rPr lang="en-US" altLang="zh-CN" dirty="0" smtClean="0"/>
+              <a:t>Excel</a:t>
+            </a:r>
+            <a:r>
+              <a:rPr lang="zh-CN" altLang="en-US" dirty="0" smtClean="0"/>
+              <a:t>动手实验室 </a:t>
+            </a:r>
+            <a:r>
+              <a:rPr lang="en-US" altLang="zh-CN" dirty="0" smtClean="0"/>
+              <a:t>– </a:t>
+            </a:r>
+            <a:r>
+              <a:rPr lang="zh-CN" altLang="en-US" dirty="0" smtClean="0"/>
+              <a:t>数据透视表（创建）</a:t>
+            </a:r>
+            <a:endParaRPr lang="zh-CN" altLang="en-US" dirty="0"/>
+          </a:p>
+        </p:txBody>
+      </p:sp>
+      <p:sp>
+        <p:nvSpPr>
+          <p:cNvPr id="3" name="Content Placeholder 2"/>
+          <p:cNvSpPr>
+            <a:spLocks noGrp="1"/>
+          </p:cNvSpPr>
+          <p:nvPr>
+            <p:ph idx="1"/>
+          </p:nvPr>
+        </p:nvSpPr>
+        <p:spPr/>
+        <p:txBody>
+          <a:bodyPr/>
+          <a:lstStyle/>
+          <a:p>
+            <a:r>
+              <a:rPr lang="zh-CN" altLang="en-US" dirty="0" smtClean="0"/>
+              <a:t>创建数据透视表</a:t>
+            </a:r>
+            <a:endParaRPr lang="en-US" altLang="zh-CN" dirty="0" smtClean="0"/>
+          </a:p>
+          <a:p>
+            <a:r>
+              <a:rPr lang="zh-CN" altLang="en-US" dirty="0"/>
+              <a:t>手动创</a:t>
+            </a:r>
+            <a:r>
+              <a:rPr lang="zh-CN" altLang="en-US" dirty="0" smtClean="0"/>
+              <a:t>建数据透视表</a:t>
+            </a:r>
+            <a:endParaRPr lang="en-US" altLang="zh-CN" dirty="0" smtClean="0"/>
+          </a:p>
+          <a:p>
+            <a:pPr lvl="1"/>
+            <a:r>
+              <a:rPr lang="zh-CN" altLang="en-US" dirty="0"/>
+              <a:t>字</a:t>
+            </a:r>
+            <a:r>
+              <a:rPr lang="zh-CN" altLang="en-US" dirty="0" smtClean="0"/>
+              <a:t>段</a:t>
+            </a:r>
+            <a:endParaRPr lang="en-US" altLang="zh-CN" dirty="0" smtClean="0"/>
+          </a:p>
+          <a:p>
+            <a:pPr lvl="2"/>
+            <a:r>
+              <a:rPr lang="zh-CN" altLang="en-US" dirty="0" smtClean="0"/>
+              <a:t>行</a:t>
+            </a:r>
+            <a:endParaRPr lang="en-US" altLang="zh-CN" dirty="0" smtClean="0"/>
+          </a:p>
+          <a:p>
+            <a:pPr lvl="2"/>
+            <a:r>
+              <a:rPr lang="zh-CN" altLang="en-US" dirty="0" smtClean="0"/>
+              <a:t>列</a:t>
+            </a:r>
+            <a:endParaRPr lang="en-US" altLang="zh-CN" dirty="0" smtClean="0"/>
+          </a:p>
+          <a:p>
+            <a:pPr lvl="2"/>
+            <a:r>
+              <a:rPr lang="zh-CN" altLang="en-US" dirty="0"/>
+              <a:t>值</a:t>
+            </a:r>
+            <a:endParaRPr lang="en-US" altLang="zh-CN" dirty="0" smtClean="0"/>
+          </a:p>
+          <a:p>
+            <a:pPr lvl="1"/>
+            <a:r>
+              <a:rPr lang="zh-CN" altLang="en-US" dirty="0"/>
+              <a:t>分</a:t>
+            </a:r>
+            <a:r>
+              <a:rPr lang="zh-CN" altLang="en-US" dirty="0" smtClean="0"/>
+              <a:t>组</a:t>
+            </a:r>
+            <a:endParaRPr lang="en-US" altLang="zh-CN" dirty="0" smtClean="0"/>
+          </a:p>
+          <a:p>
+            <a:pPr lvl="1"/>
+            <a:r>
+              <a:rPr lang="zh-CN" altLang="en-US" dirty="0"/>
+              <a:t>设计</a:t>
+            </a:r>
+            <a:endParaRPr lang="en-US" altLang="zh-CN" dirty="0" smtClean="0"/>
+          </a:p>
+          <a:p>
+            <a:endParaRPr lang="zh-CN" altLang="en-US" dirty="0"/>
+          </a:p>
+        </p:txBody>
+      </p:sp>
+    </p:spTree>
+    <p:extLst>
+      <p:ext uri="{BB962C8B-B14F-4D97-AF65-F5344CB8AC3E}">
+        <p14:creationId xmlns:p14="http://schemas.microsoft.com/office/powerpoint/2010/main" val="4253380988"/>
+      </p:ext>
+    </p:extLst>
+  </p:cSld>
+  <p:clrMapOvr>
+    <a:masterClrMapping/>
+  </p:clrMapOvr>
+</p:sld>
+</file>
+
+<file path=ppt/slides/slide25.xml><?xml version="1.0" encoding="utf-8"?>
+<p:sld xmlns:a="http://schemas.openxmlformats.org/drawingml/2006/main" xmlns:r="http://schemas.openxmlformats.org/officeDocument/2006/relationships" xmlns:p="http://schemas.openxmlformats.org/presentationml/2006/main">
+  <p:cSld>
+    <p:spTree>
+      <p:nvGrpSpPr>
+        <p:cNvPr id="1" name=""/>
+        <p:cNvGrpSpPr/>
+        <p:nvPr/>
+      </p:nvGrpSpPr>
+      <p:grpSpPr>
+        <a:xfrm>
+          <a:off x="0" y="0"/>
+          <a:ext cx="0" cy="0"/>
+          <a:chOff x="0" y="0"/>
+          <a:chExt cx="0" cy="0"/>
+        </a:xfrm>
+      </p:grpSpPr>
+      <p:sp>
+        <p:nvSpPr>
+          <p:cNvPr id="2" name="Title 1"/>
+          <p:cNvSpPr>
+            <a:spLocks noGrp="1"/>
+          </p:cNvSpPr>
+          <p:nvPr>
+            <p:ph type="title"/>
+          </p:nvPr>
+        </p:nvSpPr>
+        <p:spPr/>
+        <p:txBody>
+          <a:bodyPr/>
+          <a:lstStyle/>
+          <a:p>
+            <a:r>
+              <a:rPr lang="en-US" altLang="zh-CN" dirty="0" smtClean="0"/>
+              <a:t>Excel</a:t>
+            </a:r>
+            <a:r>
+              <a:rPr lang="zh-CN" altLang="en-US" dirty="0" smtClean="0"/>
+              <a:t>动手实验室 </a:t>
+            </a:r>
+            <a:r>
+              <a:rPr lang="en-US" altLang="zh-CN" dirty="0" smtClean="0"/>
+              <a:t>– </a:t>
+            </a:r>
+            <a:r>
+              <a:rPr lang="zh-CN" altLang="en-US" dirty="0" smtClean="0"/>
+              <a:t>数据分析表（分析）</a:t>
+            </a:r>
+            <a:endParaRPr lang="zh-CN" altLang="en-US" dirty="0"/>
+          </a:p>
+        </p:txBody>
+      </p:sp>
+      <p:sp>
+        <p:nvSpPr>
+          <p:cNvPr id="3" name="Content Placeholder 2"/>
+          <p:cNvSpPr>
+            <a:spLocks noGrp="1"/>
+          </p:cNvSpPr>
+          <p:nvPr>
+            <p:ph idx="1"/>
+          </p:nvPr>
+        </p:nvSpPr>
+        <p:spPr/>
+        <p:txBody>
+          <a:bodyPr/>
+          <a:lstStyle/>
+          <a:p>
+            <a:r>
+              <a:rPr lang="zh-CN" altLang="en-US" dirty="0" smtClean="0"/>
+              <a:t>基本分析</a:t>
+            </a:r>
+            <a:endParaRPr lang="en-US" altLang="zh-CN" dirty="0" smtClean="0"/>
+          </a:p>
+          <a:p>
+            <a:pPr lvl="1"/>
+            <a:r>
+              <a:rPr lang="zh-CN" altLang="en-US" dirty="0" smtClean="0"/>
+              <a:t>排序</a:t>
+            </a:r>
+            <a:endParaRPr lang="en-US" altLang="zh-CN" dirty="0" smtClean="0"/>
+          </a:p>
+          <a:p>
+            <a:pPr lvl="1"/>
+            <a:r>
+              <a:rPr lang="zh-CN" altLang="en-US" dirty="0" smtClean="0"/>
+              <a:t>筛选</a:t>
+            </a:r>
+            <a:endParaRPr lang="en-US" altLang="zh-CN" dirty="0" smtClean="0"/>
+          </a:p>
+          <a:p>
+            <a:pPr lvl="1"/>
+            <a:r>
+              <a:rPr lang="zh-CN" altLang="en-US" dirty="0" smtClean="0"/>
+              <a:t>汇总</a:t>
+            </a:r>
+            <a:endParaRPr lang="en-US" altLang="zh-CN" dirty="0" smtClean="0"/>
+          </a:p>
+          <a:p>
+            <a:pPr lvl="1"/>
+            <a:r>
+              <a:rPr lang="zh-CN" altLang="en-US" dirty="0" smtClean="0"/>
+              <a:t>计算</a:t>
+            </a:r>
+            <a:endParaRPr lang="en-US" altLang="zh-CN" dirty="0" smtClean="0"/>
+          </a:p>
+          <a:p>
+            <a:r>
+              <a:rPr lang="zh-CN" altLang="en-US" dirty="0"/>
+              <a:t>高</a:t>
+            </a:r>
+            <a:r>
+              <a:rPr lang="zh-CN" altLang="en-US" dirty="0" smtClean="0"/>
+              <a:t>级分析</a:t>
+            </a:r>
+            <a:endParaRPr lang="en-US" altLang="zh-CN" dirty="0" smtClean="0"/>
+          </a:p>
+          <a:p>
+            <a:pPr lvl="1"/>
+            <a:r>
+              <a:rPr lang="zh-CN" altLang="en-US" dirty="0"/>
+              <a:t>切片</a:t>
+            </a:r>
+            <a:r>
+              <a:rPr lang="zh-CN" altLang="en-US" dirty="0" smtClean="0"/>
+              <a:t>器</a:t>
+            </a:r>
+            <a:endParaRPr lang="en-US" altLang="zh-CN" dirty="0" smtClean="0"/>
+          </a:p>
+          <a:p>
+            <a:pPr lvl="1"/>
+            <a:r>
+              <a:rPr lang="zh-CN" altLang="en-US" dirty="0"/>
+              <a:t>日程</a:t>
+            </a:r>
+            <a:r>
+              <a:rPr lang="zh-CN" altLang="en-US" dirty="0" smtClean="0"/>
+              <a:t>表</a:t>
+            </a:r>
+            <a:endParaRPr lang="en-US" altLang="zh-CN" dirty="0" smtClean="0"/>
+          </a:p>
+          <a:p>
+            <a:pPr lvl="1"/>
+            <a:r>
+              <a:rPr lang="zh-CN" altLang="en-US" dirty="0"/>
+              <a:t>数据透视图</a:t>
+            </a:r>
+          </a:p>
+        </p:txBody>
+      </p:sp>
+    </p:spTree>
+    <p:extLst>
+      <p:ext uri="{BB962C8B-B14F-4D97-AF65-F5344CB8AC3E}">
+        <p14:creationId xmlns:p14="http://schemas.microsoft.com/office/powerpoint/2010/main" val="1977032423"/>
+      </p:ext>
+    </p:extLst>
+  </p:cSld>
+  <p:clrMapOvr>
+    <a:masterClrMapping/>
+  </p:clrMapOvr>
 </p:sld>
 </file>
 

</xml_diff>

<commit_message>
Complete "Password protect workbooks and worksheets"
</commit_message>
<xml_diff>
--- a/Excel动手实验室.pptx
+++ b/Excel动手实验室.pptx
@@ -5,7 +5,7 @@
     <p:sldMasterId id="2147483648" r:id="rId1"/>
   </p:sldMasterIdLst>
   <p:notesMasterIdLst>
-    <p:notesMasterId r:id="rId27"/>
+    <p:notesMasterId r:id="rId28"/>
   </p:notesMasterIdLst>
   <p:sldIdLst>
     <p:sldId id="256" r:id="rId2"/>
@@ -33,6 +33,7 @@
     <p:sldId id="278" r:id="rId24"/>
     <p:sldId id="279" r:id="rId25"/>
     <p:sldId id="280" r:id="rId26"/>
+    <p:sldId id="281" r:id="rId27"/>
   </p:sldIdLst>
   <p:sldSz cx="12192000" cy="6858000"/>
   <p:notesSz cx="6858000" cy="9144000"/>
@@ -9477,6 +9478,13 @@
       </p:transition>
     </mc:Fallback>
   </mc:AlternateContent>
+  <p:timing>
+    <p:tnLst>
+      <p:par>
+        <p:cTn id="1" dur="indefinite" restart="never" nodeType="tmRoot"/>
+      </p:par>
+    </p:tnLst>
+  </p:timing>
 </p:sld>
 </file>
 
@@ -9635,6 +9643,25 @@
   <p:clrMapOvr>
     <a:masterClrMapping/>
   </p:clrMapOvr>
+  <mc:AlternateContent xmlns:mc="http://schemas.openxmlformats.org/markup-compatibility/2006">
+    <mc:Choice xmlns:p14="http://schemas.microsoft.com/office/powerpoint/2010/main" Requires="p14">
+      <p:transition spd="med" p14:dur="700">
+        <p:fade/>
+      </p:transition>
+    </mc:Choice>
+    <mc:Fallback>
+      <p:transition spd="med">
+        <p:fade/>
+      </p:transition>
+    </mc:Fallback>
+  </mc:AlternateContent>
+  <p:timing>
+    <p:tnLst>
+      <p:par>
+        <p:cTn id="1" dur="indefinite" restart="never" nodeType="tmRoot"/>
+      </p:par>
+    </p:tnLst>
+  </p:timing>
 </p:sld>
 </file>
 
@@ -9791,6 +9818,158 @@
     <p:extLst>
       <p:ext uri="{BB962C8B-B14F-4D97-AF65-F5344CB8AC3E}">
         <p14:creationId xmlns:p14="http://schemas.microsoft.com/office/powerpoint/2010/main" val="1977032423"/>
+      </p:ext>
+    </p:extLst>
+  </p:cSld>
+  <p:clrMapOvr>
+    <a:masterClrMapping/>
+  </p:clrMapOvr>
+  <mc:AlternateContent xmlns:mc="http://schemas.openxmlformats.org/markup-compatibility/2006">
+    <mc:Choice xmlns:p14="http://schemas.microsoft.com/office/powerpoint/2010/main" Requires="p14">
+      <p:transition spd="med" p14:dur="700">
+        <p:fade/>
+      </p:transition>
+    </mc:Choice>
+    <mc:Fallback>
+      <p:transition spd="med">
+        <p:fade/>
+      </p:transition>
+    </mc:Fallback>
+  </mc:AlternateContent>
+</p:sld>
+</file>
+
+<file path=ppt/slides/slide26.xml><?xml version="1.0" encoding="utf-8"?>
+<p:sld xmlns:a="http://schemas.openxmlformats.org/drawingml/2006/main" xmlns:r="http://schemas.openxmlformats.org/officeDocument/2006/relationships" xmlns:p="http://schemas.openxmlformats.org/presentationml/2006/main">
+  <p:cSld>
+    <p:spTree>
+      <p:nvGrpSpPr>
+        <p:cNvPr id="1" name=""/>
+        <p:cNvGrpSpPr/>
+        <p:nvPr/>
+      </p:nvGrpSpPr>
+      <p:grpSpPr>
+        <a:xfrm>
+          <a:off x="0" y="0"/>
+          <a:ext cx="0" cy="0"/>
+          <a:chOff x="0" y="0"/>
+          <a:chExt cx="0" cy="0"/>
+        </a:xfrm>
+      </p:grpSpPr>
+      <p:sp>
+        <p:nvSpPr>
+          <p:cNvPr id="2" name="Title 1"/>
+          <p:cNvSpPr>
+            <a:spLocks noGrp="1"/>
+          </p:cNvSpPr>
+          <p:nvPr>
+            <p:ph type="title"/>
+          </p:nvPr>
+        </p:nvSpPr>
+        <p:spPr/>
+        <p:txBody>
+          <a:bodyPr/>
+          <a:lstStyle/>
+          <a:p>
+            <a:r>
+              <a:rPr lang="en-US" altLang="zh-CN" dirty="0" smtClean="0"/>
+              <a:t>Excel</a:t>
+            </a:r>
+            <a:r>
+              <a:rPr lang="zh-CN" altLang="en-US" dirty="0" smtClean="0"/>
+              <a:t>动手实验室 </a:t>
+            </a:r>
+            <a:r>
+              <a:rPr lang="en-US" altLang="zh-CN" dirty="0" smtClean="0"/>
+              <a:t>– </a:t>
+            </a:r>
+            <a:r>
+              <a:rPr lang="zh-CN" altLang="en-US" dirty="0" smtClean="0"/>
+              <a:t>密码保护</a:t>
+            </a:r>
+            <a:endParaRPr lang="zh-CN" altLang="en-US" dirty="0"/>
+          </a:p>
+        </p:txBody>
+      </p:sp>
+      <p:sp>
+        <p:nvSpPr>
+          <p:cNvPr id="3" name="Content Placeholder 2"/>
+          <p:cNvSpPr>
+            <a:spLocks noGrp="1"/>
+          </p:cNvSpPr>
+          <p:nvPr>
+            <p:ph idx="1"/>
+          </p:nvPr>
+        </p:nvSpPr>
+        <p:spPr/>
+        <p:txBody>
+          <a:bodyPr/>
+          <a:lstStyle/>
+          <a:p>
+            <a:r>
+              <a:rPr lang="zh-CN" altLang="en-US" dirty="0"/>
+              <a:t>密</a:t>
+            </a:r>
+            <a:r>
+              <a:rPr lang="zh-CN" altLang="en-US" dirty="0" smtClean="0"/>
+              <a:t>码保护工作簿</a:t>
+            </a:r>
+            <a:endParaRPr lang="en-US" altLang="zh-CN" dirty="0" smtClean="0"/>
+          </a:p>
+          <a:p>
+            <a:pPr lvl="1"/>
+            <a:r>
+              <a:rPr lang="zh-CN" altLang="en-US" dirty="0"/>
+              <a:t>保</a:t>
+            </a:r>
+            <a:r>
+              <a:rPr lang="zh-CN" altLang="en-US" dirty="0" smtClean="0"/>
+              <a:t>护结构</a:t>
+            </a:r>
+            <a:endParaRPr lang="en-US" altLang="zh-CN" dirty="0" smtClean="0"/>
+          </a:p>
+          <a:p>
+            <a:r>
+              <a:rPr lang="zh-CN" altLang="en-US" dirty="0"/>
+              <a:t>密码保</a:t>
+            </a:r>
+            <a:r>
+              <a:rPr lang="zh-CN" altLang="en-US" dirty="0" smtClean="0"/>
+              <a:t>护工作表</a:t>
+            </a:r>
+            <a:endParaRPr lang="en-US" altLang="zh-CN" dirty="0" smtClean="0"/>
+          </a:p>
+          <a:p>
+            <a:r>
+              <a:rPr lang="zh-CN" altLang="en-US" dirty="0"/>
+              <a:t>停止保</a:t>
+            </a:r>
+            <a:r>
+              <a:rPr lang="zh-CN" altLang="en-US" dirty="0" smtClean="0"/>
+              <a:t>护</a:t>
+            </a:r>
+            <a:endParaRPr lang="en-US" altLang="zh-CN" dirty="0" smtClean="0"/>
+          </a:p>
+          <a:p>
+            <a:r>
+              <a:rPr lang="zh-CN" altLang="en-US" dirty="0"/>
+              <a:t>只</a:t>
+            </a:r>
+            <a:r>
+              <a:rPr lang="zh-CN" altLang="en-US" dirty="0" smtClean="0"/>
+              <a:t>读工作簿</a:t>
+            </a:r>
+            <a:endParaRPr lang="en-US" altLang="zh-CN" dirty="0" smtClean="0"/>
+          </a:p>
+          <a:p>
+            <a:endParaRPr lang="zh-CN" altLang="en-US" dirty="0"/>
+          </a:p>
+        </p:txBody>
+      </p:sp>
+    </p:spTree>
+    <p:extLst>
+      <p:ext uri="{BB962C8B-B14F-4D97-AF65-F5344CB8AC3E}">
+        <p14:creationId xmlns:p14="http://schemas.microsoft.com/office/powerpoint/2010/main" val="78602382"/>
       </p:ext>
     </p:extLst>
   </p:cSld>
@@ -10442,7 +10621,11 @@
             <a:pPr lvl="1"/>
             <a:r>
               <a:rPr lang="zh-CN" altLang="en-US" dirty="0" smtClean="0"/>
-              <a:t>密码保护</a:t>
+              <a:t>密码保</a:t>
+            </a:r>
+            <a:r>
+              <a:rPr lang="zh-CN" altLang="en-US" dirty="0" smtClean="0"/>
+              <a:t>护工作簿和工作表</a:t>
             </a:r>
             <a:endParaRPr lang="en-US" altLang="zh-CN" dirty="0" smtClean="0"/>
           </a:p>
@@ -10473,9 +10656,21 @@
             </a:r>
             <a:r>
               <a:rPr lang="zh-CN" altLang="en-US" dirty="0" smtClean="0"/>
-              <a:t>数据模型</a:t>
-            </a:r>
-            <a:endParaRPr lang="zh-CN" altLang="en-US" dirty="0"/>
+              <a:t>数据模</a:t>
+            </a:r>
+            <a:r>
+              <a:rPr lang="zh-CN" altLang="en-US" dirty="0" smtClean="0"/>
+              <a:t>型</a:t>
+            </a:r>
+            <a:endParaRPr lang="en-US" altLang="zh-CN" dirty="0" smtClean="0"/>
+          </a:p>
+          <a:p>
+            <a:pPr lvl="1"/>
+            <a:r>
+              <a:rPr lang="zh-CN" altLang="en-US" dirty="0" smtClean="0"/>
+              <a:t>使用宏</a:t>
+            </a:r>
+            <a:endParaRPr lang="en-US" altLang="zh-CN" dirty="0"/>
           </a:p>
         </p:txBody>
       </p:sp>

</xml_diff>

<commit_message>
Complete "Print worksheets and workbooks"
</commit_message>
<xml_diff>
--- a/Excel动手实验室.pptx
+++ b/Excel动手实验室.pptx
@@ -5,7 +5,7 @@
     <p:sldMasterId id="2147483648" r:id="rId1"/>
   </p:sldMasterIdLst>
   <p:notesMasterIdLst>
-    <p:notesMasterId r:id="rId28"/>
+    <p:notesMasterId r:id="rId30"/>
   </p:notesMasterIdLst>
   <p:sldIdLst>
     <p:sldId id="256" r:id="rId2"/>
@@ -34,6 +34,8 @@
     <p:sldId id="279" r:id="rId25"/>
     <p:sldId id="280" r:id="rId26"/>
     <p:sldId id="281" r:id="rId27"/>
+    <p:sldId id="282" r:id="rId28"/>
+    <p:sldId id="283" r:id="rId29"/>
   </p:sldIdLst>
   <p:sldSz cx="12192000" cy="6858000"/>
   <p:notesSz cx="6858000" cy="9144000"/>
@@ -9976,6 +9978,467 @@
   <p:clrMapOvr>
     <a:masterClrMapping/>
   </p:clrMapOvr>
+  <mc:AlternateContent xmlns:mc="http://schemas.openxmlformats.org/markup-compatibility/2006">
+    <mc:Choice xmlns:p14="http://schemas.microsoft.com/office/powerpoint/2010/main" Requires="p14">
+      <p:transition spd="med" p14:dur="700">
+        <p:fade/>
+      </p:transition>
+    </mc:Choice>
+    <mc:Fallback>
+      <p:transition spd="med">
+        <p:fade/>
+      </p:transition>
+    </mc:Fallback>
+  </mc:AlternateContent>
+  <p:timing>
+    <p:tnLst>
+      <p:par>
+        <p:cTn id="1" dur="indefinite" restart="never" nodeType="tmRoot"/>
+      </p:par>
+    </p:tnLst>
+  </p:timing>
+</p:sld>
+</file>
+
+<file path=ppt/slides/slide27.xml><?xml version="1.0" encoding="utf-8"?>
+<p:sld xmlns:a="http://schemas.openxmlformats.org/drawingml/2006/main" xmlns:r="http://schemas.openxmlformats.org/officeDocument/2006/relationships" xmlns:p="http://schemas.openxmlformats.org/presentationml/2006/main">
+  <p:cSld>
+    <p:spTree>
+      <p:nvGrpSpPr>
+        <p:cNvPr id="1" name=""/>
+        <p:cNvGrpSpPr/>
+        <p:nvPr/>
+      </p:nvGrpSpPr>
+      <p:grpSpPr>
+        <a:xfrm>
+          <a:off x="0" y="0"/>
+          <a:ext cx="0" cy="0"/>
+          <a:chOff x="0" y="0"/>
+          <a:chExt cx="0" cy="0"/>
+        </a:xfrm>
+      </p:grpSpPr>
+      <p:sp>
+        <p:nvSpPr>
+          <p:cNvPr id="2" name="Title 1"/>
+          <p:cNvSpPr>
+            <a:spLocks noGrp="1"/>
+          </p:cNvSpPr>
+          <p:nvPr>
+            <p:ph type="title"/>
+          </p:nvPr>
+        </p:nvSpPr>
+        <p:spPr/>
+        <p:txBody>
+          <a:bodyPr/>
+          <a:lstStyle/>
+          <a:p>
+            <a:r>
+              <a:rPr lang="en-US" altLang="zh-CN" dirty="0" smtClean="0"/>
+              <a:t>Excel</a:t>
+            </a:r>
+            <a:r>
+              <a:rPr lang="zh-CN" altLang="en-US" dirty="0" smtClean="0"/>
+              <a:t>动手实验室 </a:t>
+            </a:r>
+            <a:r>
+              <a:rPr lang="en-US" altLang="zh-CN" dirty="0" smtClean="0"/>
+              <a:t>– </a:t>
+            </a:r>
+            <a:r>
+              <a:rPr lang="zh-CN" altLang="en-US" dirty="0" smtClean="0"/>
+              <a:t>打印（</a:t>
+            </a:r>
+            <a:r>
+              <a:rPr lang="en-US" altLang="zh-CN" dirty="0" smtClean="0"/>
+              <a:t>1</a:t>
+            </a:r>
+            <a:r>
+              <a:rPr lang="zh-CN" altLang="en-US" dirty="0" smtClean="0"/>
+              <a:t>）</a:t>
+            </a:r>
+            <a:endParaRPr lang="zh-CN" altLang="en-US" dirty="0"/>
+          </a:p>
+        </p:txBody>
+      </p:sp>
+      <p:sp>
+        <p:nvSpPr>
+          <p:cNvPr id="3" name="Content Placeholder 2"/>
+          <p:cNvSpPr>
+            <a:spLocks noGrp="1"/>
+          </p:cNvSpPr>
+          <p:nvPr>
+            <p:ph idx="1"/>
+          </p:nvPr>
+        </p:nvSpPr>
+        <p:spPr/>
+        <p:txBody>
+          <a:bodyPr>
+            <a:normAutofit/>
+          </a:bodyPr>
+          <a:lstStyle/>
+          <a:p>
+            <a:r>
+              <a:rPr lang="zh-CN" altLang="en-US" dirty="0" smtClean="0"/>
+              <a:t>打印工作表和工作簿</a:t>
+            </a:r>
+            <a:endParaRPr lang="en-US" altLang="zh-CN" dirty="0" smtClean="0"/>
+          </a:p>
+          <a:p>
+            <a:r>
+              <a:rPr lang="zh-CN" altLang="en-US" dirty="0"/>
+              <a:t>页面布</a:t>
+            </a:r>
+            <a:r>
+              <a:rPr lang="zh-CN" altLang="en-US" dirty="0" smtClean="0"/>
+              <a:t>局</a:t>
+            </a:r>
+            <a:endParaRPr lang="en-US" altLang="zh-CN" dirty="0" smtClean="0"/>
+          </a:p>
+          <a:p>
+            <a:pPr lvl="1"/>
+            <a:r>
+              <a:rPr lang="zh-CN" altLang="en-US" dirty="0"/>
+              <a:t>页</a:t>
+            </a:r>
+            <a:r>
+              <a:rPr lang="zh-CN" altLang="en-US" dirty="0" smtClean="0"/>
+              <a:t>眉 </a:t>
+            </a:r>
+            <a:r>
+              <a:rPr lang="en-US" altLang="zh-CN" dirty="0" smtClean="0"/>
+              <a:t>&amp; </a:t>
+            </a:r>
+            <a:r>
+              <a:rPr lang="zh-CN" altLang="en-US" dirty="0" smtClean="0"/>
+              <a:t>页脚</a:t>
+            </a:r>
+            <a:endParaRPr lang="en-US" altLang="zh-CN" dirty="0" smtClean="0"/>
+          </a:p>
+          <a:p>
+            <a:pPr lvl="1"/>
+            <a:r>
+              <a:rPr lang="zh-CN" altLang="en-US" dirty="0"/>
+              <a:t>标题</a:t>
+            </a:r>
+            <a:endParaRPr lang="en-US" altLang="zh-CN" dirty="0" smtClean="0"/>
+          </a:p>
+          <a:p>
+            <a:r>
+              <a:rPr lang="zh-CN" altLang="en-US" dirty="0"/>
+              <a:t>打</a:t>
+            </a:r>
+            <a:r>
+              <a:rPr lang="zh-CN" altLang="en-US" dirty="0" smtClean="0"/>
+              <a:t>印特定单元格</a:t>
+            </a:r>
+            <a:endParaRPr lang="en-US" altLang="zh-CN" dirty="0" smtClean="0"/>
+          </a:p>
+          <a:p>
+            <a:pPr lvl="1"/>
+            <a:r>
+              <a:rPr lang="zh-CN" altLang="en-US" dirty="0" smtClean="0"/>
+              <a:t>打印区域</a:t>
+            </a:r>
+            <a:endParaRPr lang="en-US" altLang="zh-CN" dirty="0" smtClean="0"/>
+          </a:p>
+          <a:p>
+            <a:r>
+              <a:rPr lang="zh-CN" altLang="en-US" dirty="0"/>
+              <a:t>打</a:t>
+            </a:r>
+            <a:r>
+              <a:rPr lang="zh-CN" altLang="en-US" dirty="0" smtClean="0"/>
+              <a:t>印特定表格</a:t>
+            </a:r>
+            <a:endParaRPr lang="en-US" altLang="zh-CN" dirty="0" smtClean="0"/>
+          </a:p>
+          <a:p>
+            <a:r>
+              <a:rPr lang="zh-CN" altLang="en-US" dirty="0" smtClean="0"/>
+              <a:t>打印特</a:t>
+            </a:r>
+            <a:r>
+              <a:rPr lang="zh-CN" altLang="en-US" dirty="0"/>
+              <a:t>定页</a:t>
+            </a:r>
+            <a:r>
+              <a:rPr lang="zh-CN" altLang="en-US" dirty="0" smtClean="0"/>
+              <a:t>面</a:t>
+            </a:r>
+            <a:endParaRPr lang="en-US" altLang="zh-CN" dirty="0" smtClean="0"/>
+          </a:p>
+          <a:p>
+            <a:pPr lvl="1"/>
+            <a:r>
+              <a:rPr lang="zh-CN" altLang="en-US" dirty="0"/>
+              <a:t>页边</a:t>
+            </a:r>
+            <a:r>
+              <a:rPr lang="zh-CN" altLang="en-US" dirty="0" smtClean="0"/>
+              <a:t>距</a:t>
+            </a:r>
+            <a:endParaRPr lang="en-US" altLang="zh-CN" dirty="0" smtClean="0"/>
+          </a:p>
+          <a:p>
+            <a:pPr lvl="1"/>
+            <a:r>
+              <a:rPr lang="zh-CN" altLang="en-US" dirty="0" smtClean="0"/>
+              <a:t>纸张方向</a:t>
+            </a:r>
+            <a:endParaRPr lang="zh-CN" altLang="en-US" dirty="0"/>
+          </a:p>
+        </p:txBody>
+      </p:sp>
+    </p:spTree>
+    <p:extLst>
+      <p:ext uri="{BB962C8B-B14F-4D97-AF65-F5344CB8AC3E}">
+        <p14:creationId xmlns:p14="http://schemas.microsoft.com/office/powerpoint/2010/main" val="3419174546"/>
+      </p:ext>
+    </p:extLst>
+  </p:cSld>
+  <p:clrMapOvr>
+    <a:masterClrMapping/>
+  </p:clrMapOvr>
+  <mc:AlternateContent xmlns:mc="http://schemas.openxmlformats.org/markup-compatibility/2006">
+    <mc:Choice xmlns:p14="http://schemas.microsoft.com/office/powerpoint/2010/main" Requires="p14">
+      <p:transition spd="med" p14:dur="700">
+        <p:fade/>
+      </p:transition>
+    </mc:Choice>
+    <mc:Fallback>
+      <p:transition spd="med">
+        <p:fade/>
+      </p:transition>
+    </mc:Fallback>
+  </mc:AlternateContent>
+  <p:timing>
+    <p:tnLst>
+      <p:par>
+        <p:cTn id="1" dur="indefinite" restart="never" nodeType="tmRoot"/>
+      </p:par>
+    </p:tnLst>
+  </p:timing>
+</p:sld>
+</file>
+
+<file path=ppt/slides/slide28.xml><?xml version="1.0" encoding="utf-8"?>
+<p:sld xmlns:a="http://schemas.openxmlformats.org/drawingml/2006/main" xmlns:r="http://schemas.openxmlformats.org/officeDocument/2006/relationships" xmlns:p="http://schemas.openxmlformats.org/presentationml/2006/main">
+  <p:cSld>
+    <p:spTree>
+      <p:nvGrpSpPr>
+        <p:cNvPr id="1" name=""/>
+        <p:cNvGrpSpPr/>
+        <p:nvPr/>
+      </p:nvGrpSpPr>
+      <p:grpSpPr>
+        <a:xfrm>
+          <a:off x="0" y="0"/>
+          <a:ext cx="0" cy="0"/>
+          <a:chOff x="0" y="0"/>
+          <a:chExt cx="0" cy="0"/>
+        </a:xfrm>
+      </p:grpSpPr>
+      <p:sp>
+        <p:nvSpPr>
+          <p:cNvPr id="2" name="Title 1"/>
+          <p:cNvSpPr>
+            <a:spLocks noGrp="1"/>
+          </p:cNvSpPr>
+          <p:nvPr>
+            <p:ph type="title"/>
+          </p:nvPr>
+        </p:nvSpPr>
+        <p:spPr/>
+        <p:txBody>
+          <a:bodyPr/>
+          <a:lstStyle/>
+          <a:p>
+            <a:r>
+              <a:rPr lang="en-US" altLang="zh-CN" dirty="0"/>
+              <a:t>Excel</a:t>
+            </a:r>
+            <a:r>
+              <a:rPr lang="zh-CN" altLang="en-US" dirty="0"/>
+              <a:t>动手实验室 </a:t>
+            </a:r>
+            <a:r>
+              <a:rPr lang="en-US" altLang="zh-CN" dirty="0"/>
+              <a:t>– </a:t>
+            </a:r>
+            <a:r>
+              <a:rPr lang="zh-CN" altLang="en-US" dirty="0"/>
+              <a:t>打印</a:t>
+            </a:r>
+            <a:r>
+              <a:rPr lang="zh-CN" altLang="en-US" dirty="0" smtClean="0"/>
+              <a:t>（</a:t>
+            </a:r>
+            <a:r>
+              <a:rPr lang="en-US" altLang="zh-CN" dirty="0" smtClean="0"/>
+              <a:t>2</a:t>
+            </a:r>
+            <a:r>
+              <a:rPr lang="zh-CN" altLang="en-US" dirty="0" smtClean="0"/>
+              <a:t>）</a:t>
+            </a:r>
+            <a:endParaRPr lang="zh-CN" altLang="en-US" dirty="0"/>
+          </a:p>
+        </p:txBody>
+      </p:sp>
+      <p:sp>
+        <p:nvSpPr>
+          <p:cNvPr id="3" name="Content Placeholder 2"/>
+          <p:cNvSpPr>
+            <a:spLocks noGrp="1"/>
+          </p:cNvSpPr>
+          <p:nvPr>
+            <p:ph idx="1"/>
+          </p:nvPr>
+        </p:nvSpPr>
+        <p:spPr/>
+        <p:txBody>
+          <a:bodyPr/>
+          <a:lstStyle/>
+          <a:p>
+            <a:r>
+              <a:rPr lang="zh-CN" altLang="en-US" dirty="0" smtClean="0"/>
+              <a:t>分</a:t>
+            </a:r>
+            <a:r>
+              <a:rPr lang="zh-CN" altLang="en-US" dirty="0"/>
+              <a:t>页预览</a:t>
+            </a:r>
+            <a:endParaRPr lang="en-US" altLang="zh-CN" dirty="0"/>
+          </a:p>
+          <a:p>
+            <a:r>
+              <a:rPr lang="zh-CN" altLang="en-US" dirty="0"/>
+              <a:t>分页</a:t>
+            </a:r>
+            <a:r>
+              <a:rPr lang="zh-CN" altLang="en-US" dirty="0" smtClean="0"/>
+              <a:t>符</a:t>
+            </a:r>
+            <a:endParaRPr lang="en-US" altLang="zh-CN" dirty="0" smtClean="0"/>
+          </a:p>
+          <a:p>
+            <a:r>
+              <a:rPr lang="zh-CN" altLang="en-US" dirty="0" smtClean="0"/>
+              <a:t>调整为合适大小</a:t>
+            </a:r>
+            <a:endParaRPr lang="en-US" altLang="zh-CN" dirty="0" smtClean="0"/>
+          </a:p>
+          <a:p>
+            <a:pPr lvl="1"/>
+            <a:r>
+              <a:rPr lang="zh-CN" altLang="en-US" dirty="0"/>
+              <a:t>宽</a:t>
+            </a:r>
+            <a:r>
+              <a:rPr lang="zh-CN" altLang="en-US" dirty="0" smtClean="0"/>
+              <a:t>度</a:t>
+            </a:r>
+            <a:endParaRPr lang="en-US" altLang="zh-CN" dirty="0" smtClean="0"/>
+          </a:p>
+          <a:p>
+            <a:pPr lvl="1"/>
+            <a:r>
+              <a:rPr lang="zh-CN" altLang="en-US" dirty="0"/>
+              <a:t>高</a:t>
+            </a:r>
+            <a:r>
+              <a:rPr lang="zh-CN" altLang="en-US" dirty="0" smtClean="0"/>
+              <a:t>度</a:t>
+            </a:r>
+            <a:endParaRPr lang="en-US" altLang="zh-CN" dirty="0" smtClean="0"/>
+          </a:p>
+          <a:p>
+            <a:pPr lvl="1"/>
+            <a:r>
+              <a:rPr lang="zh-CN" altLang="en-US" dirty="0"/>
+              <a:t>缩放比</a:t>
+            </a:r>
+            <a:r>
+              <a:rPr lang="zh-CN" altLang="en-US" dirty="0" smtClean="0"/>
+              <a:t>例</a:t>
+            </a:r>
+            <a:endParaRPr lang="en-US" altLang="zh-CN" dirty="0" smtClean="0"/>
+          </a:p>
+          <a:p>
+            <a:r>
+              <a:rPr lang="zh-CN" altLang="en-US" dirty="0"/>
+              <a:t>打</a:t>
+            </a:r>
+            <a:r>
+              <a:rPr lang="zh-CN" altLang="en-US" dirty="0" smtClean="0"/>
+              <a:t>印批注</a:t>
+            </a:r>
+            <a:endParaRPr lang="en-US" altLang="zh-CN" dirty="0" smtClean="0"/>
+          </a:p>
+          <a:p>
+            <a:r>
+              <a:rPr lang="zh-CN" altLang="en-US" dirty="0"/>
+              <a:t>打</a:t>
+            </a:r>
+            <a:r>
+              <a:rPr lang="zh-CN" altLang="en-US" dirty="0" smtClean="0"/>
+              <a:t>印网格线，标题</a:t>
+            </a:r>
+            <a:endParaRPr lang="en-US" altLang="zh-CN" dirty="0" smtClean="0"/>
+          </a:p>
+          <a:p>
+            <a:r>
+              <a:rPr lang="zh-CN" altLang="en-US" dirty="0"/>
+              <a:t>打</a:t>
+            </a:r>
+            <a:r>
+              <a:rPr lang="zh-CN" altLang="en-US" dirty="0" smtClean="0"/>
+              <a:t>印水印</a:t>
+            </a:r>
+            <a:endParaRPr lang="en-US" altLang="zh-CN" dirty="0" smtClean="0"/>
+          </a:p>
+          <a:p>
+            <a:r>
+              <a:rPr lang="zh-CN" altLang="en-US" dirty="0"/>
+              <a:t>打</a:t>
+            </a:r>
+            <a:r>
+              <a:rPr lang="zh-CN" altLang="en-US" dirty="0" smtClean="0"/>
+              <a:t>印公式</a:t>
+            </a:r>
+            <a:endParaRPr lang="zh-CN" altLang="en-US" dirty="0"/>
+          </a:p>
+        </p:txBody>
+      </p:sp>
+    </p:spTree>
+    <p:extLst>
+      <p:ext uri="{BB962C8B-B14F-4D97-AF65-F5344CB8AC3E}">
+        <p14:creationId xmlns:p14="http://schemas.microsoft.com/office/powerpoint/2010/main" val="1053821754"/>
+      </p:ext>
+    </p:extLst>
+  </p:cSld>
+  <p:clrMapOvr>
+    <a:masterClrMapping/>
+  </p:clrMapOvr>
+  <mc:AlternateContent xmlns:mc="http://schemas.openxmlformats.org/markup-compatibility/2006">
+    <mc:Choice xmlns:p14="http://schemas.microsoft.com/office/powerpoint/2010/main" Requires="p14">
+      <p:transition spd="med" p14:dur="700">
+        <p:fade/>
+      </p:transition>
+    </mc:Choice>
+    <mc:Fallback>
+      <p:transition spd="med">
+        <p:fade/>
+      </p:transition>
+    </mc:Fallback>
+  </mc:AlternateContent>
+  <p:timing>
+    <p:tnLst>
+      <p:par>
+        <p:cTn id="1" dur="indefinite" restart="never" nodeType="tmRoot"/>
+      </p:par>
+    </p:tnLst>
+  </p:timing>
 </p:sld>
 </file>
 
@@ -10552,7 +11015,9 @@
         </p:nvSpPr>
         <p:spPr/>
         <p:txBody>
-          <a:bodyPr/>
+          <a:bodyPr>
+            <a:normAutofit/>
+          </a:bodyPr>
           <a:lstStyle/>
           <a:p>
             <a:r>
@@ -10637,38 +11102,34 @@
             </a:r>
             <a:r>
               <a:rPr lang="zh-CN" altLang="en-US" dirty="0" smtClean="0"/>
-              <a:t>印</a:t>
-            </a:r>
-            <a:endParaRPr lang="en-US" altLang="zh-CN" dirty="0" smtClean="0"/>
-          </a:p>
-          <a:p>
-            <a:pPr lvl="1"/>
-            <a:r>
-              <a:rPr lang="en-US" altLang="zh-CN" dirty="0" smtClean="0"/>
+              <a:t>印工作表和工作簿</a:t>
+            </a:r>
+            <a:endParaRPr lang="en-US" altLang="zh-CN" dirty="0" smtClean="0"/>
+          </a:p>
+          <a:p>
+            <a:pPr lvl="1"/>
+            <a:r>
+              <a:rPr lang="zh-CN" altLang="en-US" dirty="0" smtClean="0"/>
+              <a:t>使用宏</a:t>
+            </a:r>
+            <a:endParaRPr lang="en-US" altLang="zh-CN" dirty="0"/>
+          </a:p>
+          <a:p>
+            <a:pPr lvl="1"/>
+            <a:r>
+              <a:rPr lang="en-US" altLang="zh-CN" dirty="0"/>
               <a:t>Power pivot</a:t>
             </a:r>
           </a:p>
           <a:p>
             <a:pPr lvl="1"/>
             <a:r>
-              <a:rPr lang="en-US" altLang="zh-CN" dirty="0" smtClean="0"/>
+              <a:rPr lang="en-US" altLang="zh-CN" dirty="0"/>
               <a:t>Excel</a:t>
             </a:r>
             <a:r>
-              <a:rPr lang="zh-CN" altLang="en-US" dirty="0" smtClean="0"/>
-              <a:t>数据模</a:t>
-            </a:r>
-            <a:r>
-              <a:rPr lang="zh-CN" altLang="en-US" dirty="0" smtClean="0"/>
-              <a:t>型</a:t>
-            </a:r>
-            <a:endParaRPr lang="en-US" altLang="zh-CN" dirty="0" smtClean="0"/>
-          </a:p>
-          <a:p>
-            <a:pPr lvl="1"/>
-            <a:r>
-              <a:rPr lang="zh-CN" altLang="en-US" dirty="0" smtClean="0"/>
-              <a:t>使用宏</a:t>
+              <a:rPr lang="zh-CN" altLang="en-US" dirty="0"/>
+              <a:t>数据模型</a:t>
             </a:r>
             <a:endParaRPr lang="en-US" altLang="zh-CN" dirty="0"/>
           </a:p>

</xml_diff>

<commit_message>
Complete "Work with macros"
</commit_message>
<xml_diff>
--- a/Excel动手实验室.pptx
+++ b/Excel动手实验室.pptx
@@ -5,7 +5,7 @@
     <p:sldMasterId id="2147483648" r:id="rId1"/>
   </p:sldMasterIdLst>
   <p:notesMasterIdLst>
-    <p:notesMasterId r:id="rId30"/>
+    <p:notesMasterId r:id="rId31"/>
   </p:notesMasterIdLst>
   <p:sldIdLst>
     <p:sldId id="256" r:id="rId2"/>
@@ -36,6 +36,7 @@
     <p:sldId id="281" r:id="rId27"/>
     <p:sldId id="282" r:id="rId28"/>
     <p:sldId id="283" r:id="rId29"/>
+    <p:sldId id="284" r:id="rId30"/>
   </p:sldIdLst>
   <p:sldSz cx="12192000" cy="6858000"/>
   <p:notesSz cx="6858000" cy="9144000"/>
@@ -10414,6 +10415,196 @@
     <p:extLst>
       <p:ext uri="{BB962C8B-B14F-4D97-AF65-F5344CB8AC3E}">
         <p14:creationId xmlns:p14="http://schemas.microsoft.com/office/powerpoint/2010/main" val="1053821754"/>
+      </p:ext>
+    </p:extLst>
+  </p:cSld>
+  <p:clrMapOvr>
+    <a:masterClrMapping/>
+  </p:clrMapOvr>
+  <mc:AlternateContent xmlns:mc="http://schemas.openxmlformats.org/markup-compatibility/2006">
+    <mc:Choice xmlns:p14="http://schemas.microsoft.com/office/powerpoint/2010/main" Requires="p14">
+      <p:transition spd="med" p14:dur="700">
+        <p:fade/>
+      </p:transition>
+    </mc:Choice>
+    <mc:Fallback>
+      <p:transition spd="med">
+        <p:fade/>
+      </p:transition>
+    </mc:Fallback>
+  </mc:AlternateContent>
+  <p:timing>
+    <p:tnLst>
+      <p:par>
+        <p:cTn id="1" dur="indefinite" restart="never" nodeType="tmRoot"/>
+      </p:par>
+    </p:tnLst>
+  </p:timing>
+</p:sld>
+</file>
+
+<file path=ppt/slides/slide29.xml><?xml version="1.0" encoding="utf-8"?>
+<p:sld xmlns:a="http://schemas.openxmlformats.org/drawingml/2006/main" xmlns:r="http://schemas.openxmlformats.org/officeDocument/2006/relationships" xmlns:p="http://schemas.openxmlformats.org/presentationml/2006/main">
+  <p:cSld>
+    <p:spTree>
+      <p:nvGrpSpPr>
+        <p:cNvPr id="1" name=""/>
+        <p:cNvGrpSpPr/>
+        <p:nvPr/>
+      </p:nvGrpSpPr>
+      <p:grpSpPr>
+        <a:xfrm>
+          <a:off x="0" y="0"/>
+          <a:ext cx="0" cy="0"/>
+          <a:chOff x="0" y="0"/>
+          <a:chExt cx="0" cy="0"/>
+        </a:xfrm>
+      </p:grpSpPr>
+      <p:sp>
+        <p:nvSpPr>
+          <p:cNvPr id="2" name="Title 1"/>
+          <p:cNvSpPr>
+            <a:spLocks noGrp="1"/>
+          </p:cNvSpPr>
+          <p:nvPr>
+            <p:ph type="title"/>
+          </p:nvPr>
+        </p:nvSpPr>
+        <p:spPr/>
+        <p:txBody>
+          <a:bodyPr/>
+          <a:lstStyle/>
+          <a:p>
+            <a:r>
+              <a:rPr lang="en-US" altLang="zh-CN" dirty="0" smtClean="0"/>
+              <a:t>Excel</a:t>
+            </a:r>
+            <a:r>
+              <a:rPr lang="zh-CN" altLang="en-US" dirty="0" smtClean="0"/>
+              <a:t>动手实验室 </a:t>
+            </a:r>
+            <a:r>
+              <a:rPr lang="en-US" altLang="zh-CN" dirty="0" smtClean="0"/>
+              <a:t>– </a:t>
+            </a:r>
+            <a:r>
+              <a:rPr lang="zh-CN" altLang="en-US" dirty="0" smtClean="0"/>
+              <a:t>使用宏</a:t>
+            </a:r>
+            <a:endParaRPr lang="zh-CN" altLang="en-US" dirty="0"/>
+          </a:p>
+        </p:txBody>
+      </p:sp>
+      <p:sp>
+        <p:nvSpPr>
+          <p:cNvPr id="3" name="Content Placeholder 2"/>
+          <p:cNvSpPr>
+            <a:spLocks noGrp="1"/>
+          </p:cNvSpPr>
+          <p:nvPr>
+            <p:ph idx="1"/>
+          </p:nvPr>
+        </p:nvSpPr>
+        <p:spPr/>
+        <p:txBody>
+          <a:bodyPr/>
+          <a:lstStyle/>
+          <a:p>
+            <a:r>
+              <a:rPr lang="zh-CN" altLang="en-US" dirty="0" smtClean="0"/>
+              <a:t>开发工具</a:t>
+            </a:r>
+            <a:endParaRPr lang="en-US" altLang="zh-CN" dirty="0" smtClean="0"/>
+          </a:p>
+          <a:p>
+            <a:r>
+              <a:rPr lang="zh-CN" altLang="en-US" dirty="0"/>
+              <a:t>录制</a:t>
+            </a:r>
+            <a:r>
+              <a:rPr lang="zh-CN" altLang="en-US" dirty="0" smtClean="0"/>
+              <a:t>宏</a:t>
+            </a:r>
+            <a:endParaRPr lang="en-US" altLang="zh-CN" dirty="0" smtClean="0"/>
+          </a:p>
+          <a:p>
+            <a:pPr lvl="1"/>
+            <a:r>
+              <a:rPr lang="zh-CN" altLang="en-US" dirty="0"/>
+              <a:t>绝</a:t>
+            </a:r>
+            <a:r>
+              <a:rPr lang="zh-CN" altLang="en-US" dirty="0" smtClean="0"/>
+              <a:t>对引用</a:t>
+            </a:r>
+            <a:endParaRPr lang="en-US" altLang="zh-CN" dirty="0" smtClean="0"/>
+          </a:p>
+          <a:p>
+            <a:pPr lvl="1"/>
+            <a:r>
+              <a:rPr lang="zh-CN" altLang="en-US" dirty="0"/>
+              <a:t>相</a:t>
+            </a:r>
+            <a:r>
+              <a:rPr lang="zh-CN" altLang="en-US" dirty="0" smtClean="0"/>
+              <a:t>对引用</a:t>
+            </a:r>
+            <a:endParaRPr lang="en-US" altLang="zh-CN" dirty="0" smtClean="0"/>
+          </a:p>
+          <a:p>
+            <a:r>
+              <a:rPr lang="zh-CN" altLang="en-US" dirty="0"/>
+              <a:t>编</a:t>
+            </a:r>
+            <a:r>
+              <a:rPr lang="zh-CN" altLang="en-US" dirty="0" smtClean="0"/>
+              <a:t>辑宏</a:t>
+            </a:r>
+            <a:endParaRPr lang="en-US" altLang="zh-CN" dirty="0" smtClean="0"/>
+          </a:p>
+          <a:p>
+            <a:pPr lvl="1"/>
+            <a:r>
+              <a:rPr lang="en-US" altLang="zh-CN" dirty="0" smtClean="0"/>
+              <a:t>Visual Basic</a:t>
+            </a:r>
+          </a:p>
+          <a:p>
+            <a:r>
+              <a:rPr lang="zh-CN" altLang="en-US" dirty="0"/>
+              <a:t>保</a:t>
+            </a:r>
+            <a:r>
+              <a:rPr lang="zh-CN" altLang="en-US" dirty="0" smtClean="0"/>
+              <a:t>存宏</a:t>
+            </a:r>
+            <a:endParaRPr lang="en-US" altLang="zh-CN" dirty="0" smtClean="0"/>
+          </a:p>
+          <a:p>
+            <a:pPr lvl="1"/>
+            <a:r>
+              <a:rPr lang="zh-CN" altLang="en-US" dirty="0"/>
+              <a:t>个</a:t>
+            </a:r>
+            <a:r>
+              <a:rPr lang="zh-CN" altLang="en-US" dirty="0" smtClean="0"/>
+              <a:t>人宏工作簿</a:t>
+            </a:r>
+            <a:endParaRPr lang="en-US" altLang="zh-CN" dirty="0" smtClean="0"/>
+          </a:p>
+          <a:p>
+            <a:r>
+              <a:rPr lang="zh-CN" altLang="en-US" dirty="0" smtClean="0"/>
+              <a:t>为宏分配按钮</a:t>
+            </a:r>
+            <a:endParaRPr lang="zh-CN" altLang="en-US" dirty="0"/>
+          </a:p>
+        </p:txBody>
+      </p:sp>
+    </p:spTree>
+    <p:extLst>
+      <p:ext uri="{BB962C8B-B14F-4D97-AF65-F5344CB8AC3E}">
+        <p14:creationId xmlns:p14="http://schemas.microsoft.com/office/powerpoint/2010/main" val="1658433752"/>
       </p:ext>
     </p:extLst>
   </p:cSld>

</xml_diff>

<commit_message>
Fix some error in slide 16
</commit_message>
<xml_diff>
--- a/Excel动手实验室.pptx
+++ b/Excel动手实验室.pptx
@@ -137,7 +137,18 @@
   </p:defaultTextStyle>
   <p:extLst>
     <p:ext uri="{EFAFB233-063F-42B5-8137-9DF3F51BA10A}">
-      <p15:sldGuideLst xmlns:p15="http://schemas.microsoft.com/office/powerpoint/2012/main" xmlns=""/>
+      <p15:sldGuideLst xmlns:p15="http://schemas.microsoft.com/office/powerpoint/2012/main">
+        <p15:guide id="1" orient="horz" pos="2160">
+          <p15:clr>
+            <a:srgbClr val="A4A3A4"/>
+          </p15:clr>
+        </p15:guide>
+        <p15:guide id="2" pos="3840">
+          <p15:clr>
+            <a:srgbClr val="A4A3A4"/>
+          </p15:clr>
+        </p15:guide>
+      </p15:sldGuideLst>
     </p:ext>
   </p:extLst>
 </p:presentation>
@@ -225,7 +236,7 @@
           <a:p>
             <a:fld id="{1BA39FD8-4789-4E5D-8B57-25E95F0DBEC2}" type="datetimeFigureOut">
               <a:rPr lang="zh-CN" altLang="en-US" smtClean="0"/>
-              <a:t>2015/6/21</a:t>
+              <a:t>2015/7/1</a:t>
             </a:fld>
             <a:endParaRPr lang="zh-CN" altLang="en-US"/>
           </a:p>
@@ -1212,7 +1223,7 @@
           <a:p>
             <a:fld id="{4AAD347D-5ACD-4C99-B74B-A9C85AD731AF}" type="datetimeFigureOut">
               <a:rPr lang="en-US" dirty="0"/>
-              <a:t>6/21/15</a:t>
+              <a:t>7/1/2015</a:t>
             </a:fld>
             <a:endParaRPr lang="en-US" dirty="0"/>
           </a:p>
@@ -1482,7 +1493,7 @@
           <a:p>
             <a:fld id="{4509A250-FF31-4206-8172-F9D3106AACB1}" type="datetimeFigureOut">
               <a:rPr lang="en-US" dirty="0"/>
-              <a:t>6/21/15</a:t>
+              <a:t>7/1/2015</a:t>
             </a:fld>
             <a:endParaRPr lang="en-US" dirty="0"/>
           </a:p>
@@ -1671,7 +1682,7 @@
           <a:p>
             <a:fld id="{4509A250-FF31-4206-8172-F9D3106AACB1}" type="datetimeFigureOut">
               <a:rPr lang="en-US" dirty="0"/>
-              <a:t>6/21/15</a:t>
+              <a:t>7/1/2015</a:t>
             </a:fld>
             <a:endParaRPr lang="en-US" dirty="0"/>
           </a:p>
@@ -1934,7 +1945,7 @@
           <a:p>
             <a:fld id="{4509A250-FF31-4206-8172-F9D3106AACB1}" type="datetimeFigureOut">
               <a:rPr lang="en-US" dirty="0"/>
-              <a:t>6/21/15</a:t>
+              <a:t>7/1/2015</a:t>
             </a:fld>
             <a:endParaRPr lang="en-US" dirty="0"/>
           </a:p>
@@ -2261,7 +2272,7 @@
           <a:p>
             <a:fld id="{4509A250-FF31-4206-8172-F9D3106AACB1}" type="datetimeFigureOut">
               <a:rPr lang="en-US" dirty="0"/>
-              <a:t>6/21/15</a:t>
+              <a:t>7/1/2015</a:t>
             </a:fld>
             <a:endParaRPr lang="en-US" dirty="0"/>
           </a:p>
@@ -2866,7 +2877,7 @@
           <a:p>
             <a:fld id="{4509A250-FF31-4206-8172-F9D3106AACB1}" type="datetimeFigureOut">
               <a:rPr lang="en-US" dirty="0"/>
-              <a:t>6/21/15</a:t>
+              <a:t>7/1/2015</a:t>
             </a:fld>
             <a:endParaRPr lang="en-US" dirty="0"/>
           </a:p>
@@ -3708,7 +3719,7 @@
           <a:p>
             <a:fld id="{4509A250-FF31-4206-8172-F9D3106AACB1}" type="datetimeFigureOut">
               <a:rPr lang="en-US" dirty="0"/>
-              <a:t>6/21/15</a:t>
+              <a:t>7/1/2015</a:t>
             </a:fld>
             <a:endParaRPr lang="en-US" dirty="0"/>
           </a:p>
@@ -3873,7 +3884,7 @@
           <a:p>
             <a:fld id="{4509A250-FF31-4206-8172-F9D3106AACB1}" type="datetimeFigureOut">
               <a:rPr lang="en-US" dirty="0"/>
-              <a:t>6/21/15</a:t>
+              <a:t>7/1/2015</a:t>
             </a:fld>
             <a:endParaRPr lang="en-US" dirty="0"/>
           </a:p>
@@ -4048,7 +4059,7 @@
           <a:p>
             <a:fld id="{4509A250-FF31-4206-8172-F9D3106AACB1}" type="datetimeFigureOut">
               <a:rPr lang="en-US" dirty="0"/>
-              <a:t>6/21/15</a:t>
+              <a:t>7/1/2015</a:t>
             </a:fld>
             <a:endParaRPr lang="en-US" dirty="0"/>
           </a:p>
@@ -4213,7 +4224,7 @@
           <a:p>
             <a:fld id="{4509A250-FF31-4206-8172-F9D3106AACB1}" type="datetimeFigureOut">
               <a:rPr lang="en-US" dirty="0"/>
-              <a:t>6/21/15</a:t>
+              <a:t>7/1/2015</a:t>
             </a:fld>
             <a:endParaRPr lang="en-US" dirty="0"/>
           </a:p>
@@ -4452,7 +4463,7 @@
           <a:p>
             <a:fld id="{4509A250-FF31-4206-8172-F9D3106AACB1}" type="datetimeFigureOut">
               <a:rPr lang="en-US" dirty="0"/>
-              <a:t>6/21/15</a:t>
+              <a:t>7/1/2015</a:t>
             </a:fld>
             <a:endParaRPr lang="en-US" dirty="0"/>
           </a:p>
@@ -4739,7 +4750,7 @@
           <a:p>
             <a:fld id="{4509A250-FF31-4206-8172-F9D3106AACB1}" type="datetimeFigureOut">
               <a:rPr lang="en-US" dirty="0"/>
-              <a:t>6/21/15</a:t>
+              <a:t>7/1/2015</a:t>
             </a:fld>
             <a:endParaRPr lang="en-US" dirty="0"/>
           </a:p>
@@ -5172,7 +5183,7 @@
           <a:p>
             <a:fld id="{4509A250-FF31-4206-8172-F9D3106AACB1}" type="datetimeFigureOut">
               <a:rPr lang="en-US" dirty="0"/>
-              <a:t>6/21/15</a:t>
+              <a:t>7/1/2015</a:t>
             </a:fld>
             <a:endParaRPr lang="en-US" dirty="0"/>
           </a:p>
@@ -5285,7 +5296,7 @@
           <a:p>
             <a:fld id="{4509A250-FF31-4206-8172-F9D3106AACB1}" type="datetimeFigureOut">
               <a:rPr lang="en-US" dirty="0"/>
-              <a:t>6/21/15</a:t>
+              <a:t>7/1/2015</a:t>
             </a:fld>
             <a:endParaRPr lang="en-US" dirty="0"/>
           </a:p>
@@ -5375,7 +5386,7 @@
           <a:p>
             <a:fld id="{4509A250-FF31-4206-8172-F9D3106AACB1}" type="datetimeFigureOut">
               <a:rPr lang="en-US" dirty="0"/>
-              <a:t>6/21/15</a:t>
+              <a:t>7/1/2015</a:t>
             </a:fld>
             <a:endParaRPr lang="en-US" dirty="0"/>
           </a:p>
@@ -5649,7 +5660,7 @@
           <a:p>
             <a:fld id="{4509A250-FF31-4206-8172-F9D3106AACB1}" type="datetimeFigureOut">
               <a:rPr lang="en-US" dirty="0"/>
-              <a:t>6/21/15</a:t>
+              <a:t>7/1/2015</a:t>
             </a:fld>
             <a:endParaRPr lang="en-US" dirty="0"/>
           </a:p>
@@ -5919,7 +5930,7 @@
           <a:p>
             <a:fld id="{4509A250-FF31-4206-8172-F9D3106AACB1}" type="datetimeFigureOut">
               <a:rPr lang="en-US" dirty="0"/>
-              <a:t>6/21/15</a:t>
+              <a:t>7/1/2015</a:t>
             </a:fld>
             <a:endParaRPr lang="en-US" dirty="0"/>
           </a:p>
@@ -6343,7 +6354,7 @@
           <a:p>
             <a:fld id="{4509A250-FF31-4206-8172-F9D3106AACB1}" type="datetimeFigureOut">
               <a:rPr lang="en-US" dirty="0"/>
-              <a:t>6/21/15</a:t>
+              <a:t>7/1/2015</a:t>
             </a:fld>
             <a:endParaRPr lang="en-US" dirty="0"/>
           </a:p>
@@ -8021,17 +8032,47 @@
             <a:pPr lvl="1"/>
             <a:r>
               <a:rPr lang="zh-CN" altLang="en-US" dirty="0" smtClean="0"/>
-              <a:t>自定义排序</a:t>
-            </a:r>
-            <a:endParaRPr lang="en-US" altLang="zh-CN" dirty="0" smtClean="0"/>
-          </a:p>
-          <a:p>
-            <a:pPr lvl="1"/>
-            <a:r>
-              <a:rPr lang="zh-CN" altLang="en-US" dirty="0" smtClean="0"/>
-              <a:t>按照颜色排序</a:t>
-            </a:r>
-            <a:endParaRPr lang="en-US" altLang="zh-CN" dirty="0" smtClean="0"/>
+              <a:t>自</a:t>
+            </a:r>
+            <a:r>
+              <a:rPr lang="zh-CN" altLang="en-US" dirty="0"/>
+              <a:t>定义序</a:t>
+            </a:r>
+            <a:r>
+              <a:rPr lang="zh-CN" altLang="en-US" dirty="0" smtClean="0"/>
+              <a:t>列排</a:t>
+            </a:r>
+            <a:r>
+              <a:rPr lang="zh-CN" altLang="en-US" dirty="0"/>
+              <a:t>序</a:t>
+            </a:r>
+            <a:endParaRPr lang="en-US" altLang="zh-CN" dirty="0" smtClean="0"/>
+          </a:p>
+          <a:p>
+            <a:pPr lvl="1"/>
+            <a:r>
+              <a:rPr lang="zh-CN" altLang="en-US" dirty="0" smtClean="0"/>
+              <a:t>按照颜色排</a:t>
+            </a:r>
+            <a:r>
+              <a:rPr lang="zh-CN" altLang="en-US" dirty="0" smtClean="0"/>
+              <a:t>序</a:t>
+            </a:r>
+            <a:endParaRPr lang="en-US" altLang="zh-CN" dirty="0" smtClean="0"/>
+          </a:p>
+          <a:p>
+            <a:pPr lvl="1"/>
+            <a:r>
+              <a:rPr lang="ja-JP" altLang="en-US" dirty="0">
+                <a:latin typeface="SimSun" panose="02010600030101010101" pitchFamily="2" charset="-122"/>
+                <a:ea typeface="SimSun" panose="02010600030101010101" pitchFamily="2" charset="-122"/>
+              </a:rPr>
+              <a:t>行排序</a:t>
+            </a:r>
+            <a:endParaRPr lang="en-US" altLang="zh-CN" dirty="0">
+              <a:latin typeface="SimSun" panose="02010600030101010101" pitchFamily="2" charset="-122"/>
+              <a:ea typeface="SimSun" panose="02010600030101010101" pitchFamily="2" charset="-122"/>
+            </a:endParaRPr>
           </a:p>
           <a:p>
             <a:r>
@@ -8059,14 +8100,16 @@
           <a:p>
             <a:pPr lvl="1"/>
             <a:r>
-              <a:rPr lang="zh-CN" altLang="en-US" dirty="0"/>
-              <a:t>自定</a:t>
-            </a:r>
-            <a:r>
-              <a:rPr lang="zh-CN" altLang="en-US" dirty="0" smtClean="0"/>
-              <a:t>义筛选</a:t>
-            </a:r>
-            <a:endParaRPr lang="en-US" altLang="zh-CN" dirty="0" smtClean="0"/>
+              <a:rPr lang="ja-JP" altLang="en-US" dirty="0">
+                <a:latin typeface="SimSun" panose="02010600030101010101" pitchFamily="2" charset="-122"/>
+                <a:ea typeface="SimSun" panose="02010600030101010101" pitchFamily="2" charset="-122"/>
+              </a:rPr>
+              <a:t>高级筛选</a:t>
+            </a:r>
+            <a:endParaRPr lang="en-US" altLang="zh-CN" dirty="0" smtClean="0">
+              <a:latin typeface="SimSun" panose="02010600030101010101" pitchFamily="2" charset="-122"/>
+              <a:ea typeface="SimSun" panose="02010600030101010101" pitchFamily="2" charset="-122"/>
+            </a:endParaRPr>
           </a:p>
         </p:txBody>
       </p:sp>
@@ -11289,11 +11332,7 @@
             <a:pPr lvl="1"/>
             <a:r>
               <a:rPr lang="zh-CN" altLang="en-US" smtClean="0"/>
-              <a:t>使用</a:t>
-            </a:r>
-            <a:r>
-              <a:rPr lang="zh-CN" altLang="en-US" smtClean="0"/>
-              <a:t>宏</a:t>
+              <a:t>使用宏</a:t>
             </a:r>
             <a:endParaRPr lang="zh-CN" altLang="en-US" dirty="0" smtClean="0"/>
           </a:p>
@@ -12113,7 +12152,7 @@
   <a:extraClrSchemeLst/>
   <a:extLst>
     <a:ext uri="{05A4C25C-085E-4340-85A3-A5531E510DB2}">
-      <thm15:themeFamily xmlns:thm15="http://schemas.microsoft.com/office/thememl/2012/main" xmlns="" name="Ion" id="{B8441ADB-2E43-4AF7-B97A-BD870242C6A8}" vid="{BACC050B-8757-4460-95D8-E37B46A6B421}"/>
+      <thm15:themeFamily xmlns:thm15="http://schemas.microsoft.com/office/thememl/2012/main" name="Ion" id="{B8441ADB-2E43-4AF7-B97A-BD870242C6A8}" vid="{BACC050B-8757-4460-95D8-E37B46A6B421}"/>
     </a:ext>
   </a:extLst>
 </a:theme>
@@ -12374,7 +12413,7 @@
   <a:extraClrSchemeLst/>
   <a:extLst>
     <a:ext uri="{05A4C25C-085E-4340-85A3-A5531E510DB2}">
-      <thm15:themeFamily xmlns:thm15="http://schemas.microsoft.com/office/thememl/2012/main" xmlns="" name="Office Theme" id="{62F939B6-93AF-4DB8-9C6B-D6C7DFDC589F}" vid="{4A3C46E8-61CC-4603-A589-7422A47A8E4A}"/>
+      <thm15:themeFamily xmlns:thm15="http://schemas.microsoft.com/office/thememl/2012/main" name="Office Theme" id="{62F939B6-93AF-4DB8-9C6B-D6C7DFDC589F}" vid="{4A3C46E8-61CC-4603-A589-7422A47A8E4A}"/>
     </a:ext>
   </a:extLst>
 </a:theme>

</xml_diff>

<commit_message>
Fix error in slide 16
</commit_message>
<xml_diff>
--- a/Excel动手实验室.pptx
+++ b/Excel动手实验室.pptx
@@ -8104,7 +8104,21 @@
                 <a:latin typeface="SimSun" panose="02010600030101010101" pitchFamily="2" charset="-122"/>
                 <a:ea typeface="SimSun" panose="02010600030101010101" pitchFamily="2" charset="-122"/>
               </a:rPr>
-              <a:t>高级筛选</a:t>
+              <a:t>颜</a:t>
+            </a:r>
+            <a:r>
+              <a:rPr lang="ja-JP" altLang="en-US" dirty="0" smtClean="0">
+                <a:latin typeface="SimSun" panose="02010600030101010101" pitchFamily="2" charset="-122"/>
+                <a:ea typeface="SimSun" panose="02010600030101010101" pitchFamily="2" charset="-122"/>
+              </a:rPr>
+              <a:t>色筛</a:t>
+            </a:r>
+            <a:r>
+              <a:rPr lang="ja-JP" altLang="en-US" dirty="0">
+                <a:latin typeface="SimSun" panose="02010600030101010101" pitchFamily="2" charset="-122"/>
+                <a:ea typeface="SimSun" panose="02010600030101010101" pitchFamily="2" charset="-122"/>
+              </a:rPr>
+              <a:t>选</a:t>
             </a:r>
             <a:endParaRPr lang="en-US" altLang="zh-CN" dirty="0" smtClean="0">
               <a:latin typeface="SimSun" panose="02010600030101010101" pitchFamily="2" charset="-122"/>

</xml_diff>

<commit_message>
Fix some error in slide 20
</commit_message>
<xml_diff>
--- a/Excel动手实验室.pptx
+++ b/Excel动手实验室.pptx
@@ -8962,16 +8962,36 @@
           <a:p>
             <a:pPr lvl="1"/>
             <a:r>
-              <a:rPr lang="zh-CN" altLang="en-US" dirty="0" smtClean="0"/>
-              <a:t>超越表格在查阅值右侧或另外一张工作表</a:t>
-            </a:r>
-            <a:endParaRPr lang="en-US" altLang="zh-CN" dirty="0" smtClean="0"/>
-          </a:p>
-          <a:p>
-            <a:pPr lvl="1"/>
-            <a:r>
-              <a:rPr lang="zh-CN" altLang="en-US" dirty="0" smtClean="0"/>
-              <a:t>按列排列数据</a:t>
+              <a:rPr lang="zh-CN" altLang="en-US" dirty="0"/>
+              <a:t>查</a:t>
+            </a:r>
+            <a:r>
+              <a:rPr lang="zh-CN" altLang="en-US" dirty="0" smtClean="0"/>
+              <a:t>阅表</a:t>
+            </a:r>
+            <a:r>
+              <a:rPr lang="zh-CN" altLang="en-US" dirty="0" smtClean="0"/>
+              <a:t>格在查阅值右侧或另外一张工作表</a:t>
+            </a:r>
+            <a:endParaRPr lang="en-US" altLang="zh-CN" dirty="0" smtClean="0"/>
+          </a:p>
+          <a:p>
+            <a:pPr lvl="1"/>
+            <a:r>
+              <a:rPr lang="zh-CN" altLang="en-US" dirty="0"/>
+              <a:t>按行排</a:t>
+            </a:r>
+            <a:r>
+              <a:rPr lang="zh-CN" altLang="en-US" dirty="0" smtClean="0"/>
+              <a:t>列</a:t>
+            </a:r>
+            <a:r>
+              <a:rPr lang="zh-CN" altLang="en-US" dirty="0" smtClean="0"/>
+              <a:t>数</a:t>
+            </a:r>
+            <a:r>
+              <a:rPr lang="zh-CN" altLang="en-US" dirty="0" smtClean="0"/>
+              <a:t>据</a:t>
             </a:r>
             <a:endParaRPr lang="en-US" altLang="zh-CN" dirty="0" smtClean="0"/>
           </a:p>
@@ -8983,7 +9003,15 @@
             </a:r>
             <a:r>
               <a:rPr lang="zh-CN" altLang="en-US" dirty="0" smtClean="0"/>
-              <a:t>制时绝对单元格引用</a:t>
+              <a:t>制</a:t>
+            </a:r>
+            <a:r>
+              <a:rPr lang="zh-CN" altLang="en-US" dirty="0"/>
+              <a:t>时没有用绝</a:t>
+            </a:r>
+            <a:r>
+              <a:rPr lang="zh-CN" altLang="en-US" dirty="0" smtClean="0"/>
+              <a:t>对单元格引用</a:t>
             </a:r>
             <a:endParaRPr lang="zh-CN" altLang="en-US" dirty="0"/>
           </a:p>

</xml_diff>

<commit_message>
Fix some error in slide 23
</commit_message>
<xml_diff>
--- a/Excel动手实验室.pptx
+++ b/Excel动手实验室.pptx
@@ -236,7 +236,7 @@
           <a:p>
             <a:fld id="{1BA39FD8-4789-4E5D-8B57-25E95F0DBEC2}" type="datetimeFigureOut">
               <a:rPr lang="zh-CN" altLang="en-US" smtClean="0"/>
-              <a:t>2015/7/1</a:t>
+              <a:t>2015/7/3</a:t>
             </a:fld>
             <a:endParaRPr lang="zh-CN" altLang="en-US"/>
           </a:p>
@@ -1223,7 +1223,7 @@
           <a:p>
             <a:fld id="{4AAD347D-5ACD-4C99-B74B-A9C85AD731AF}" type="datetimeFigureOut">
               <a:rPr lang="en-US" dirty="0"/>
-              <a:t>7/1/2015</a:t>
+              <a:t>7/3/2015</a:t>
             </a:fld>
             <a:endParaRPr lang="en-US" dirty="0"/>
           </a:p>
@@ -1493,7 +1493,7 @@
           <a:p>
             <a:fld id="{4509A250-FF31-4206-8172-F9D3106AACB1}" type="datetimeFigureOut">
               <a:rPr lang="en-US" dirty="0"/>
-              <a:t>7/1/2015</a:t>
+              <a:t>7/3/2015</a:t>
             </a:fld>
             <a:endParaRPr lang="en-US" dirty="0"/>
           </a:p>
@@ -1682,7 +1682,7 @@
           <a:p>
             <a:fld id="{4509A250-FF31-4206-8172-F9D3106AACB1}" type="datetimeFigureOut">
               <a:rPr lang="en-US" dirty="0"/>
-              <a:t>7/1/2015</a:t>
+              <a:t>7/3/2015</a:t>
             </a:fld>
             <a:endParaRPr lang="en-US" dirty="0"/>
           </a:p>
@@ -1945,7 +1945,7 @@
           <a:p>
             <a:fld id="{4509A250-FF31-4206-8172-F9D3106AACB1}" type="datetimeFigureOut">
               <a:rPr lang="en-US" dirty="0"/>
-              <a:t>7/1/2015</a:t>
+              <a:t>7/3/2015</a:t>
             </a:fld>
             <a:endParaRPr lang="en-US" dirty="0"/>
           </a:p>
@@ -2272,7 +2272,7 @@
           <a:p>
             <a:fld id="{4509A250-FF31-4206-8172-F9D3106AACB1}" type="datetimeFigureOut">
               <a:rPr lang="en-US" dirty="0"/>
-              <a:t>7/1/2015</a:t>
+              <a:t>7/3/2015</a:t>
             </a:fld>
             <a:endParaRPr lang="en-US" dirty="0"/>
           </a:p>
@@ -2877,7 +2877,7 @@
           <a:p>
             <a:fld id="{4509A250-FF31-4206-8172-F9D3106AACB1}" type="datetimeFigureOut">
               <a:rPr lang="en-US" dirty="0"/>
-              <a:t>7/1/2015</a:t>
+              <a:t>7/3/2015</a:t>
             </a:fld>
             <a:endParaRPr lang="en-US" dirty="0"/>
           </a:p>
@@ -3719,7 +3719,7 @@
           <a:p>
             <a:fld id="{4509A250-FF31-4206-8172-F9D3106AACB1}" type="datetimeFigureOut">
               <a:rPr lang="en-US" dirty="0"/>
-              <a:t>7/1/2015</a:t>
+              <a:t>7/3/2015</a:t>
             </a:fld>
             <a:endParaRPr lang="en-US" dirty="0"/>
           </a:p>
@@ -3884,7 +3884,7 @@
           <a:p>
             <a:fld id="{4509A250-FF31-4206-8172-F9D3106AACB1}" type="datetimeFigureOut">
               <a:rPr lang="en-US" dirty="0"/>
-              <a:t>7/1/2015</a:t>
+              <a:t>7/3/2015</a:t>
             </a:fld>
             <a:endParaRPr lang="en-US" dirty="0"/>
           </a:p>
@@ -4059,7 +4059,7 @@
           <a:p>
             <a:fld id="{4509A250-FF31-4206-8172-F9D3106AACB1}" type="datetimeFigureOut">
               <a:rPr lang="en-US" dirty="0"/>
-              <a:t>7/1/2015</a:t>
+              <a:t>7/3/2015</a:t>
             </a:fld>
             <a:endParaRPr lang="en-US" dirty="0"/>
           </a:p>
@@ -4224,7 +4224,7 @@
           <a:p>
             <a:fld id="{4509A250-FF31-4206-8172-F9D3106AACB1}" type="datetimeFigureOut">
               <a:rPr lang="en-US" dirty="0"/>
-              <a:t>7/1/2015</a:t>
+              <a:t>7/3/2015</a:t>
             </a:fld>
             <a:endParaRPr lang="en-US" dirty="0"/>
           </a:p>
@@ -4463,7 +4463,7 @@
           <a:p>
             <a:fld id="{4509A250-FF31-4206-8172-F9D3106AACB1}" type="datetimeFigureOut">
               <a:rPr lang="en-US" dirty="0"/>
-              <a:t>7/1/2015</a:t>
+              <a:t>7/3/2015</a:t>
             </a:fld>
             <a:endParaRPr lang="en-US" dirty="0"/>
           </a:p>
@@ -4750,7 +4750,7 @@
           <a:p>
             <a:fld id="{4509A250-FF31-4206-8172-F9D3106AACB1}" type="datetimeFigureOut">
               <a:rPr lang="en-US" dirty="0"/>
-              <a:t>7/1/2015</a:t>
+              <a:t>7/3/2015</a:t>
             </a:fld>
             <a:endParaRPr lang="en-US" dirty="0"/>
           </a:p>
@@ -5183,7 +5183,7 @@
           <a:p>
             <a:fld id="{4509A250-FF31-4206-8172-F9D3106AACB1}" type="datetimeFigureOut">
               <a:rPr lang="en-US" dirty="0"/>
-              <a:t>7/1/2015</a:t>
+              <a:t>7/3/2015</a:t>
             </a:fld>
             <a:endParaRPr lang="en-US" dirty="0"/>
           </a:p>
@@ -5296,7 +5296,7 @@
           <a:p>
             <a:fld id="{4509A250-FF31-4206-8172-F9D3106AACB1}" type="datetimeFigureOut">
               <a:rPr lang="en-US" dirty="0"/>
-              <a:t>7/1/2015</a:t>
+              <a:t>7/3/2015</a:t>
             </a:fld>
             <a:endParaRPr lang="en-US" dirty="0"/>
           </a:p>
@@ -5386,7 +5386,7 @@
           <a:p>
             <a:fld id="{4509A250-FF31-4206-8172-F9D3106AACB1}" type="datetimeFigureOut">
               <a:rPr lang="en-US" dirty="0"/>
-              <a:t>7/1/2015</a:t>
+              <a:t>7/3/2015</a:t>
             </a:fld>
             <a:endParaRPr lang="en-US" dirty="0"/>
           </a:p>
@@ -5660,7 +5660,7 @@
           <a:p>
             <a:fld id="{4509A250-FF31-4206-8172-F9D3106AACB1}" type="datetimeFigureOut">
               <a:rPr lang="en-US" dirty="0"/>
-              <a:t>7/1/2015</a:t>
+              <a:t>7/3/2015</a:t>
             </a:fld>
             <a:endParaRPr lang="en-US" dirty="0"/>
           </a:p>
@@ -5930,7 +5930,7 @@
           <a:p>
             <a:fld id="{4509A250-FF31-4206-8172-F9D3106AACB1}" type="datetimeFigureOut">
               <a:rPr lang="en-US" dirty="0"/>
-              <a:t>7/1/2015</a:t>
+              <a:t>7/3/2015</a:t>
             </a:fld>
             <a:endParaRPr lang="en-US" dirty="0"/>
           </a:p>
@@ -6354,7 +6354,7 @@
           <a:p>
             <a:fld id="{4509A250-FF31-4206-8172-F9D3106AACB1}" type="datetimeFigureOut">
               <a:rPr lang="en-US" dirty="0"/>
-              <a:t>7/1/2015</a:t>
+              <a:t>7/3/2015</a:t>
             </a:fld>
             <a:endParaRPr lang="en-US" dirty="0"/>
           </a:p>
@@ -8052,11 +8052,7 @@
             <a:pPr lvl="1"/>
             <a:r>
               <a:rPr lang="zh-CN" altLang="en-US" dirty="0" smtClean="0"/>
-              <a:t>按照颜色排</a:t>
-            </a:r>
-            <a:r>
-              <a:rPr lang="zh-CN" altLang="en-US" dirty="0" smtClean="0"/>
-              <a:t>序</a:t>
+              <a:t>按照颜色排序</a:t>
             </a:r>
             <a:endParaRPr lang="en-US" altLang="zh-CN" dirty="0" smtClean="0"/>
           </a:p>
@@ -8967,11 +8963,7 @@
             </a:r>
             <a:r>
               <a:rPr lang="zh-CN" altLang="en-US" dirty="0" smtClean="0"/>
-              <a:t>阅表</a:t>
-            </a:r>
-            <a:r>
-              <a:rPr lang="zh-CN" altLang="en-US" dirty="0" smtClean="0"/>
-              <a:t>格在查阅值右侧或另外一张工作表</a:t>
+              <a:t>阅表格在查阅值右侧或另外一张工作表</a:t>
             </a:r>
             <a:endParaRPr lang="en-US" altLang="zh-CN" dirty="0" smtClean="0"/>
           </a:p>
@@ -8983,15 +8975,7 @@
             </a:r>
             <a:r>
               <a:rPr lang="zh-CN" altLang="en-US" dirty="0" smtClean="0"/>
-              <a:t>列</a:t>
-            </a:r>
-            <a:r>
-              <a:rPr lang="zh-CN" altLang="en-US" dirty="0" smtClean="0"/>
-              <a:t>数</a:t>
-            </a:r>
-            <a:r>
-              <a:rPr lang="zh-CN" altLang="en-US" dirty="0" smtClean="0"/>
-              <a:t>据</a:t>
+              <a:t>列数据</a:t>
             </a:r>
             <a:endParaRPr lang="en-US" altLang="zh-CN" dirty="0" smtClean="0"/>
           </a:p>
@@ -9463,21 +9447,29 @@
           </a:p>
           <a:p>
             <a:r>
-              <a:rPr lang="zh-CN" altLang="en-US" dirty="0" smtClean="0"/>
-              <a:t>输入消息</a:t>
-            </a:r>
-            <a:endParaRPr lang="en-US" altLang="zh-CN" dirty="0" smtClean="0"/>
-          </a:p>
-          <a:p>
-            <a:r>
-              <a:rPr lang="zh-CN" altLang="en-US" dirty="0"/>
-              <a:t>错</a:t>
-            </a:r>
-            <a:r>
-              <a:rPr lang="zh-CN" altLang="en-US" dirty="0" smtClean="0"/>
-              <a:t>误消息</a:t>
-            </a:r>
-            <a:endParaRPr lang="en-US" altLang="zh-CN" dirty="0" smtClean="0"/>
+              <a:rPr lang="ja-JP" altLang="en-US" dirty="0">
+                <a:latin typeface="SimSun" panose="02010600030101010101" pitchFamily="2" charset="-122"/>
+                <a:ea typeface="SimSun" panose="02010600030101010101" pitchFamily="2" charset="-122"/>
+              </a:rPr>
+              <a:t>输入信息</a:t>
+            </a:r>
+            <a:endParaRPr lang="en-US" altLang="zh-CN" dirty="0">
+              <a:latin typeface="SimSun" panose="02010600030101010101" pitchFamily="2" charset="-122"/>
+              <a:ea typeface="SimSun" panose="02010600030101010101" pitchFamily="2" charset="-122"/>
+            </a:endParaRPr>
+          </a:p>
+          <a:p>
+            <a:r>
+              <a:rPr lang="ja-JP" altLang="en-US" dirty="0">
+                <a:latin typeface="SimSun" panose="02010600030101010101" pitchFamily="2" charset="-122"/>
+                <a:ea typeface="SimSun" panose="02010600030101010101" pitchFamily="2" charset="-122"/>
+              </a:rPr>
+              <a:t>出错警告</a:t>
+            </a:r>
+            <a:endParaRPr lang="en-US" altLang="zh-CN" dirty="0" smtClean="0">
+              <a:latin typeface="SimSun" panose="02010600030101010101" pitchFamily="2" charset="-122"/>
+              <a:ea typeface="SimSun" panose="02010600030101010101" pitchFamily="2" charset="-122"/>
+            </a:endParaRPr>
           </a:p>
           <a:p>
             <a:r>
@@ -9505,12 +9497,12 @@
           <a:p>
             <a:pPr lvl="1"/>
             <a:r>
-              <a:rPr lang="zh-CN" altLang="en-US" dirty="0"/>
-              <a:t>隐</a:t>
-            </a:r>
-            <a:r>
-              <a:rPr lang="zh-CN" altLang="en-US" dirty="0" smtClean="0"/>
-              <a:t>藏工作表</a:t>
+              <a:rPr lang="zh-CN" altLang="en-US" dirty="0" smtClean="0"/>
+              <a:t>隐藏工作</a:t>
+            </a:r>
+            <a:r>
+              <a:rPr lang="zh-CN" altLang="en-US" dirty="0" smtClean="0"/>
+              <a:t>表</a:t>
             </a:r>
             <a:endParaRPr lang="en-US" altLang="zh-CN" dirty="0" smtClean="0"/>
           </a:p>

</xml_diff>

<commit_message>
Fix some error on slide 24
</commit_message>
<xml_diff>
--- a/Excel动手实验室.pptx
+++ b/Excel动手实验室.pptx
@@ -9622,21 +9622,19 @@
             <p:ph idx="1"/>
           </p:nvPr>
         </p:nvSpPr>
-        <p:spPr/>
-        <p:txBody>
-          <a:bodyPr/>
-          <a:lstStyle/>
-          <a:p>
-            <a:r>
-              <a:rPr lang="zh-CN" altLang="en-US" dirty="0" smtClean="0"/>
-              <a:t>创建数据透视表</a:t>
-            </a:r>
-            <a:endParaRPr lang="en-US" altLang="zh-CN" dirty="0" smtClean="0"/>
-          </a:p>
-          <a:p>
-            <a:r>
-              <a:rPr lang="zh-CN" altLang="en-US" dirty="0"/>
-              <a:t>手动创</a:t>
+        <p:spPr>
+          <a:xfrm>
+            <a:off x="1104293" y="1918103"/>
+            <a:ext cx="8946541" cy="4195481"/>
+          </a:xfrm>
+        </p:spPr>
+        <p:txBody>
+          <a:bodyPr/>
+          <a:lstStyle/>
+          <a:p>
+            <a:r>
+              <a:rPr lang="zh-CN" altLang="en-US" dirty="0" smtClean="0"/>
+              <a:t>创</a:t>
             </a:r>
             <a:r>
               <a:rPr lang="zh-CN" altLang="en-US" dirty="0" smtClean="0"/>
@@ -9675,22 +9673,45 @@
           <a:p>
             <a:pPr lvl="2"/>
             <a:r>
-              <a:rPr lang="zh-CN" altLang="en-US" dirty="0"/>
+              <a:rPr lang="zh-CN" altLang="en-US" dirty="0" smtClean="0"/>
               <a:t>值</a:t>
             </a:r>
             <a:endParaRPr lang="en-US" altLang="zh-CN" dirty="0" smtClean="0"/>
           </a:p>
           <a:p>
-            <a:pPr lvl="1"/>
-            <a:r>
-              <a:rPr lang="zh-CN" altLang="en-US" dirty="0"/>
+            <a:pPr lvl="2"/>
+            <a:r>
+              <a:rPr lang="ja-JP" altLang="en-US" dirty="0">
+                <a:latin typeface="SimSun" panose="02010600030101010101" pitchFamily="2" charset="-122"/>
+                <a:ea typeface="SimSun" panose="02010600030101010101" pitchFamily="2" charset="-122"/>
+              </a:rPr>
+              <a:t>筛选器</a:t>
+            </a:r>
+            <a:endParaRPr lang="en-US" altLang="zh-CN" dirty="0" smtClean="0">
+              <a:latin typeface="SimSun" panose="02010600030101010101" pitchFamily="2" charset="-122"/>
+              <a:ea typeface="SimSun" panose="02010600030101010101" pitchFamily="2" charset="-122"/>
+            </a:endParaRPr>
+          </a:p>
+          <a:p>
+            <a:pPr lvl="1"/>
+            <a:r>
+              <a:rPr lang="zh-CN" altLang="en-US" dirty="0">
+                <a:latin typeface="SimSun" panose="02010600030101010101" pitchFamily="2" charset="-122"/>
+                <a:ea typeface="SimSun" panose="02010600030101010101" pitchFamily="2" charset="-122"/>
+              </a:rPr>
               <a:t>分</a:t>
             </a:r>
             <a:r>
-              <a:rPr lang="zh-CN" altLang="en-US" dirty="0" smtClean="0"/>
+              <a:rPr lang="zh-CN" altLang="en-US" dirty="0" smtClean="0">
+                <a:latin typeface="SimSun" panose="02010600030101010101" pitchFamily="2" charset="-122"/>
+                <a:ea typeface="SimSun" panose="02010600030101010101" pitchFamily="2" charset="-122"/>
+              </a:rPr>
               <a:t>组</a:t>
             </a:r>
-            <a:endParaRPr lang="en-US" altLang="zh-CN" dirty="0" smtClean="0"/>
+            <a:endParaRPr lang="en-US" altLang="zh-CN" dirty="0" smtClean="0">
+              <a:latin typeface="SimSun" panose="02010600030101010101" pitchFamily="2" charset="-122"/>
+              <a:ea typeface="SimSun" panose="02010600030101010101" pitchFamily="2" charset="-122"/>
+            </a:endParaRPr>
           </a:p>
           <a:p>
             <a:pPr lvl="1"/>
@@ -9701,7 +9722,17 @@
             <a:endParaRPr lang="en-US" altLang="zh-CN" dirty="0" smtClean="0"/>
           </a:p>
           <a:p>
-            <a:endParaRPr lang="zh-CN" altLang="en-US" dirty="0"/>
+            <a:r>
+              <a:rPr lang="zh-CN" altLang="en-US" dirty="0">
+                <a:latin typeface="SimSun" panose="02010600030101010101" pitchFamily="2" charset="-122"/>
+                <a:ea typeface="SimSun" panose="02010600030101010101" pitchFamily="2" charset="-122"/>
+              </a:rPr>
+              <a:t>推荐的数据透视表</a:t>
+            </a:r>
+            <a:endParaRPr lang="zh-CN" altLang="en-US" dirty="0">
+              <a:latin typeface="SimSun" panose="02010600030101010101" pitchFamily="2" charset="-122"/>
+              <a:ea typeface="SimSun" panose="02010600030101010101" pitchFamily="2" charset="-122"/>
+            </a:endParaRPr>
           </a:p>
         </p:txBody>
       </p:sp>

</xml_diff>

<commit_message>
Fix a typo in slides
</commit_message>
<xml_diff>
--- a/Excel动手实验室.pptx
+++ b/Excel动手实验室.pptx
@@ -236,7 +236,7 @@
           <a:p>
             <a:fld id="{1BA39FD8-4789-4E5D-8B57-25E95F0DBEC2}" type="datetimeFigureOut">
               <a:rPr lang="zh-CN" altLang="en-US" smtClean="0"/>
-              <a:t>2015/7/3</a:t>
+              <a:t>2015/7/5</a:t>
             </a:fld>
             <a:endParaRPr lang="zh-CN" altLang="en-US"/>
           </a:p>
@@ -1223,7 +1223,7 @@
           <a:p>
             <a:fld id="{4AAD347D-5ACD-4C99-B74B-A9C85AD731AF}" type="datetimeFigureOut">
               <a:rPr lang="en-US" dirty="0"/>
-              <a:t>7/3/2015</a:t>
+              <a:t>7/5/2015</a:t>
             </a:fld>
             <a:endParaRPr lang="en-US" dirty="0"/>
           </a:p>
@@ -1493,7 +1493,7 @@
           <a:p>
             <a:fld id="{4509A250-FF31-4206-8172-F9D3106AACB1}" type="datetimeFigureOut">
               <a:rPr lang="en-US" dirty="0"/>
-              <a:t>7/3/2015</a:t>
+              <a:t>7/5/2015</a:t>
             </a:fld>
             <a:endParaRPr lang="en-US" dirty="0"/>
           </a:p>
@@ -1682,7 +1682,7 @@
           <a:p>
             <a:fld id="{4509A250-FF31-4206-8172-F9D3106AACB1}" type="datetimeFigureOut">
               <a:rPr lang="en-US" dirty="0"/>
-              <a:t>7/3/2015</a:t>
+              <a:t>7/5/2015</a:t>
             </a:fld>
             <a:endParaRPr lang="en-US" dirty="0"/>
           </a:p>
@@ -1945,7 +1945,7 @@
           <a:p>
             <a:fld id="{4509A250-FF31-4206-8172-F9D3106AACB1}" type="datetimeFigureOut">
               <a:rPr lang="en-US" dirty="0"/>
-              <a:t>7/3/2015</a:t>
+              <a:t>7/5/2015</a:t>
             </a:fld>
             <a:endParaRPr lang="en-US" dirty="0"/>
           </a:p>
@@ -2272,7 +2272,7 @@
           <a:p>
             <a:fld id="{4509A250-FF31-4206-8172-F9D3106AACB1}" type="datetimeFigureOut">
               <a:rPr lang="en-US" dirty="0"/>
-              <a:t>7/3/2015</a:t>
+              <a:t>7/5/2015</a:t>
             </a:fld>
             <a:endParaRPr lang="en-US" dirty="0"/>
           </a:p>
@@ -2877,7 +2877,7 @@
           <a:p>
             <a:fld id="{4509A250-FF31-4206-8172-F9D3106AACB1}" type="datetimeFigureOut">
               <a:rPr lang="en-US" dirty="0"/>
-              <a:t>7/3/2015</a:t>
+              <a:t>7/5/2015</a:t>
             </a:fld>
             <a:endParaRPr lang="en-US" dirty="0"/>
           </a:p>
@@ -3719,7 +3719,7 @@
           <a:p>
             <a:fld id="{4509A250-FF31-4206-8172-F9D3106AACB1}" type="datetimeFigureOut">
               <a:rPr lang="en-US" dirty="0"/>
-              <a:t>7/3/2015</a:t>
+              <a:t>7/5/2015</a:t>
             </a:fld>
             <a:endParaRPr lang="en-US" dirty="0"/>
           </a:p>
@@ -3884,7 +3884,7 @@
           <a:p>
             <a:fld id="{4509A250-FF31-4206-8172-F9D3106AACB1}" type="datetimeFigureOut">
               <a:rPr lang="en-US" dirty="0"/>
-              <a:t>7/3/2015</a:t>
+              <a:t>7/5/2015</a:t>
             </a:fld>
             <a:endParaRPr lang="en-US" dirty="0"/>
           </a:p>
@@ -4059,7 +4059,7 @@
           <a:p>
             <a:fld id="{4509A250-FF31-4206-8172-F9D3106AACB1}" type="datetimeFigureOut">
               <a:rPr lang="en-US" dirty="0"/>
-              <a:t>7/3/2015</a:t>
+              <a:t>7/5/2015</a:t>
             </a:fld>
             <a:endParaRPr lang="en-US" dirty="0"/>
           </a:p>
@@ -4224,7 +4224,7 @@
           <a:p>
             <a:fld id="{4509A250-FF31-4206-8172-F9D3106AACB1}" type="datetimeFigureOut">
               <a:rPr lang="en-US" dirty="0"/>
-              <a:t>7/3/2015</a:t>
+              <a:t>7/5/2015</a:t>
             </a:fld>
             <a:endParaRPr lang="en-US" dirty="0"/>
           </a:p>
@@ -4463,7 +4463,7 @@
           <a:p>
             <a:fld id="{4509A250-FF31-4206-8172-F9D3106AACB1}" type="datetimeFigureOut">
               <a:rPr lang="en-US" dirty="0"/>
-              <a:t>7/3/2015</a:t>
+              <a:t>7/5/2015</a:t>
             </a:fld>
             <a:endParaRPr lang="en-US" dirty="0"/>
           </a:p>
@@ -4750,7 +4750,7 @@
           <a:p>
             <a:fld id="{4509A250-FF31-4206-8172-F9D3106AACB1}" type="datetimeFigureOut">
               <a:rPr lang="en-US" dirty="0"/>
-              <a:t>7/3/2015</a:t>
+              <a:t>7/5/2015</a:t>
             </a:fld>
             <a:endParaRPr lang="en-US" dirty="0"/>
           </a:p>
@@ -5183,7 +5183,7 @@
           <a:p>
             <a:fld id="{4509A250-FF31-4206-8172-F9D3106AACB1}" type="datetimeFigureOut">
               <a:rPr lang="en-US" dirty="0"/>
-              <a:t>7/3/2015</a:t>
+              <a:t>7/5/2015</a:t>
             </a:fld>
             <a:endParaRPr lang="en-US" dirty="0"/>
           </a:p>
@@ -5296,7 +5296,7 @@
           <a:p>
             <a:fld id="{4509A250-FF31-4206-8172-F9D3106AACB1}" type="datetimeFigureOut">
               <a:rPr lang="en-US" dirty="0"/>
-              <a:t>7/3/2015</a:t>
+              <a:t>7/5/2015</a:t>
             </a:fld>
             <a:endParaRPr lang="en-US" dirty="0"/>
           </a:p>
@@ -5386,7 +5386,7 @@
           <a:p>
             <a:fld id="{4509A250-FF31-4206-8172-F9D3106AACB1}" type="datetimeFigureOut">
               <a:rPr lang="en-US" dirty="0"/>
-              <a:t>7/3/2015</a:t>
+              <a:t>7/5/2015</a:t>
             </a:fld>
             <a:endParaRPr lang="en-US" dirty="0"/>
           </a:p>
@@ -5660,7 +5660,7 @@
           <a:p>
             <a:fld id="{4509A250-FF31-4206-8172-F9D3106AACB1}" type="datetimeFigureOut">
               <a:rPr lang="en-US" dirty="0"/>
-              <a:t>7/3/2015</a:t>
+              <a:t>7/5/2015</a:t>
             </a:fld>
             <a:endParaRPr lang="en-US" dirty="0"/>
           </a:p>
@@ -5930,7 +5930,7 @@
           <a:p>
             <a:fld id="{4509A250-FF31-4206-8172-F9D3106AACB1}" type="datetimeFigureOut">
               <a:rPr lang="en-US" dirty="0"/>
-              <a:t>7/3/2015</a:t>
+              <a:t>7/5/2015</a:t>
             </a:fld>
             <a:endParaRPr lang="en-US" dirty="0"/>
           </a:p>
@@ -6354,7 +6354,7 @@
           <a:p>
             <a:fld id="{4509A250-FF31-4206-8172-F9D3106AACB1}" type="datetimeFigureOut">
               <a:rPr lang="en-US" dirty="0"/>
-              <a:t>7/3/2015</a:t>
+              <a:t>7/5/2015</a:t>
             </a:fld>
             <a:endParaRPr lang="en-US" dirty="0"/>
           </a:p>
@@ -9498,11 +9498,7 @@
             <a:pPr lvl="1"/>
             <a:r>
               <a:rPr lang="zh-CN" altLang="en-US" dirty="0" smtClean="0"/>
-              <a:t>隐藏工作</a:t>
-            </a:r>
-            <a:r>
-              <a:rPr lang="zh-CN" altLang="en-US" dirty="0" smtClean="0"/>
-              <a:t>表</a:t>
+              <a:t>隐藏工作表</a:t>
             </a:r>
             <a:endParaRPr lang="en-US" altLang="zh-CN" dirty="0" smtClean="0"/>
           </a:p>
@@ -9634,11 +9630,7 @@
           <a:p>
             <a:r>
               <a:rPr lang="zh-CN" altLang="en-US" dirty="0" smtClean="0"/>
-              <a:t>创</a:t>
-            </a:r>
-            <a:r>
-              <a:rPr lang="zh-CN" altLang="en-US" dirty="0" smtClean="0"/>
-              <a:t>建数据透视表</a:t>
+              <a:t>创建数据透视表</a:t>
             </a:r>
             <a:endParaRPr lang="en-US" altLang="zh-CN" dirty="0" smtClean="0"/>
           </a:p>
@@ -9729,10 +9721,6 @@
               </a:rPr>
               <a:t>推荐的数据透视表</a:t>
             </a:r>
-            <a:endParaRPr lang="zh-CN" altLang="en-US" dirty="0">
-              <a:latin typeface="SimSun" panose="02010600030101010101" pitchFamily="2" charset="-122"/>
-              <a:ea typeface="SimSun" panose="02010600030101010101" pitchFamily="2" charset="-122"/>
-            </a:endParaRPr>
           </a:p>
         </p:txBody>
       </p:sp>
@@ -9814,7 +9802,15 @@
             </a:r>
             <a:r>
               <a:rPr lang="zh-CN" altLang="en-US" dirty="0" smtClean="0"/>
-              <a:t>数据分析表（分析）</a:t>
+              <a:t>数</a:t>
+            </a:r>
+            <a:r>
+              <a:rPr lang="zh-CN" altLang="en-US" dirty="0"/>
+              <a:t>据透视表</a:t>
+            </a:r>
+            <a:r>
+              <a:rPr lang="zh-CN" altLang="en-US" dirty="0" smtClean="0"/>
+              <a:t>（分析）</a:t>
             </a:r>
             <a:endParaRPr lang="zh-CN" altLang="en-US" dirty="0"/>
           </a:p>

</xml_diff>